<commit_message>
Supervisórios CLP .... - 08Mai2025
</commit_message>
<xml_diff>
--- a/01 Classes/Aula9 - CLP - Arquitetura de Sistemas SCADA.pptx
+++ b/01 Classes/Aula9 - CLP - Arquitetura de Sistemas SCADA.pptx
@@ -5,17 +5,23 @@
     <p:sldMasterId id="2147483648" r:id="rId1"/>
   </p:sldMasterIdLst>
   <p:notesMasterIdLst>
-    <p:notesMasterId r:id="rId10"/>
+    <p:notesMasterId r:id="rId16"/>
   </p:notesMasterIdLst>
   <p:sldIdLst>
     <p:sldId id="256" r:id="rId2"/>
     <p:sldId id="291" r:id="rId3"/>
     <p:sldId id="354" r:id="rId4"/>
-    <p:sldId id="333" r:id="rId5"/>
-    <p:sldId id="323" r:id="rId6"/>
-    <p:sldId id="360" r:id="rId7"/>
-    <p:sldId id="337" r:id="rId8"/>
-    <p:sldId id="309" r:id="rId9"/>
+    <p:sldId id="361" r:id="rId5"/>
+    <p:sldId id="362" r:id="rId6"/>
+    <p:sldId id="363" r:id="rId7"/>
+    <p:sldId id="364" r:id="rId8"/>
+    <p:sldId id="333" r:id="rId9"/>
+    <p:sldId id="323" r:id="rId10"/>
+    <p:sldId id="360" r:id="rId11"/>
+    <p:sldId id="366" r:id="rId12"/>
+    <p:sldId id="365" r:id="rId13"/>
+    <p:sldId id="337" r:id="rId14"/>
+    <p:sldId id="309" r:id="rId15"/>
   </p:sldIdLst>
   <p:sldSz cx="9144000" cy="5143500" type="screen16x9"/>
   <p:notesSz cx="6858000" cy="9144000"/>
@@ -562,6 +568,240 @@
 </p:notes>
 </file>
 
+<file path=ppt/notesSlides/notesSlide10.xml><?xml version="1.0" encoding="utf-8"?>
+<p:notes xmlns:a="http://schemas.openxmlformats.org/drawingml/2006/main" xmlns:r="http://schemas.openxmlformats.org/officeDocument/2006/relationships" xmlns:p="http://schemas.openxmlformats.org/presentationml/2006/main">
+  <p:cSld>
+    <p:spTree>
+      <p:nvGrpSpPr>
+        <p:cNvPr id="1" name="">
+          <a:extLst>
+            <a:ext uri="{FF2B5EF4-FFF2-40B4-BE49-F238E27FC236}">
+              <a16:creationId xmlns:a16="http://schemas.microsoft.com/office/drawing/2014/main" id="{34272D80-403F-B7B8-35B5-B4495789BE27}"/>
+            </a:ext>
+          </a:extLst>
+        </p:cNvPr>
+        <p:cNvGrpSpPr/>
+        <p:nvPr/>
+      </p:nvGrpSpPr>
+      <p:grpSpPr>
+        <a:xfrm>
+          <a:off x="0" y="0"/>
+          <a:ext cx="0" cy="0"/>
+          <a:chOff x="0" y="0"/>
+          <a:chExt cx="0" cy="0"/>
+        </a:xfrm>
+      </p:grpSpPr>
+      <p:sp>
+        <p:nvSpPr>
+          <p:cNvPr id="2" name="Espaço Reservado para Imagem de Slide 1">
+            <a:extLst>
+              <a:ext uri="{FF2B5EF4-FFF2-40B4-BE49-F238E27FC236}">
+                <a16:creationId xmlns:a16="http://schemas.microsoft.com/office/drawing/2014/main" id="{EF18656C-C27E-C8A2-A5B3-2CB102BEC644}"/>
+              </a:ext>
+            </a:extLst>
+          </p:cNvPr>
+          <p:cNvSpPr>
+            <a:spLocks noGrp="1" noRot="1" noChangeAspect="1"/>
+          </p:cNvSpPr>
+          <p:nvPr>
+            <p:ph type="sldImg"/>
+          </p:nvPr>
+        </p:nvSpPr>
+        <p:spPr>
+          <a:xfrm>
+            <a:off x="381000" y="685800"/>
+            <a:ext cx="6096000" cy="3429000"/>
+          </a:xfrm>
+        </p:spPr>
+      </p:sp>
+      <p:sp>
+        <p:nvSpPr>
+          <p:cNvPr id="3" name="Espaço Reservado para Anotações 2">
+            <a:extLst>
+              <a:ext uri="{FF2B5EF4-FFF2-40B4-BE49-F238E27FC236}">
+                <a16:creationId xmlns:a16="http://schemas.microsoft.com/office/drawing/2014/main" id="{F3704D31-7AE0-D440-A450-7E6C356850D5}"/>
+              </a:ext>
+            </a:extLst>
+          </p:cNvPr>
+          <p:cNvSpPr>
+            <a:spLocks noGrp="1"/>
+          </p:cNvSpPr>
+          <p:nvPr>
+            <p:ph type="body" idx="1"/>
+          </p:nvPr>
+        </p:nvSpPr>
+        <p:spPr/>
+        <p:txBody>
+          <a:bodyPr/>
+          <a:lstStyle/>
+          <a:p>
+            <a:endParaRPr lang="pt-BR" dirty="0"/>
+          </a:p>
+        </p:txBody>
+      </p:sp>
+    </p:spTree>
+    <p:extLst>
+      <p:ext uri="{BB962C8B-B14F-4D97-AF65-F5344CB8AC3E}">
+        <p14:creationId xmlns:p14="http://schemas.microsoft.com/office/powerpoint/2010/main" val="1248931994"/>
+      </p:ext>
+    </p:extLst>
+  </p:cSld>
+  <p:clrMapOvr>
+    <a:masterClrMapping/>
+  </p:clrMapOvr>
+</p:notes>
+</file>
+
+<file path=ppt/notesSlides/notesSlide11.xml><?xml version="1.0" encoding="utf-8"?>
+<p:notes xmlns:a="http://schemas.openxmlformats.org/drawingml/2006/main" xmlns:r="http://schemas.openxmlformats.org/officeDocument/2006/relationships" xmlns:p="http://schemas.openxmlformats.org/presentationml/2006/main">
+  <p:cSld>
+    <p:spTree>
+      <p:nvGrpSpPr>
+        <p:cNvPr id="1" name="">
+          <a:extLst>
+            <a:ext uri="{FF2B5EF4-FFF2-40B4-BE49-F238E27FC236}">
+              <a16:creationId xmlns:a16="http://schemas.microsoft.com/office/drawing/2014/main" id="{822D0ABA-8EFC-EE74-D3D4-28B7E55329EE}"/>
+            </a:ext>
+          </a:extLst>
+        </p:cNvPr>
+        <p:cNvGrpSpPr/>
+        <p:nvPr/>
+      </p:nvGrpSpPr>
+      <p:grpSpPr>
+        <a:xfrm>
+          <a:off x="0" y="0"/>
+          <a:ext cx="0" cy="0"/>
+          <a:chOff x="0" y="0"/>
+          <a:chExt cx="0" cy="0"/>
+        </a:xfrm>
+      </p:grpSpPr>
+      <p:sp>
+        <p:nvSpPr>
+          <p:cNvPr id="2" name="Espaço Reservado para Imagem de Slide 1">
+            <a:extLst>
+              <a:ext uri="{FF2B5EF4-FFF2-40B4-BE49-F238E27FC236}">
+                <a16:creationId xmlns:a16="http://schemas.microsoft.com/office/drawing/2014/main" id="{730840D3-1A56-C44A-8766-0DE3902A14EE}"/>
+              </a:ext>
+            </a:extLst>
+          </p:cNvPr>
+          <p:cNvSpPr>
+            <a:spLocks noGrp="1" noRot="1" noChangeAspect="1"/>
+          </p:cNvSpPr>
+          <p:nvPr>
+            <p:ph type="sldImg"/>
+          </p:nvPr>
+        </p:nvSpPr>
+        <p:spPr>
+          <a:xfrm>
+            <a:off x="381000" y="685800"/>
+            <a:ext cx="6096000" cy="3429000"/>
+          </a:xfrm>
+        </p:spPr>
+      </p:sp>
+      <p:sp>
+        <p:nvSpPr>
+          <p:cNvPr id="3" name="Espaço Reservado para Anotações 2">
+            <a:extLst>
+              <a:ext uri="{FF2B5EF4-FFF2-40B4-BE49-F238E27FC236}">
+                <a16:creationId xmlns:a16="http://schemas.microsoft.com/office/drawing/2014/main" id="{707270CC-2C0D-9C6A-C880-702246037B13}"/>
+              </a:ext>
+            </a:extLst>
+          </p:cNvPr>
+          <p:cNvSpPr>
+            <a:spLocks noGrp="1"/>
+          </p:cNvSpPr>
+          <p:nvPr>
+            <p:ph type="body" idx="1"/>
+          </p:nvPr>
+        </p:nvSpPr>
+        <p:spPr/>
+        <p:txBody>
+          <a:bodyPr/>
+          <a:lstStyle/>
+          <a:p>
+            <a:endParaRPr lang="pt-BR" dirty="0"/>
+          </a:p>
+        </p:txBody>
+      </p:sp>
+    </p:spTree>
+    <p:extLst>
+      <p:ext uri="{BB962C8B-B14F-4D97-AF65-F5344CB8AC3E}">
+        <p14:creationId xmlns:p14="http://schemas.microsoft.com/office/powerpoint/2010/main" val="397724195"/>
+      </p:ext>
+    </p:extLst>
+  </p:cSld>
+  <p:clrMapOvr>
+    <a:masterClrMapping/>
+  </p:clrMapOvr>
+</p:notes>
+</file>
+
+<file path=ppt/notesSlides/notesSlide12.xml><?xml version="1.0" encoding="utf-8"?>
+<p:notes xmlns:a="http://schemas.openxmlformats.org/drawingml/2006/main" xmlns:r="http://schemas.openxmlformats.org/officeDocument/2006/relationships" xmlns:p="http://schemas.openxmlformats.org/presentationml/2006/main">
+  <p:cSld>
+    <p:spTree>
+      <p:nvGrpSpPr>
+        <p:cNvPr id="1" name=""/>
+        <p:cNvGrpSpPr/>
+        <p:nvPr/>
+      </p:nvGrpSpPr>
+      <p:grpSpPr>
+        <a:xfrm>
+          <a:off x="0" y="0"/>
+          <a:ext cx="0" cy="0"/>
+          <a:chOff x="0" y="0"/>
+          <a:chExt cx="0" cy="0"/>
+        </a:xfrm>
+      </p:grpSpPr>
+      <p:sp>
+        <p:nvSpPr>
+          <p:cNvPr id="2" name="Espaço Reservado para Imagem de Slide 1"/>
+          <p:cNvSpPr>
+            <a:spLocks noGrp="1" noRot="1" noChangeAspect="1"/>
+          </p:cNvSpPr>
+          <p:nvPr>
+            <p:ph type="sldImg"/>
+          </p:nvPr>
+        </p:nvSpPr>
+        <p:spPr>
+          <a:xfrm>
+            <a:off x="381000" y="685800"/>
+            <a:ext cx="6096000" cy="3429000"/>
+          </a:xfrm>
+        </p:spPr>
+      </p:sp>
+      <p:sp>
+        <p:nvSpPr>
+          <p:cNvPr id="3" name="Espaço Reservado para Anotações 2"/>
+          <p:cNvSpPr>
+            <a:spLocks noGrp="1"/>
+          </p:cNvSpPr>
+          <p:nvPr>
+            <p:ph type="body" idx="1"/>
+          </p:nvPr>
+        </p:nvSpPr>
+        <p:spPr/>
+        <p:txBody>
+          <a:bodyPr/>
+          <a:lstStyle/>
+          <a:p>
+            <a:endParaRPr lang="pt-BR" dirty="0"/>
+          </a:p>
+        </p:txBody>
+      </p:sp>
+    </p:spTree>
+    <p:extLst>
+      <p:ext uri="{BB962C8B-B14F-4D97-AF65-F5344CB8AC3E}">
+        <p14:creationId xmlns:p14="http://schemas.microsoft.com/office/powerpoint/2010/main" val="4290351292"/>
+      </p:ext>
+    </p:extLst>
+  </p:cSld>
+  <p:clrMapOvr>
+    <a:masterClrMapping/>
+  </p:clrMapOvr>
+</p:notes>
+</file>
+
 <file path=ppt/notesSlides/notesSlide2.xml><?xml version="1.0" encoding="utf-8"?>
 <p:notes xmlns:a="http://schemas.openxmlformats.org/drawingml/2006/main" xmlns:r="http://schemas.openxmlformats.org/officeDocument/2006/relationships" xmlns:p="http://schemas.openxmlformats.org/presentationml/2006/main">
   <p:cSld>
@@ -651,7 +891,13 @@
   <p:cSld>
     <p:spTree>
       <p:nvGrpSpPr>
-        <p:cNvPr id="1" name=""/>
+        <p:cNvPr id="1" name="">
+          <a:extLst>
+            <a:ext uri="{FF2B5EF4-FFF2-40B4-BE49-F238E27FC236}">
+              <a16:creationId xmlns:a16="http://schemas.microsoft.com/office/drawing/2014/main" id="{7F2DDED1-2A92-DBA9-CF78-985DDD6646C8}"/>
+            </a:ext>
+          </a:extLst>
+        </p:cNvPr>
         <p:cNvGrpSpPr/>
         <p:nvPr/>
       </p:nvGrpSpPr>
@@ -665,7 +911,13 @@
       </p:grpSpPr>
       <p:sp>
         <p:nvSpPr>
-          <p:cNvPr id="2" name="Espaço Reservado para Imagem de Slide 1"/>
+          <p:cNvPr id="2" name="Espaço Reservado para Imagem de Slide 1">
+            <a:extLst>
+              <a:ext uri="{FF2B5EF4-FFF2-40B4-BE49-F238E27FC236}">
+                <a16:creationId xmlns:a16="http://schemas.microsoft.com/office/drawing/2014/main" id="{432F7E50-9C5B-7A45-7CC2-7A6686441F6F}"/>
+              </a:ext>
+            </a:extLst>
+          </p:cNvPr>
           <p:cNvSpPr>
             <a:spLocks noGrp="1" noRot="1" noChangeAspect="1"/>
           </p:cNvSpPr>
@@ -682,7 +934,13 @@
       </p:sp>
       <p:sp>
         <p:nvSpPr>
-          <p:cNvPr id="3" name="Espaço Reservado para Anotações 2"/>
+          <p:cNvPr id="3" name="Espaço Reservado para Anotações 2">
+            <a:extLst>
+              <a:ext uri="{FF2B5EF4-FFF2-40B4-BE49-F238E27FC236}">
+                <a16:creationId xmlns:a16="http://schemas.microsoft.com/office/drawing/2014/main" id="{5B9F51CD-7DAA-0EAC-72F3-B9CEBCDF2815}"/>
+              </a:ext>
+            </a:extLst>
+          </p:cNvPr>
           <p:cNvSpPr>
             <a:spLocks noGrp="1"/>
           </p:cNvSpPr>
@@ -702,7 +960,7 @@
     </p:spTree>
     <p:extLst>
       <p:ext uri="{BB962C8B-B14F-4D97-AF65-F5344CB8AC3E}">
-        <p14:creationId xmlns:p14="http://schemas.microsoft.com/office/powerpoint/2010/main" val="585304384"/>
+        <p14:creationId xmlns:p14="http://schemas.microsoft.com/office/powerpoint/2010/main" val="1363702869"/>
       </p:ext>
     </p:extLst>
   </p:cSld>
@@ -713,6 +971,258 @@
 </file>
 
 <file path=ppt/notesSlides/notesSlide4.xml><?xml version="1.0" encoding="utf-8"?>
+<p:notes xmlns:a="http://schemas.openxmlformats.org/drawingml/2006/main" xmlns:r="http://schemas.openxmlformats.org/officeDocument/2006/relationships" xmlns:p="http://schemas.openxmlformats.org/presentationml/2006/main">
+  <p:cSld>
+    <p:spTree>
+      <p:nvGrpSpPr>
+        <p:cNvPr id="1" name="">
+          <a:extLst>
+            <a:ext uri="{FF2B5EF4-FFF2-40B4-BE49-F238E27FC236}">
+              <a16:creationId xmlns:a16="http://schemas.microsoft.com/office/drawing/2014/main" id="{2A0F36E9-18F9-07EB-9069-CCE0D00C1819}"/>
+            </a:ext>
+          </a:extLst>
+        </p:cNvPr>
+        <p:cNvGrpSpPr/>
+        <p:nvPr/>
+      </p:nvGrpSpPr>
+      <p:grpSpPr>
+        <a:xfrm>
+          <a:off x="0" y="0"/>
+          <a:ext cx="0" cy="0"/>
+          <a:chOff x="0" y="0"/>
+          <a:chExt cx="0" cy="0"/>
+        </a:xfrm>
+      </p:grpSpPr>
+      <p:sp>
+        <p:nvSpPr>
+          <p:cNvPr id="2" name="Espaço Reservado para Imagem de Slide 1">
+            <a:extLst>
+              <a:ext uri="{FF2B5EF4-FFF2-40B4-BE49-F238E27FC236}">
+                <a16:creationId xmlns:a16="http://schemas.microsoft.com/office/drawing/2014/main" id="{6A2C5434-C625-D90F-68E9-583B29B3C460}"/>
+              </a:ext>
+            </a:extLst>
+          </p:cNvPr>
+          <p:cNvSpPr>
+            <a:spLocks noGrp="1" noRot="1" noChangeAspect="1"/>
+          </p:cNvSpPr>
+          <p:nvPr>
+            <p:ph type="sldImg"/>
+          </p:nvPr>
+        </p:nvSpPr>
+        <p:spPr>
+          <a:xfrm>
+            <a:off x="381000" y="685800"/>
+            <a:ext cx="6096000" cy="3429000"/>
+          </a:xfrm>
+        </p:spPr>
+      </p:sp>
+      <p:sp>
+        <p:nvSpPr>
+          <p:cNvPr id="3" name="Espaço Reservado para Anotações 2">
+            <a:extLst>
+              <a:ext uri="{FF2B5EF4-FFF2-40B4-BE49-F238E27FC236}">
+                <a16:creationId xmlns:a16="http://schemas.microsoft.com/office/drawing/2014/main" id="{E90C2DC1-D51C-F35F-C95F-691B71D98022}"/>
+              </a:ext>
+            </a:extLst>
+          </p:cNvPr>
+          <p:cNvSpPr>
+            <a:spLocks noGrp="1"/>
+          </p:cNvSpPr>
+          <p:nvPr>
+            <p:ph type="body" idx="1"/>
+          </p:nvPr>
+        </p:nvSpPr>
+        <p:spPr/>
+        <p:txBody>
+          <a:bodyPr/>
+          <a:lstStyle/>
+          <a:p>
+            <a:endParaRPr lang="pt-BR" dirty="0"/>
+          </a:p>
+        </p:txBody>
+      </p:sp>
+    </p:spTree>
+    <p:extLst>
+      <p:ext uri="{BB962C8B-B14F-4D97-AF65-F5344CB8AC3E}">
+        <p14:creationId xmlns:p14="http://schemas.microsoft.com/office/powerpoint/2010/main" val="3458149214"/>
+      </p:ext>
+    </p:extLst>
+  </p:cSld>
+  <p:clrMapOvr>
+    <a:masterClrMapping/>
+  </p:clrMapOvr>
+</p:notes>
+</file>
+
+<file path=ppt/notesSlides/notesSlide5.xml><?xml version="1.0" encoding="utf-8"?>
+<p:notes xmlns:a="http://schemas.openxmlformats.org/drawingml/2006/main" xmlns:r="http://schemas.openxmlformats.org/officeDocument/2006/relationships" xmlns:p="http://schemas.openxmlformats.org/presentationml/2006/main">
+  <p:cSld>
+    <p:spTree>
+      <p:nvGrpSpPr>
+        <p:cNvPr id="1" name="">
+          <a:extLst>
+            <a:ext uri="{FF2B5EF4-FFF2-40B4-BE49-F238E27FC236}">
+              <a16:creationId xmlns:a16="http://schemas.microsoft.com/office/drawing/2014/main" id="{220A56B2-8111-6CBF-9242-D387D5F82410}"/>
+            </a:ext>
+          </a:extLst>
+        </p:cNvPr>
+        <p:cNvGrpSpPr/>
+        <p:nvPr/>
+      </p:nvGrpSpPr>
+      <p:grpSpPr>
+        <a:xfrm>
+          <a:off x="0" y="0"/>
+          <a:ext cx="0" cy="0"/>
+          <a:chOff x="0" y="0"/>
+          <a:chExt cx="0" cy="0"/>
+        </a:xfrm>
+      </p:grpSpPr>
+      <p:sp>
+        <p:nvSpPr>
+          <p:cNvPr id="2" name="Espaço Reservado para Imagem de Slide 1">
+            <a:extLst>
+              <a:ext uri="{FF2B5EF4-FFF2-40B4-BE49-F238E27FC236}">
+                <a16:creationId xmlns:a16="http://schemas.microsoft.com/office/drawing/2014/main" id="{81E998F6-A1E4-DB20-5898-4686E55EF7E9}"/>
+              </a:ext>
+            </a:extLst>
+          </p:cNvPr>
+          <p:cNvSpPr>
+            <a:spLocks noGrp="1" noRot="1" noChangeAspect="1"/>
+          </p:cNvSpPr>
+          <p:nvPr>
+            <p:ph type="sldImg"/>
+          </p:nvPr>
+        </p:nvSpPr>
+        <p:spPr>
+          <a:xfrm>
+            <a:off x="381000" y="685800"/>
+            <a:ext cx="6096000" cy="3429000"/>
+          </a:xfrm>
+        </p:spPr>
+      </p:sp>
+      <p:sp>
+        <p:nvSpPr>
+          <p:cNvPr id="3" name="Espaço Reservado para Anotações 2">
+            <a:extLst>
+              <a:ext uri="{FF2B5EF4-FFF2-40B4-BE49-F238E27FC236}">
+                <a16:creationId xmlns:a16="http://schemas.microsoft.com/office/drawing/2014/main" id="{03A0E324-7B5E-C412-9998-E9F7E6471DD1}"/>
+              </a:ext>
+            </a:extLst>
+          </p:cNvPr>
+          <p:cNvSpPr>
+            <a:spLocks noGrp="1"/>
+          </p:cNvSpPr>
+          <p:nvPr>
+            <p:ph type="body" idx="1"/>
+          </p:nvPr>
+        </p:nvSpPr>
+        <p:spPr/>
+        <p:txBody>
+          <a:bodyPr/>
+          <a:lstStyle/>
+          <a:p>
+            <a:endParaRPr lang="pt-BR" dirty="0"/>
+          </a:p>
+        </p:txBody>
+      </p:sp>
+    </p:spTree>
+    <p:extLst>
+      <p:ext uri="{BB962C8B-B14F-4D97-AF65-F5344CB8AC3E}">
+        <p14:creationId xmlns:p14="http://schemas.microsoft.com/office/powerpoint/2010/main" val="1501541950"/>
+      </p:ext>
+    </p:extLst>
+  </p:cSld>
+  <p:clrMapOvr>
+    <a:masterClrMapping/>
+  </p:clrMapOvr>
+</p:notes>
+</file>
+
+<file path=ppt/notesSlides/notesSlide6.xml><?xml version="1.0" encoding="utf-8"?>
+<p:notes xmlns:a="http://schemas.openxmlformats.org/drawingml/2006/main" xmlns:r="http://schemas.openxmlformats.org/officeDocument/2006/relationships" xmlns:p="http://schemas.openxmlformats.org/presentationml/2006/main">
+  <p:cSld>
+    <p:spTree>
+      <p:nvGrpSpPr>
+        <p:cNvPr id="1" name="">
+          <a:extLst>
+            <a:ext uri="{FF2B5EF4-FFF2-40B4-BE49-F238E27FC236}">
+              <a16:creationId xmlns:a16="http://schemas.microsoft.com/office/drawing/2014/main" id="{0F970E1B-BC8B-85EF-3273-6338C091F446}"/>
+            </a:ext>
+          </a:extLst>
+        </p:cNvPr>
+        <p:cNvGrpSpPr/>
+        <p:nvPr/>
+      </p:nvGrpSpPr>
+      <p:grpSpPr>
+        <a:xfrm>
+          <a:off x="0" y="0"/>
+          <a:ext cx="0" cy="0"/>
+          <a:chOff x="0" y="0"/>
+          <a:chExt cx="0" cy="0"/>
+        </a:xfrm>
+      </p:grpSpPr>
+      <p:sp>
+        <p:nvSpPr>
+          <p:cNvPr id="2" name="Espaço Reservado para Imagem de Slide 1">
+            <a:extLst>
+              <a:ext uri="{FF2B5EF4-FFF2-40B4-BE49-F238E27FC236}">
+                <a16:creationId xmlns:a16="http://schemas.microsoft.com/office/drawing/2014/main" id="{F0AFC5A9-344A-5F12-D971-5A739519AB05}"/>
+              </a:ext>
+            </a:extLst>
+          </p:cNvPr>
+          <p:cNvSpPr>
+            <a:spLocks noGrp="1" noRot="1" noChangeAspect="1"/>
+          </p:cNvSpPr>
+          <p:nvPr>
+            <p:ph type="sldImg"/>
+          </p:nvPr>
+        </p:nvSpPr>
+        <p:spPr>
+          <a:xfrm>
+            <a:off x="381000" y="685800"/>
+            <a:ext cx="6096000" cy="3429000"/>
+          </a:xfrm>
+        </p:spPr>
+      </p:sp>
+      <p:sp>
+        <p:nvSpPr>
+          <p:cNvPr id="3" name="Espaço Reservado para Anotações 2">
+            <a:extLst>
+              <a:ext uri="{FF2B5EF4-FFF2-40B4-BE49-F238E27FC236}">
+                <a16:creationId xmlns:a16="http://schemas.microsoft.com/office/drawing/2014/main" id="{05295474-93AF-BF06-9BE5-0CCFFC3CBBCA}"/>
+              </a:ext>
+            </a:extLst>
+          </p:cNvPr>
+          <p:cNvSpPr>
+            <a:spLocks noGrp="1"/>
+          </p:cNvSpPr>
+          <p:nvPr>
+            <p:ph type="body" idx="1"/>
+          </p:nvPr>
+        </p:nvSpPr>
+        <p:spPr/>
+        <p:txBody>
+          <a:bodyPr/>
+          <a:lstStyle/>
+          <a:p>
+            <a:endParaRPr lang="pt-BR" dirty="0"/>
+          </a:p>
+        </p:txBody>
+      </p:sp>
+    </p:spTree>
+    <p:extLst>
+      <p:ext uri="{BB962C8B-B14F-4D97-AF65-F5344CB8AC3E}">
+        <p14:creationId xmlns:p14="http://schemas.microsoft.com/office/powerpoint/2010/main" val="3837350824"/>
+      </p:ext>
+    </p:extLst>
+  </p:cSld>
+  <p:clrMapOvr>
+    <a:masterClrMapping/>
+  </p:clrMapOvr>
+</p:notes>
+</file>
+
+<file path=ppt/notesSlides/notesSlide7.xml><?xml version="1.0" encoding="utf-8"?>
 <p:notes xmlns:a="http://schemas.openxmlformats.org/drawingml/2006/main" xmlns:r="http://schemas.openxmlformats.org/officeDocument/2006/relationships" xmlns:p="http://schemas.openxmlformats.org/presentationml/2006/main">
   <p:cSld>
     <p:spTree>
@@ -768,6 +1278,72 @@
     </p:spTree>
     <p:extLst>
       <p:ext uri="{BB962C8B-B14F-4D97-AF65-F5344CB8AC3E}">
+        <p14:creationId xmlns:p14="http://schemas.microsoft.com/office/powerpoint/2010/main" val="585304384"/>
+      </p:ext>
+    </p:extLst>
+  </p:cSld>
+  <p:clrMapOvr>
+    <a:masterClrMapping/>
+  </p:clrMapOvr>
+</p:notes>
+</file>
+
+<file path=ppt/notesSlides/notesSlide8.xml><?xml version="1.0" encoding="utf-8"?>
+<p:notes xmlns:a="http://schemas.openxmlformats.org/drawingml/2006/main" xmlns:r="http://schemas.openxmlformats.org/officeDocument/2006/relationships" xmlns:p="http://schemas.openxmlformats.org/presentationml/2006/main">
+  <p:cSld>
+    <p:spTree>
+      <p:nvGrpSpPr>
+        <p:cNvPr id="1" name=""/>
+        <p:cNvGrpSpPr/>
+        <p:nvPr/>
+      </p:nvGrpSpPr>
+      <p:grpSpPr>
+        <a:xfrm>
+          <a:off x="0" y="0"/>
+          <a:ext cx="0" cy="0"/>
+          <a:chOff x="0" y="0"/>
+          <a:chExt cx="0" cy="0"/>
+        </a:xfrm>
+      </p:grpSpPr>
+      <p:sp>
+        <p:nvSpPr>
+          <p:cNvPr id="2" name="Espaço Reservado para Imagem de Slide 1"/>
+          <p:cNvSpPr>
+            <a:spLocks noGrp="1" noRot="1" noChangeAspect="1"/>
+          </p:cNvSpPr>
+          <p:nvPr>
+            <p:ph type="sldImg"/>
+          </p:nvPr>
+        </p:nvSpPr>
+        <p:spPr>
+          <a:xfrm>
+            <a:off x="381000" y="685800"/>
+            <a:ext cx="6096000" cy="3429000"/>
+          </a:xfrm>
+        </p:spPr>
+      </p:sp>
+      <p:sp>
+        <p:nvSpPr>
+          <p:cNvPr id="3" name="Espaço Reservado para Anotações 2"/>
+          <p:cNvSpPr>
+            <a:spLocks noGrp="1"/>
+          </p:cNvSpPr>
+          <p:nvPr>
+            <p:ph type="body" idx="1"/>
+          </p:nvPr>
+        </p:nvSpPr>
+        <p:spPr/>
+        <p:txBody>
+          <a:bodyPr/>
+          <a:lstStyle/>
+          <a:p>
+            <a:endParaRPr lang="pt-BR" dirty="0"/>
+          </a:p>
+        </p:txBody>
+      </p:sp>
+    </p:spTree>
+    <p:extLst>
+      <p:ext uri="{BB962C8B-B14F-4D97-AF65-F5344CB8AC3E}">
         <p14:creationId xmlns:p14="http://schemas.microsoft.com/office/powerpoint/2010/main" val="2709569597"/>
       </p:ext>
     </p:extLst>
@@ -778,7 +1354,7 @@
 </p:notes>
 </file>
 
-<file path=ppt/notesSlides/notesSlide5.xml><?xml version="1.0" encoding="utf-8"?>
+<file path=ppt/notesSlides/notesSlide9.xml><?xml version="1.0" encoding="utf-8"?>
 <p:notes xmlns:a="http://schemas.openxmlformats.org/drawingml/2006/main" xmlns:r="http://schemas.openxmlformats.org/officeDocument/2006/relationships" xmlns:p="http://schemas.openxmlformats.org/presentationml/2006/main">
   <p:cSld>
     <p:spTree>
@@ -853,72 +1429,6 @@
     <p:extLst>
       <p:ext uri="{BB962C8B-B14F-4D97-AF65-F5344CB8AC3E}">
         <p14:creationId xmlns:p14="http://schemas.microsoft.com/office/powerpoint/2010/main" val="3656069206"/>
-      </p:ext>
-    </p:extLst>
-  </p:cSld>
-  <p:clrMapOvr>
-    <a:masterClrMapping/>
-  </p:clrMapOvr>
-</p:notes>
-</file>
-
-<file path=ppt/notesSlides/notesSlide6.xml><?xml version="1.0" encoding="utf-8"?>
-<p:notes xmlns:a="http://schemas.openxmlformats.org/drawingml/2006/main" xmlns:r="http://schemas.openxmlformats.org/officeDocument/2006/relationships" xmlns:p="http://schemas.openxmlformats.org/presentationml/2006/main">
-  <p:cSld>
-    <p:spTree>
-      <p:nvGrpSpPr>
-        <p:cNvPr id="1" name=""/>
-        <p:cNvGrpSpPr/>
-        <p:nvPr/>
-      </p:nvGrpSpPr>
-      <p:grpSpPr>
-        <a:xfrm>
-          <a:off x="0" y="0"/>
-          <a:ext cx="0" cy="0"/>
-          <a:chOff x="0" y="0"/>
-          <a:chExt cx="0" cy="0"/>
-        </a:xfrm>
-      </p:grpSpPr>
-      <p:sp>
-        <p:nvSpPr>
-          <p:cNvPr id="2" name="Espaço Reservado para Imagem de Slide 1"/>
-          <p:cNvSpPr>
-            <a:spLocks noGrp="1" noRot="1" noChangeAspect="1"/>
-          </p:cNvSpPr>
-          <p:nvPr>
-            <p:ph type="sldImg"/>
-          </p:nvPr>
-        </p:nvSpPr>
-        <p:spPr>
-          <a:xfrm>
-            <a:off x="381000" y="685800"/>
-            <a:ext cx="6096000" cy="3429000"/>
-          </a:xfrm>
-        </p:spPr>
-      </p:sp>
-      <p:sp>
-        <p:nvSpPr>
-          <p:cNvPr id="3" name="Espaço Reservado para Anotações 2"/>
-          <p:cNvSpPr>
-            <a:spLocks noGrp="1"/>
-          </p:cNvSpPr>
-          <p:nvPr>
-            <p:ph type="body" idx="1"/>
-          </p:nvPr>
-        </p:nvSpPr>
-        <p:spPr/>
-        <p:txBody>
-          <a:bodyPr/>
-          <a:lstStyle/>
-          <a:p>
-            <a:endParaRPr lang="pt-BR" dirty="0"/>
-          </a:p>
-        </p:txBody>
-      </p:sp>
-    </p:spTree>
-    <p:extLst>
-      <p:ext uri="{BB962C8B-B14F-4D97-AF65-F5344CB8AC3E}">
-        <p14:creationId xmlns:p14="http://schemas.microsoft.com/office/powerpoint/2010/main" val="4290351292"/>
       </p:ext>
     </p:extLst>
   </p:cSld>
@@ -3865,6 +4375,1533 @@
 </p:sld>
 </file>
 
+<file path=ppt/slides/slide10.xml><?xml version="1.0" encoding="utf-8"?>
+<p:sld xmlns:a="http://schemas.openxmlformats.org/drawingml/2006/main" xmlns:r="http://schemas.openxmlformats.org/officeDocument/2006/relationships" xmlns:p="http://schemas.openxmlformats.org/presentationml/2006/main">
+  <p:cSld>
+    <p:spTree>
+      <p:nvGrpSpPr>
+        <p:cNvPr id="1" name="">
+          <a:extLst>
+            <a:ext uri="{FF2B5EF4-FFF2-40B4-BE49-F238E27FC236}">
+              <a16:creationId xmlns:a16="http://schemas.microsoft.com/office/drawing/2014/main" id="{2953AC7D-8CF9-A63F-57A2-D983DEB50039}"/>
+            </a:ext>
+          </a:extLst>
+        </p:cNvPr>
+        <p:cNvGrpSpPr/>
+        <p:nvPr/>
+      </p:nvGrpSpPr>
+      <p:grpSpPr>
+        <a:xfrm>
+          <a:off x="0" y="0"/>
+          <a:ext cx="0" cy="0"/>
+          <a:chOff x="0" y="0"/>
+          <a:chExt cx="0" cy="0"/>
+        </a:xfrm>
+      </p:grpSpPr>
+      <p:sp>
+        <p:nvSpPr>
+          <p:cNvPr id="6" name="Title 1">
+            <a:extLst>
+              <a:ext uri="{FF2B5EF4-FFF2-40B4-BE49-F238E27FC236}">
+                <a16:creationId xmlns:a16="http://schemas.microsoft.com/office/drawing/2014/main" id="{CC4C3A19-ED0C-1CE0-1512-03DBBA8E622A}"/>
+              </a:ext>
+            </a:extLst>
+          </p:cNvPr>
+          <p:cNvSpPr>
+            <a:spLocks noGrp="1"/>
+          </p:cNvSpPr>
+          <p:nvPr>
+            <p:ph type="title"/>
+          </p:nvPr>
+        </p:nvSpPr>
+        <p:spPr>
+          <a:xfrm>
+            <a:off x="457200" y="205980"/>
+            <a:ext cx="8229600" cy="857251"/>
+          </a:xfrm>
+        </p:spPr>
+        <p:txBody>
+          <a:bodyPr>
+            <a:normAutofit/>
+          </a:bodyPr>
+          <a:lstStyle/>
+          <a:p>
+            <a:r>
+              <a:rPr lang="en-US" b="1" dirty="0" err="1">
+                <a:solidFill>
+                  <a:srgbClr val="0070C0"/>
+                </a:solidFill>
+              </a:rPr>
+              <a:t>Dinâmica</a:t>
+            </a:r>
+            <a:r>
+              <a:rPr lang="en-US" b="1" dirty="0">
+                <a:solidFill>
+                  <a:srgbClr val="0070C0"/>
+                </a:solidFill>
+              </a:rPr>
+              <a:t>/</a:t>
+            </a:r>
+            <a:r>
+              <a:rPr lang="en-US" b="1" dirty="0" err="1">
+                <a:solidFill>
+                  <a:srgbClr val="0070C0"/>
+                </a:solidFill>
+              </a:rPr>
+              <a:t>Atividade</a:t>
+            </a:r>
+            <a:endParaRPr lang="en-US" b="1" dirty="0">
+              <a:solidFill>
+                <a:srgbClr val="0070C0"/>
+              </a:solidFill>
+            </a:endParaRPr>
+          </a:p>
+        </p:txBody>
+      </p:sp>
+      <p:sp>
+        <p:nvSpPr>
+          <p:cNvPr id="8" name="Text Placeholder 2">
+            <a:extLst>
+              <a:ext uri="{FF2B5EF4-FFF2-40B4-BE49-F238E27FC236}">
+                <a16:creationId xmlns:a16="http://schemas.microsoft.com/office/drawing/2014/main" id="{B45119E1-EF11-7248-2ADA-8776A0D7E7E3}"/>
+              </a:ext>
+            </a:extLst>
+          </p:cNvPr>
+          <p:cNvSpPr>
+            <a:spLocks noGrp="1"/>
+          </p:cNvSpPr>
+          <p:nvPr>
+            <p:ph type="body" sz="half" idx="1"/>
+          </p:nvPr>
+        </p:nvSpPr>
+        <p:spPr>
+          <a:xfrm>
+            <a:off x="142865" y="1035050"/>
+            <a:ext cx="8865056" cy="3994150"/>
+          </a:xfrm>
+        </p:spPr>
+        <p:txBody>
+          <a:bodyPr>
+            <a:noAutofit/>
+          </a:bodyPr>
+          <a:lstStyle/>
+          <a:p>
+            <a:pPr marL="0" indent="0" algn="just">
+              <a:buNone/>
+            </a:pPr>
+            <a:r>
+              <a:rPr lang="pt-BR" sz="2000" b="1" dirty="0">
+                <a:solidFill>
+                  <a:schemeClr val="tx1"/>
+                </a:solidFill>
+                <a:latin typeface="Times New Roman" panose="02020603050405020304" pitchFamily="18" charset="0"/>
+                <a:cs typeface="Times New Roman" panose="02020603050405020304" pitchFamily="18" charset="0"/>
+              </a:rPr>
+              <a:t>O que significa a sigla SCADA e qual é o objetivo desse tipo de sistema?</a:t>
+            </a:r>
+          </a:p>
+          <a:p>
+            <a:pPr marL="0" indent="0" algn="just">
+              <a:buNone/>
+            </a:pPr>
+            <a:r>
+              <a:rPr lang="pt-BR" sz="2000" dirty="0">
+                <a:solidFill>
+                  <a:schemeClr val="tx1"/>
+                </a:solidFill>
+                <a:latin typeface="Times New Roman" panose="02020603050405020304" pitchFamily="18" charset="0"/>
+                <a:cs typeface="Times New Roman" panose="02020603050405020304" pitchFamily="18" charset="0"/>
+              </a:rPr>
+              <a:t>	SCADA significa </a:t>
+            </a:r>
+            <a:r>
+              <a:rPr lang="pt-BR" sz="2000" dirty="0" err="1">
+                <a:solidFill>
+                  <a:schemeClr val="tx1"/>
+                </a:solidFill>
+                <a:latin typeface="Times New Roman" panose="02020603050405020304" pitchFamily="18" charset="0"/>
+                <a:cs typeface="Times New Roman" panose="02020603050405020304" pitchFamily="18" charset="0"/>
+              </a:rPr>
+              <a:t>Supervisory</a:t>
+            </a:r>
+            <a:r>
+              <a:rPr lang="pt-BR" sz="2000" dirty="0">
+                <a:solidFill>
+                  <a:schemeClr val="tx1"/>
+                </a:solidFill>
+                <a:latin typeface="Times New Roman" panose="02020603050405020304" pitchFamily="18" charset="0"/>
+                <a:cs typeface="Times New Roman" panose="02020603050405020304" pitchFamily="18" charset="0"/>
+              </a:rPr>
+              <a:t> </a:t>
+            </a:r>
+            <a:r>
+              <a:rPr lang="pt-BR" sz="2000" dirty="0" err="1">
+                <a:solidFill>
+                  <a:schemeClr val="tx1"/>
+                </a:solidFill>
+                <a:latin typeface="Times New Roman" panose="02020603050405020304" pitchFamily="18" charset="0"/>
+                <a:cs typeface="Times New Roman" panose="02020603050405020304" pitchFamily="18" charset="0"/>
+              </a:rPr>
+              <a:t>Control</a:t>
+            </a:r>
+            <a:r>
+              <a:rPr lang="pt-BR" sz="2000" dirty="0">
+                <a:solidFill>
+                  <a:schemeClr val="tx1"/>
+                </a:solidFill>
+                <a:latin typeface="Times New Roman" panose="02020603050405020304" pitchFamily="18" charset="0"/>
+                <a:cs typeface="Times New Roman" panose="02020603050405020304" pitchFamily="18" charset="0"/>
+              </a:rPr>
+              <a:t> </a:t>
+            </a:r>
+            <a:r>
+              <a:rPr lang="pt-BR" sz="2000" dirty="0" err="1">
+                <a:solidFill>
+                  <a:schemeClr val="tx1"/>
+                </a:solidFill>
+                <a:latin typeface="Times New Roman" panose="02020603050405020304" pitchFamily="18" charset="0"/>
+                <a:cs typeface="Times New Roman" panose="02020603050405020304" pitchFamily="18" charset="0"/>
+              </a:rPr>
+              <a:t>and</a:t>
+            </a:r>
+            <a:r>
+              <a:rPr lang="pt-BR" sz="2000" dirty="0">
+                <a:solidFill>
+                  <a:schemeClr val="tx1"/>
+                </a:solidFill>
+                <a:latin typeface="Times New Roman" panose="02020603050405020304" pitchFamily="18" charset="0"/>
+                <a:cs typeface="Times New Roman" panose="02020603050405020304" pitchFamily="18" charset="0"/>
+              </a:rPr>
+              <a:t> Data </a:t>
+            </a:r>
+            <a:r>
+              <a:rPr lang="pt-BR" sz="2000" dirty="0" err="1">
+                <a:solidFill>
+                  <a:schemeClr val="tx1"/>
+                </a:solidFill>
+                <a:latin typeface="Times New Roman" panose="02020603050405020304" pitchFamily="18" charset="0"/>
+                <a:cs typeface="Times New Roman" panose="02020603050405020304" pitchFamily="18" charset="0"/>
+              </a:rPr>
+              <a:t>Acquisition</a:t>
+            </a:r>
+            <a:r>
+              <a:rPr lang="pt-BR" sz="2000" dirty="0">
+                <a:solidFill>
+                  <a:schemeClr val="tx1"/>
+                </a:solidFill>
+                <a:latin typeface="Times New Roman" panose="02020603050405020304" pitchFamily="18" charset="0"/>
+                <a:cs typeface="Times New Roman" panose="02020603050405020304" pitchFamily="18" charset="0"/>
+              </a:rPr>
+              <a:t>. Seu objetivo é monitorar e controlar processos industriais em tempo real, oferecendo uma interface gráfica para operadores.</a:t>
+            </a:r>
+          </a:p>
+          <a:p>
+            <a:pPr marL="0" indent="0" algn="just">
+              <a:buNone/>
+            </a:pPr>
+            <a:endParaRPr lang="pt-BR" sz="2000" dirty="0">
+              <a:solidFill>
+                <a:schemeClr val="tx1"/>
+              </a:solidFill>
+              <a:latin typeface="Times New Roman" panose="02020603050405020304" pitchFamily="18" charset="0"/>
+              <a:cs typeface="Times New Roman" panose="02020603050405020304" pitchFamily="18" charset="0"/>
+            </a:endParaRPr>
+          </a:p>
+          <a:p>
+            <a:pPr marL="0" indent="0" algn="just">
+              <a:buNone/>
+            </a:pPr>
+            <a:r>
+              <a:rPr lang="pt-BR" sz="2000" b="1" dirty="0">
+                <a:solidFill>
+                  <a:schemeClr val="tx1"/>
+                </a:solidFill>
+                <a:latin typeface="Times New Roman" panose="02020603050405020304" pitchFamily="18" charset="0"/>
+                <a:cs typeface="Times New Roman" panose="02020603050405020304" pitchFamily="18" charset="0"/>
+              </a:rPr>
+              <a:t>Explique como ocorre a comunicação entre um CLP e um sistema SCADA.</a:t>
+            </a:r>
+          </a:p>
+          <a:p>
+            <a:pPr marL="0" indent="0" algn="just">
+              <a:buNone/>
+            </a:pPr>
+            <a:r>
+              <a:rPr lang="pt-BR" sz="2000" dirty="0">
+                <a:solidFill>
+                  <a:schemeClr val="tx1"/>
+                </a:solidFill>
+                <a:latin typeface="Times New Roman" panose="02020603050405020304" pitchFamily="18" charset="0"/>
+                <a:cs typeface="Times New Roman" panose="02020603050405020304" pitchFamily="18" charset="0"/>
+              </a:rPr>
+              <a:t>	A comunicação ocorre via protocolos industriais como </a:t>
+            </a:r>
+            <a:r>
+              <a:rPr lang="pt-BR" sz="2000" dirty="0" err="1">
+                <a:solidFill>
+                  <a:schemeClr val="tx1"/>
+                </a:solidFill>
+                <a:latin typeface="Times New Roman" panose="02020603050405020304" pitchFamily="18" charset="0"/>
+                <a:cs typeface="Times New Roman" panose="02020603050405020304" pitchFamily="18" charset="0"/>
+              </a:rPr>
+              <a:t>Modbus</a:t>
+            </a:r>
+            <a:r>
+              <a:rPr lang="pt-BR" sz="2000" dirty="0">
+                <a:solidFill>
+                  <a:schemeClr val="tx1"/>
+                </a:solidFill>
+                <a:latin typeface="Times New Roman" panose="02020603050405020304" pitchFamily="18" charset="0"/>
+                <a:cs typeface="Times New Roman" panose="02020603050405020304" pitchFamily="18" charset="0"/>
+              </a:rPr>
+              <a:t>, OPC ou </a:t>
+            </a:r>
+            <a:r>
+              <a:rPr lang="pt-BR" sz="2000" dirty="0" err="1">
+                <a:solidFill>
+                  <a:schemeClr val="tx1"/>
+                </a:solidFill>
+                <a:latin typeface="Times New Roman" panose="02020603050405020304" pitchFamily="18" charset="0"/>
+                <a:cs typeface="Times New Roman" panose="02020603050405020304" pitchFamily="18" charset="0"/>
+              </a:rPr>
+              <a:t>Profibus</a:t>
+            </a:r>
+            <a:r>
+              <a:rPr lang="pt-BR" sz="2000" dirty="0">
+                <a:solidFill>
+                  <a:schemeClr val="tx1"/>
+                </a:solidFill>
+                <a:latin typeface="Times New Roman" panose="02020603050405020304" pitchFamily="18" charset="0"/>
+                <a:cs typeface="Times New Roman" panose="02020603050405020304" pitchFamily="18" charset="0"/>
+              </a:rPr>
+              <a:t>. O CLP coleta dados dos sensores e os envia ao SCADA, que exibe essas informações ao operador e permite o envio de comandos ao CLP.</a:t>
+            </a:r>
+          </a:p>
+        </p:txBody>
+      </p:sp>
+    </p:spTree>
+    <p:extLst>
+      <p:ext uri="{BB962C8B-B14F-4D97-AF65-F5344CB8AC3E}">
+        <p14:creationId xmlns:p14="http://schemas.microsoft.com/office/powerpoint/2010/main" val="2976682751"/>
+      </p:ext>
+    </p:extLst>
+  </p:cSld>
+  <p:clrMapOvr>
+    <a:masterClrMapping/>
+  </p:clrMapOvr>
+  <p:transition spd="med"/>
+</p:sld>
+</file>
+
+<file path=ppt/slides/slide11.xml><?xml version="1.0" encoding="utf-8"?>
+<p:sld xmlns:a="http://schemas.openxmlformats.org/drawingml/2006/main" xmlns:r="http://schemas.openxmlformats.org/officeDocument/2006/relationships" xmlns:p="http://schemas.openxmlformats.org/presentationml/2006/main">
+  <p:cSld>
+    <p:spTree>
+      <p:nvGrpSpPr>
+        <p:cNvPr id="1" name="">
+          <a:extLst>
+            <a:ext uri="{FF2B5EF4-FFF2-40B4-BE49-F238E27FC236}">
+              <a16:creationId xmlns:a16="http://schemas.microsoft.com/office/drawing/2014/main" id="{57CD8B98-2B1E-F7F1-2876-783E893E00C2}"/>
+            </a:ext>
+          </a:extLst>
+        </p:cNvPr>
+        <p:cNvGrpSpPr/>
+        <p:nvPr/>
+      </p:nvGrpSpPr>
+      <p:grpSpPr>
+        <a:xfrm>
+          <a:off x="0" y="0"/>
+          <a:ext cx="0" cy="0"/>
+          <a:chOff x="0" y="0"/>
+          <a:chExt cx="0" cy="0"/>
+        </a:xfrm>
+      </p:grpSpPr>
+      <p:sp>
+        <p:nvSpPr>
+          <p:cNvPr id="6" name="Title 1">
+            <a:extLst>
+              <a:ext uri="{FF2B5EF4-FFF2-40B4-BE49-F238E27FC236}">
+                <a16:creationId xmlns:a16="http://schemas.microsoft.com/office/drawing/2014/main" id="{56E0814D-2FD1-6A08-B820-26BEC5C98669}"/>
+              </a:ext>
+            </a:extLst>
+          </p:cNvPr>
+          <p:cNvSpPr>
+            <a:spLocks noGrp="1"/>
+          </p:cNvSpPr>
+          <p:nvPr>
+            <p:ph type="title"/>
+          </p:nvPr>
+        </p:nvSpPr>
+        <p:spPr>
+          <a:xfrm>
+            <a:off x="457200" y="205980"/>
+            <a:ext cx="8229600" cy="857251"/>
+          </a:xfrm>
+        </p:spPr>
+        <p:txBody>
+          <a:bodyPr>
+            <a:normAutofit/>
+          </a:bodyPr>
+          <a:lstStyle/>
+          <a:p>
+            <a:r>
+              <a:rPr lang="en-US" b="1" dirty="0" err="1">
+                <a:solidFill>
+                  <a:srgbClr val="0070C0"/>
+                </a:solidFill>
+              </a:rPr>
+              <a:t>Dinâmica</a:t>
+            </a:r>
+            <a:r>
+              <a:rPr lang="en-US" b="1" dirty="0">
+                <a:solidFill>
+                  <a:srgbClr val="0070C0"/>
+                </a:solidFill>
+              </a:rPr>
+              <a:t>/</a:t>
+            </a:r>
+            <a:r>
+              <a:rPr lang="en-US" b="1" dirty="0" err="1">
+                <a:solidFill>
+                  <a:srgbClr val="0070C0"/>
+                </a:solidFill>
+              </a:rPr>
+              <a:t>Atividade</a:t>
+            </a:r>
+            <a:endParaRPr lang="en-US" b="1" dirty="0">
+              <a:solidFill>
+                <a:srgbClr val="0070C0"/>
+              </a:solidFill>
+            </a:endParaRPr>
+          </a:p>
+        </p:txBody>
+      </p:sp>
+      <p:sp>
+        <p:nvSpPr>
+          <p:cNvPr id="8" name="Text Placeholder 2">
+            <a:extLst>
+              <a:ext uri="{FF2B5EF4-FFF2-40B4-BE49-F238E27FC236}">
+                <a16:creationId xmlns:a16="http://schemas.microsoft.com/office/drawing/2014/main" id="{7EA8CF79-56BC-B200-D7A1-36B9285B005F}"/>
+              </a:ext>
+            </a:extLst>
+          </p:cNvPr>
+          <p:cNvSpPr>
+            <a:spLocks noGrp="1"/>
+          </p:cNvSpPr>
+          <p:nvPr>
+            <p:ph type="body" sz="half" idx="1"/>
+          </p:nvPr>
+        </p:nvSpPr>
+        <p:spPr>
+          <a:xfrm>
+            <a:off x="142865" y="1035050"/>
+            <a:ext cx="8865056" cy="3994150"/>
+          </a:xfrm>
+        </p:spPr>
+        <p:txBody>
+          <a:bodyPr>
+            <a:noAutofit/>
+          </a:bodyPr>
+          <a:lstStyle/>
+          <a:p>
+            <a:pPr marL="0" indent="0" algn="just">
+              <a:buNone/>
+            </a:pPr>
+            <a:r>
+              <a:rPr lang="pt-BR" sz="2000" b="1" dirty="0">
+                <a:solidFill>
+                  <a:schemeClr val="tx1"/>
+                </a:solidFill>
+                <a:latin typeface="Times New Roman" panose="02020603050405020304" pitchFamily="18" charset="0"/>
+                <a:cs typeface="Times New Roman" panose="02020603050405020304" pitchFamily="18" charset="0"/>
+              </a:rPr>
+              <a:t>Quais são os quatro níveis típicos de uma arquitetura SCADA e o que cada um representa?</a:t>
+            </a:r>
+          </a:p>
+          <a:p>
+            <a:pPr marL="0" indent="0" algn="just">
+              <a:buNone/>
+            </a:pPr>
+            <a:endParaRPr lang="pt-BR" sz="2000" dirty="0">
+              <a:solidFill>
+                <a:schemeClr val="tx1"/>
+              </a:solidFill>
+              <a:latin typeface="Times New Roman" panose="02020603050405020304" pitchFamily="18" charset="0"/>
+              <a:cs typeface="Times New Roman" panose="02020603050405020304" pitchFamily="18" charset="0"/>
+            </a:endParaRPr>
+          </a:p>
+          <a:p>
+            <a:pPr marL="0" indent="0" algn="just">
+              <a:buNone/>
+            </a:pPr>
+            <a:endParaRPr lang="pt-BR" sz="2000" dirty="0">
+              <a:solidFill>
+                <a:schemeClr val="tx1"/>
+              </a:solidFill>
+              <a:latin typeface="Times New Roman" panose="02020603050405020304" pitchFamily="18" charset="0"/>
+              <a:cs typeface="Times New Roman" panose="02020603050405020304" pitchFamily="18" charset="0"/>
+            </a:endParaRPr>
+          </a:p>
+          <a:p>
+            <a:pPr marL="0" indent="0" algn="just">
+              <a:buNone/>
+            </a:pPr>
+            <a:endParaRPr lang="pt-BR" sz="2000" dirty="0">
+              <a:solidFill>
+                <a:schemeClr val="tx1"/>
+              </a:solidFill>
+              <a:latin typeface="Times New Roman" panose="02020603050405020304" pitchFamily="18" charset="0"/>
+              <a:cs typeface="Times New Roman" panose="02020603050405020304" pitchFamily="18" charset="0"/>
+            </a:endParaRPr>
+          </a:p>
+        </p:txBody>
+      </p:sp>
+      <p:pic>
+        <p:nvPicPr>
+          <p:cNvPr id="3" name="Imagem 2">
+            <a:extLst>
+              <a:ext uri="{FF2B5EF4-FFF2-40B4-BE49-F238E27FC236}">
+                <a16:creationId xmlns:a16="http://schemas.microsoft.com/office/drawing/2014/main" id="{4C081D7E-6EF7-45C5-640B-AFC2E3124335}"/>
+              </a:ext>
+            </a:extLst>
+          </p:cNvPr>
+          <p:cNvPicPr>
+            <a:picLocks noChangeAspect="1"/>
+          </p:cNvPicPr>
+          <p:nvPr/>
+        </p:nvPicPr>
+        <p:blipFill>
+          <a:blip r:embed="rId3"/>
+          <a:stretch>
+            <a:fillRect/>
+          </a:stretch>
+        </p:blipFill>
+        <p:spPr>
+          <a:xfrm>
+            <a:off x="603160" y="1892301"/>
+            <a:ext cx="7937680" cy="2426418"/>
+          </a:xfrm>
+          <a:prstGeom prst="rect">
+            <a:avLst/>
+          </a:prstGeom>
+        </p:spPr>
+      </p:pic>
+    </p:spTree>
+    <p:extLst>
+      <p:ext uri="{BB962C8B-B14F-4D97-AF65-F5344CB8AC3E}">
+        <p14:creationId xmlns:p14="http://schemas.microsoft.com/office/powerpoint/2010/main" val="701944209"/>
+      </p:ext>
+    </p:extLst>
+  </p:cSld>
+  <p:clrMapOvr>
+    <a:masterClrMapping/>
+  </p:clrMapOvr>
+  <p:transition spd="med"/>
+</p:sld>
+</file>
+
+<file path=ppt/slides/slide12.xml><?xml version="1.0" encoding="utf-8"?>
+<p:sld xmlns:a="http://schemas.openxmlformats.org/drawingml/2006/main" xmlns:r="http://schemas.openxmlformats.org/officeDocument/2006/relationships" xmlns:p="http://schemas.openxmlformats.org/presentationml/2006/main">
+  <p:cSld>
+    <p:spTree>
+      <p:nvGrpSpPr>
+        <p:cNvPr id="1" name="">
+          <a:extLst>
+            <a:ext uri="{FF2B5EF4-FFF2-40B4-BE49-F238E27FC236}">
+              <a16:creationId xmlns:a16="http://schemas.microsoft.com/office/drawing/2014/main" id="{28DF298F-EFBE-CB24-F09C-76F4B42AE362}"/>
+            </a:ext>
+          </a:extLst>
+        </p:cNvPr>
+        <p:cNvGrpSpPr/>
+        <p:nvPr/>
+      </p:nvGrpSpPr>
+      <p:grpSpPr>
+        <a:xfrm>
+          <a:off x="0" y="0"/>
+          <a:ext cx="0" cy="0"/>
+          <a:chOff x="0" y="0"/>
+          <a:chExt cx="0" cy="0"/>
+        </a:xfrm>
+      </p:grpSpPr>
+      <p:sp>
+        <p:nvSpPr>
+          <p:cNvPr id="6" name="Title 1">
+            <a:extLst>
+              <a:ext uri="{FF2B5EF4-FFF2-40B4-BE49-F238E27FC236}">
+                <a16:creationId xmlns:a16="http://schemas.microsoft.com/office/drawing/2014/main" id="{CF26F109-E2AC-20E0-7085-E832237DBC57}"/>
+              </a:ext>
+            </a:extLst>
+          </p:cNvPr>
+          <p:cNvSpPr>
+            <a:spLocks noGrp="1"/>
+          </p:cNvSpPr>
+          <p:nvPr>
+            <p:ph type="title"/>
+          </p:nvPr>
+        </p:nvSpPr>
+        <p:spPr>
+          <a:xfrm>
+            <a:off x="457200" y="205980"/>
+            <a:ext cx="8229600" cy="857251"/>
+          </a:xfrm>
+        </p:spPr>
+        <p:txBody>
+          <a:bodyPr>
+            <a:normAutofit/>
+          </a:bodyPr>
+          <a:lstStyle/>
+          <a:p>
+            <a:r>
+              <a:rPr lang="en-US" b="1" dirty="0" err="1">
+                <a:solidFill>
+                  <a:srgbClr val="0070C0"/>
+                </a:solidFill>
+              </a:rPr>
+              <a:t>Dinâmica</a:t>
+            </a:r>
+            <a:r>
+              <a:rPr lang="en-US" b="1" dirty="0">
+                <a:solidFill>
+                  <a:srgbClr val="0070C0"/>
+                </a:solidFill>
+              </a:rPr>
+              <a:t>/</a:t>
+            </a:r>
+            <a:r>
+              <a:rPr lang="en-US" b="1" dirty="0" err="1">
+                <a:solidFill>
+                  <a:srgbClr val="0070C0"/>
+                </a:solidFill>
+              </a:rPr>
+              <a:t>Atividade</a:t>
+            </a:r>
+            <a:endParaRPr lang="en-US" b="1" dirty="0">
+              <a:solidFill>
+                <a:srgbClr val="0070C0"/>
+              </a:solidFill>
+            </a:endParaRPr>
+          </a:p>
+        </p:txBody>
+      </p:sp>
+      <p:sp>
+        <p:nvSpPr>
+          <p:cNvPr id="8" name="Text Placeholder 2">
+            <a:extLst>
+              <a:ext uri="{FF2B5EF4-FFF2-40B4-BE49-F238E27FC236}">
+                <a16:creationId xmlns:a16="http://schemas.microsoft.com/office/drawing/2014/main" id="{19885E90-B5F1-44A2-A655-EB1D1FDCCA21}"/>
+              </a:ext>
+            </a:extLst>
+          </p:cNvPr>
+          <p:cNvSpPr>
+            <a:spLocks noGrp="1"/>
+          </p:cNvSpPr>
+          <p:nvPr>
+            <p:ph type="body" sz="half" idx="1"/>
+          </p:nvPr>
+        </p:nvSpPr>
+        <p:spPr>
+          <a:xfrm>
+            <a:off x="142865" y="1035050"/>
+            <a:ext cx="8865056" cy="3994150"/>
+          </a:xfrm>
+        </p:spPr>
+        <p:txBody>
+          <a:bodyPr>
+            <a:noAutofit/>
+          </a:bodyPr>
+          <a:lstStyle/>
+          <a:p>
+            <a:pPr marL="0" indent="0" algn="just">
+              <a:buNone/>
+            </a:pPr>
+            <a:r>
+              <a:rPr lang="pt-BR" sz="2200" b="1" dirty="0">
+                <a:solidFill>
+                  <a:srgbClr val="FF0000"/>
+                </a:solidFill>
+                <a:latin typeface="Times New Roman" panose="02020603050405020304" pitchFamily="18" charset="0"/>
+                <a:cs typeface="Times New Roman" panose="02020603050405020304" pitchFamily="18" charset="0"/>
+              </a:rPr>
+              <a:t>Simulação de CLP + SCADA - Utilizar softwares como</a:t>
+            </a:r>
+            <a:r>
+              <a:rPr lang="pt-BR" sz="2200" dirty="0">
+                <a:solidFill>
+                  <a:schemeClr val="tx1"/>
+                </a:solidFill>
+                <a:latin typeface="Times New Roman" panose="02020603050405020304" pitchFamily="18" charset="0"/>
+                <a:cs typeface="Times New Roman" panose="02020603050405020304" pitchFamily="18" charset="0"/>
+              </a:rPr>
+              <a:t>:</a:t>
+            </a:r>
+          </a:p>
+          <a:p>
+            <a:pPr algn="just"/>
+            <a:r>
+              <a:rPr lang="pt-BR" sz="2200" dirty="0">
+                <a:solidFill>
+                  <a:schemeClr val="tx1"/>
+                </a:solidFill>
+                <a:latin typeface="Times New Roman" panose="02020603050405020304" pitchFamily="18" charset="0"/>
+                <a:cs typeface="Times New Roman" panose="02020603050405020304" pitchFamily="18" charset="0"/>
+              </a:rPr>
+              <a:t>CODESYS ou TIA Portal (programação de CLP)</a:t>
+            </a:r>
+          </a:p>
+          <a:p>
+            <a:pPr algn="just"/>
+            <a:r>
+              <a:rPr lang="pt-BR" sz="2200" dirty="0" err="1">
+                <a:solidFill>
+                  <a:schemeClr val="tx1"/>
+                </a:solidFill>
+                <a:latin typeface="Times New Roman" panose="02020603050405020304" pitchFamily="18" charset="0"/>
+                <a:cs typeface="Times New Roman" panose="02020603050405020304" pitchFamily="18" charset="0"/>
+              </a:rPr>
+              <a:t>FactoryTalk</a:t>
+            </a:r>
+            <a:r>
+              <a:rPr lang="pt-BR" sz="2200" dirty="0">
+                <a:solidFill>
+                  <a:schemeClr val="tx1"/>
+                </a:solidFill>
+                <a:latin typeface="Times New Roman" panose="02020603050405020304" pitchFamily="18" charset="0"/>
+                <a:cs typeface="Times New Roman" panose="02020603050405020304" pitchFamily="18" charset="0"/>
+              </a:rPr>
+              <a:t> </a:t>
+            </a:r>
+            <a:r>
+              <a:rPr lang="pt-BR" sz="2200" dirty="0" err="1">
+                <a:solidFill>
+                  <a:schemeClr val="tx1"/>
+                </a:solidFill>
+                <a:latin typeface="Times New Roman" panose="02020603050405020304" pitchFamily="18" charset="0"/>
+                <a:cs typeface="Times New Roman" panose="02020603050405020304" pitchFamily="18" charset="0"/>
+              </a:rPr>
+              <a:t>View</a:t>
+            </a:r>
+            <a:r>
+              <a:rPr lang="pt-BR" sz="2200" dirty="0">
+                <a:solidFill>
+                  <a:schemeClr val="tx1"/>
+                </a:solidFill>
+                <a:latin typeface="Times New Roman" panose="02020603050405020304" pitchFamily="18" charset="0"/>
+                <a:cs typeface="Times New Roman" panose="02020603050405020304" pitchFamily="18" charset="0"/>
+              </a:rPr>
+              <a:t> ou </a:t>
+            </a:r>
+            <a:r>
+              <a:rPr lang="pt-BR" sz="2200" dirty="0" err="1">
+                <a:solidFill>
+                  <a:schemeClr val="tx1"/>
+                </a:solidFill>
+                <a:latin typeface="Times New Roman" panose="02020603050405020304" pitchFamily="18" charset="0"/>
+                <a:cs typeface="Times New Roman" panose="02020603050405020304" pitchFamily="18" charset="0"/>
+              </a:rPr>
+              <a:t>Ignition</a:t>
+            </a:r>
+            <a:r>
+              <a:rPr lang="pt-BR" sz="2200" dirty="0">
+                <a:solidFill>
+                  <a:schemeClr val="tx1"/>
+                </a:solidFill>
+                <a:latin typeface="Times New Roman" panose="02020603050405020304" pitchFamily="18" charset="0"/>
+                <a:cs typeface="Times New Roman" panose="02020603050405020304" pitchFamily="18" charset="0"/>
+              </a:rPr>
+              <a:t> (SCADA)</a:t>
+            </a:r>
+          </a:p>
+          <a:p>
+            <a:pPr marL="0" indent="0" algn="just">
+              <a:buNone/>
+            </a:pPr>
+            <a:endParaRPr lang="pt-BR" sz="2200" dirty="0">
+              <a:solidFill>
+                <a:schemeClr val="tx1"/>
+              </a:solidFill>
+              <a:latin typeface="Times New Roman" panose="02020603050405020304" pitchFamily="18" charset="0"/>
+              <a:cs typeface="Times New Roman" panose="02020603050405020304" pitchFamily="18" charset="0"/>
+            </a:endParaRPr>
+          </a:p>
+          <a:p>
+            <a:pPr marL="0" indent="0" algn="just">
+              <a:buNone/>
+            </a:pPr>
+            <a:r>
+              <a:rPr lang="pt-BR" sz="2200" b="1" dirty="0">
+                <a:solidFill>
+                  <a:srgbClr val="FF0000"/>
+                </a:solidFill>
+                <a:latin typeface="Times New Roman" panose="02020603050405020304" pitchFamily="18" charset="0"/>
+                <a:cs typeface="Times New Roman" panose="02020603050405020304" pitchFamily="18" charset="0"/>
+              </a:rPr>
+              <a:t>Desafio</a:t>
+            </a:r>
+            <a:r>
+              <a:rPr lang="pt-BR" sz="2200" b="1" dirty="0">
+                <a:solidFill>
+                  <a:schemeClr val="tx1"/>
+                </a:solidFill>
+                <a:latin typeface="Times New Roman" panose="02020603050405020304" pitchFamily="18" charset="0"/>
+                <a:cs typeface="Times New Roman" panose="02020603050405020304" pitchFamily="18" charset="0"/>
+              </a:rPr>
+              <a:t> - Criar projeto, botão ativa lâmpada/visualização IHM/SCADA</a:t>
+            </a:r>
+            <a:r>
+              <a:rPr lang="pt-BR" sz="2200" dirty="0">
+                <a:solidFill>
+                  <a:schemeClr val="tx1"/>
+                </a:solidFill>
+                <a:latin typeface="Times New Roman" panose="02020603050405020304" pitchFamily="18" charset="0"/>
+                <a:cs typeface="Times New Roman" panose="02020603050405020304" pitchFamily="18" charset="0"/>
+              </a:rPr>
+              <a:t>:</a:t>
+            </a:r>
+          </a:p>
+          <a:p>
+            <a:pPr algn="just"/>
+            <a:r>
+              <a:rPr lang="pt-BR" sz="2200" dirty="0">
+                <a:solidFill>
+                  <a:schemeClr val="tx1"/>
+                </a:solidFill>
+                <a:latin typeface="Times New Roman" panose="02020603050405020304" pitchFamily="18" charset="0"/>
+                <a:cs typeface="Times New Roman" panose="02020603050405020304" pitchFamily="18" charset="0"/>
+              </a:rPr>
+              <a:t>Um botão (</a:t>
+            </a:r>
+            <a:r>
+              <a:rPr lang="pt-BR" sz="2200" b="1" dirty="0">
+                <a:solidFill>
+                  <a:schemeClr val="tx1"/>
+                </a:solidFill>
+                <a:latin typeface="Times New Roman" panose="02020603050405020304" pitchFamily="18" charset="0"/>
+                <a:cs typeface="Times New Roman" panose="02020603050405020304" pitchFamily="18" charset="0"/>
+              </a:rPr>
+              <a:t>entrada digital</a:t>
+            </a:r>
+            <a:r>
+              <a:rPr lang="pt-BR" sz="2200" dirty="0">
+                <a:solidFill>
+                  <a:schemeClr val="tx1"/>
+                </a:solidFill>
+                <a:latin typeface="Times New Roman" panose="02020603050405020304" pitchFamily="18" charset="0"/>
+                <a:cs typeface="Times New Roman" panose="02020603050405020304" pitchFamily="18" charset="0"/>
+              </a:rPr>
+              <a:t>);</a:t>
+            </a:r>
+          </a:p>
+          <a:p>
+            <a:pPr algn="just"/>
+            <a:r>
+              <a:rPr lang="pt-BR" sz="2200" dirty="0">
+                <a:solidFill>
+                  <a:schemeClr val="tx1"/>
+                </a:solidFill>
+                <a:latin typeface="Times New Roman" panose="02020603050405020304" pitchFamily="18" charset="0"/>
+                <a:cs typeface="Times New Roman" panose="02020603050405020304" pitchFamily="18" charset="0"/>
+              </a:rPr>
+              <a:t>Uma lâmpada (</a:t>
+            </a:r>
+            <a:r>
+              <a:rPr lang="pt-BR" sz="2200" b="1" dirty="0">
+                <a:solidFill>
+                  <a:srgbClr val="FF0000"/>
+                </a:solidFill>
+                <a:latin typeface="Times New Roman" panose="02020603050405020304" pitchFamily="18" charset="0"/>
+                <a:cs typeface="Times New Roman" panose="02020603050405020304" pitchFamily="18" charset="0"/>
+              </a:rPr>
+              <a:t>saída digital</a:t>
+            </a:r>
+            <a:r>
+              <a:rPr lang="pt-BR" sz="2200" dirty="0">
+                <a:solidFill>
+                  <a:schemeClr val="tx1"/>
+                </a:solidFill>
+                <a:latin typeface="Times New Roman" panose="02020603050405020304" pitchFamily="18" charset="0"/>
+                <a:cs typeface="Times New Roman" panose="02020603050405020304" pitchFamily="18" charset="0"/>
+              </a:rPr>
+              <a:t>);</a:t>
+            </a:r>
+          </a:p>
+          <a:p>
+            <a:pPr algn="just"/>
+            <a:r>
+              <a:rPr lang="pt-BR" sz="2200" dirty="0">
+                <a:solidFill>
+                  <a:schemeClr val="tx1"/>
+                </a:solidFill>
+                <a:latin typeface="Times New Roman" panose="02020603050405020304" pitchFamily="18" charset="0"/>
+                <a:cs typeface="Times New Roman" panose="02020603050405020304" pitchFamily="18" charset="0"/>
+              </a:rPr>
+              <a:t>Monitoramento do estado via tela SCADA.</a:t>
+            </a:r>
+          </a:p>
+        </p:txBody>
+      </p:sp>
+    </p:spTree>
+    <p:extLst>
+      <p:ext uri="{BB962C8B-B14F-4D97-AF65-F5344CB8AC3E}">
+        <p14:creationId xmlns:p14="http://schemas.microsoft.com/office/powerpoint/2010/main" val="3475846920"/>
+      </p:ext>
+    </p:extLst>
+  </p:cSld>
+  <p:clrMapOvr>
+    <a:masterClrMapping/>
+  </p:clrMapOvr>
+  <p:transition spd="med"/>
+</p:sld>
+</file>
+
+<file path=ppt/slides/slide13.xml><?xml version="1.0" encoding="utf-8"?>
+<p:sld xmlns:a="http://schemas.openxmlformats.org/drawingml/2006/main" xmlns:r="http://schemas.openxmlformats.org/officeDocument/2006/relationships" xmlns:p="http://schemas.openxmlformats.org/presentationml/2006/main">
+  <p:cSld>
+    <p:spTree>
+      <p:nvGrpSpPr>
+        <p:cNvPr id="1" name=""/>
+        <p:cNvGrpSpPr/>
+        <p:nvPr/>
+      </p:nvGrpSpPr>
+      <p:grpSpPr>
+        <a:xfrm>
+          <a:off x="0" y="0"/>
+          <a:ext cx="0" cy="0"/>
+          <a:chOff x="0" y="0"/>
+          <a:chExt cx="0" cy="0"/>
+        </a:xfrm>
+      </p:grpSpPr>
+      <p:sp>
+        <p:nvSpPr>
+          <p:cNvPr id="6" name="Title 1"/>
+          <p:cNvSpPr>
+            <a:spLocks noGrp="1"/>
+          </p:cNvSpPr>
+          <p:nvPr>
+            <p:ph type="title"/>
+          </p:nvPr>
+        </p:nvSpPr>
+        <p:spPr>
+          <a:xfrm>
+            <a:off x="457200" y="205980"/>
+            <a:ext cx="8229600" cy="857251"/>
+          </a:xfrm>
+        </p:spPr>
+        <p:txBody>
+          <a:bodyPr>
+            <a:normAutofit/>
+          </a:bodyPr>
+          <a:lstStyle/>
+          <a:p>
+            <a:r>
+              <a:rPr lang="en-US" b="1" dirty="0" err="1">
+                <a:solidFill>
+                  <a:srgbClr val="0070C0"/>
+                </a:solidFill>
+              </a:rPr>
+              <a:t>Referências</a:t>
+            </a:r>
+            <a:r>
+              <a:rPr lang="en-US" b="1" dirty="0">
+                <a:solidFill>
+                  <a:srgbClr val="0070C0"/>
+                </a:solidFill>
+              </a:rPr>
+              <a:t> </a:t>
+            </a:r>
+            <a:r>
+              <a:rPr lang="en-US" b="1" dirty="0" err="1">
+                <a:solidFill>
+                  <a:srgbClr val="0070C0"/>
+                </a:solidFill>
+              </a:rPr>
+              <a:t>Bibliográficas</a:t>
+            </a:r>
+            <a:endParaRPr lang="en-US" b="1" dirty="0">
+              <a:solidFill>
+                <a:srgbClr val="0070C0"/>
+              </a:solidFill>
+            </a:endParaRPr>
+          </a:p>
+        </p:txBody>
+      </p:sp>
+      <p:sp>
+        <p:nvSpPr>
+          <p:cNvPr id="8" name="Text Placeholder 2"/>
+          <p:cNvSpPr>
+            <a:spLocks noGrp="1"/>
+          </p:cNvSpPr>
+          <p:nvPr>
+            <p:ph type="body" sz="half" idx="1"/>
+          </p:nvPr>
+        </p:nvSpPr>
+        <p:spPr>
+          <a:xfrm>
+            <a:off x="139472" y="1063230"/>
+            <a:ext cx="8865056" cy="3874289"/>
+          </a:xfrm>
+        </p:spPr>
+        <p:txBody>
+          <a:bodyPr>
+            <a:noAutofit/>
+          </a:bodyPr>
+          <a:lstStyle/>
+          <a:p>
+            <a:pPr marL="0" indent="0" algn="just">
+              <a:buNone/>
+            </a:pPr>
+            <a:endParaRPr lang="pt-BR" sz="2200" dirty="0">
+              <a:latin typeface="Times New Roman" panose="02020603050405020304" pitchFamily="18" charset="0"/>
+              <a:cs typeface="Times New Roman" panose="02020603050405020304" pitchFamily="18" charset="0"/>
+            </a:endParaRPr>
+          </a:p>
+          <a:p>
+            <a:pPr marL="0" indent="0" algn="just">
+              <a:buNone/>
+            </a:pPr>
+            <a:r>
+              <a:rPr lang="pt-BR" sz="2200" dirty="0">
+                <a:latin typeface="Times New Roman" panose="02020603050405020304" pitchFamily="18" charset="0"/>
+                <a:cs typeface="Times New Roman" panose="02020603050405020304" pitchFamily="18" charset="0"/>
+              </a:rPr>
+              <a:t>[1] </a:t>
+            </a:r>
+            <a:r>
+              <a:rPr lang="pt-BR" sz="2200" b="1" dirty="0">
+                <a:solidFill>
+                  <a:schemeClr val="tx1"/>
+                </a:solidFill>
+                <a:latin typeface="Times New Roman" panose="02020603050405020304" pitchFamily="18" charset="0"/>
+                <a:cs typeface="Times New Roman" panose="02020603050405020304" pitchFamily="18" charset="0"/>
+              </a:rPr>
+              <a:t>SANTOS, Fabrício Teixeira dos; MARINATO, Matheus Mariano. </a:t>
+            </a:r>
+            <a:r>
+              <a:rPr lang="pt-BR" sz="2200" dirty="0">
+                <a:latin typeface="Times New Roman" panose="02020603050405020304" pitchFamily="18" charset="0"/>
+                <a:cs typeface="Times New Roman" panose="02020603050405020304" pitchFamily="18" charset="0"/>
+              </a:rPr>
+              <a:t>SISTEMA SUPERVISÓRIO. 2021.</a:t>
+            </a:r>
+          </a:p>
+          <a:p>
+            <a:pPr marL="0" indent="0" algn="just">
+              <a:buNone/>
+            </a:pPr>
+            <a:endParaRPr lang="en-US" sz="2200" dirty="0">
+              <a:latin typeface="Times New Roman" panose="02020603050405020304" pitchFamily="18" charset="0"/>
+              <a:cs typeface="Times New Roman" panose="02020603050405020304" pitchFamily="18" charset="0"/>
+            </a:endParaRPr>
+          </a:p>
+          <a:p>
+            <a:pPr marL="0" indent="0" algn="just">
+              <a:buNone/>
+            </a:pPr>
+            <a:endParaRPr lang="en-US" sz="2200" dirty="0">
+              <a:latin typeface="Times New Roman" panose="02020603050405020304" pitchFamily="18" charset="0"/>
+              <a:cs typeface="Times New Roman" panose="02020603050405020304" pitchFamily="18" charset="0"/>
+            </a:endParaRPr>
+          </a:p>
+          <a:p>
+            <a:pPr marL="0" indent="0" algn="just">
+              <a:buNone/>
+            </a:pPr>
+            <a:r>
+              <a:rPr lang="pt-BR" sz="2200" dirty="0">
+                <a:latin typeface="Times New Roman" panose="02020603050405020304" pitchFamily="18" charset="0"/>
+                <a:cs typeface="Times New Roman" panose="02020603050405020304" pitchFamily="18" charset="0"/>
+              </a:rPr>
+              <a:t>[2] </a:t>
+            </a:r>
+            <a:r>
+              <a:rPr lang="pt-BR" sz="2200" b="1" dirty="0">
+                <a:latin typeface="Times New Roman" panose="02020603050405020304" pitchFamily="18" charset="0"/>
+                <a:cs typeface="Times New Roman" panose="02020603050405020304" pitchFamily="18" charset="0"/>
+              </a:rPr>
+              <a:t>ZANGHI, Eric.</a:t>
+            </a:r>
+            <a:r>
+              <a:rPr lang="pt-BR" sz="2200" dirty="0">
+                <a:latin typeface="Times New Roman" panose="02020603050405020304" pitchFamily="18" charset="0"/>
+                <a:cs typeface="Times New Roman" panose="02020603050405020304" pitchFamily="18" charset="0"/>
+              </a:rPr>
+              <a:t> Sistemas SCADA: Conceitos. Proteção e Comunicação de Sistemas Elétricos de Potência, 2019.</a:t>
+            </a:r>
+            <a:endParaRPr lang="pt-BR" sz="2200" b="1" dirty="0">
+              <a:latin typeface="Times New Roman" panose="02020603050405020304" pitchFamily="18" charset="0"/>
+              <a:cs typeface="Times New Roman" panose="02020603050405020304" pitchFamily="18" charset="0"/>
+            </a:endParaRPr>
+          </a:p>
+        </p:txBody>
+      </p:sp>
+    </p:spTree>
+    <p:extLst>
+      <p:ext uri="{BB962C8B-B14F-4D97-AF65-F5344CB8AC3E}">
+        <p14:creationId xmlns:p14="http://schemas.microsoft.com/office/powerpoint/2010/main" val="1115311843"/>
+      </p:ext>
+    </p:extLst>
+  </p:cSld>
+  <p:clrMapOvr>
+    <a:masterClrMapping/>
+  </p:clrMapOvr>
+  <p:transition spd="med"/>
+</p:sld>
+</file>
+
+<file path=ppt/slides/slide14.xml><?xml version="1.0" encoding="utf-8"?>
+<p:sld xmlns:a="http://schemas.openxmlformats.org/drawingml/2006/main" xmlns:r="http://schemas.openxmlformats.org/officeDocument/2006/relationships" xmlns:p="http://schemas.openxmlformats.org/presentationml/2006/main">
+  <p:cSld>
+    <p:spTree>
+      <p:nvGrpSpPr>
+        <p:cNvPr id="1" name=""/>
+        <p:cNvGrpSpPr/>
+        <p:nvPr/>
+      </p:nvGrpSpPr>
+      <p:grpSpPr>
+        <a:xfrm>
+          <a:off x="0" y="0"/>
+          <a:ext cx="0" cy="0"/>
+          <a:chOff x="0" y="0"/>
+          <a:chExt cx="0" cy="0"/>
+        </a:xfrm>
+      </p:grpSpPr>
+      <p:pic>
+        <p:nvPicPr>
+          <p:cNvPr id="112" name="Picture 6" descr="Picture 6"/>
+          <p:cNvPicPr>
+            <a:picLocks noChangeAspect="1"/>
+          </p:cNvPicPr>
+          <p:nvPr/>
+        </p:nvPicPr>
+        <p:blipFill>
+          <a:blip r:embed="rId2"/>
+          <a:stretch>
+            <a:fillRect/>
+          </a:stretch>
+        </p:blipFill>
+        <p:spPr>
+          <a:xfrm>
+            <a:off x="0" y="0"/>
+            <a:ext cx="9144000" cy="5143500"/>
+          </a:xfrm>
+          <a:prstGeom prst="rect">
+            <a:avLst/>
+          </a:prstGeom>
+          <a:ln w="12700">
+            <a:miter lim="400000"/>
+            <a:headEnd/>
+            <a:tailEnd/>
+          </a:ln>
+        </p:spPr>
+      </p:pic>
+      <p:pic>
+        <p:nvPicPr>
+          <p:cNvPr id="114" name="Picture 5" descr="Picture 5"/>
+          <p:cNvPicPr>
+            <a:picLocks noChangeAspect="1"/>
+          </p:cNvPicPr>
+          <p:nvPr/>
+        </p:nvPicPr>
+        <p:blipFill>
+          <a:blip r:embed="rId3"/>
+          <a:stretch>
+            <a:fillRect/>
+          </a:stretch>
+        </p:blipFill>
+        <p:spPr>
+          <a:xfrm>
+            <a:off x="469900" y="0"/>
+            <a:ext cx="4391984" cy="171450"/>
+          </a:xfrm>
+          <a:prstGeom prst="rect">
+            <a:avLst/>
+          </a:prstGeom>
+          <a:ln w="12700">
+            <a:miter lim="400000"/>
+            <a:headEnd/>
+            <a:tailEnd/>
+          </a:ln>
+        </p:spPr>
+      </p:pic>
+      <p:sp>
+        <p:nvSpPr>
+          <p:cNvPr id="3" name="Título 2"/>
+          <p:cNvSpPr>
+            <a:spLocks noGrp="1"/>
+          </p:cNvSpPr>
+          <p:nvPr>
+            <p:ph type="title"/>
+          </p:nvPr>
+        </p:nvSpPr>
+        <p:spPr>
+          <a:xfrm>
+            <a:off x="285751" y="2386770"/>
+            <a:ext cx="8615364" cy="1102519"/>
+          </a:xfrm>
+        </p:spPr>
+        <p:txBody>
+          <a:bodyPr>
+            <a:noAutofit/>
+          </a:bodyPr>
+          <a:lstStyle/>
+          <a:p>
+            <a:r>
+              <a:rPr lang="pt-BR" sz="4800" b="1" dirty="0">
+                <a:solidFill>
+                  <a:schemeClr val="bg1"/>
+                </a:solidFill>
+              </a:rPr>
+              <a:t>Controladores Lógicos e Programáveis (CLP)</a:t>
+            </a:r>
+          </a:p>
+        </p:txBody>
+      </p:sp>
+      <p:sp>
+        <p:nvSpPr>
+          <p:cNvPr id="6" name="Título 2"/>
+          <p:cNvSpPr txBox="1"/>
+          <p:nvPr/>
+        </p:nvSpPr>
+        <p:spPr>
+          <a:xfrm>
+            <a:off x="975683" y="3866663"/>
+            <a:ext cx="7772400" cy="1102519"/>
+          </a:xfrm>
+          <a:prstGeom prst="rect">
+            <a:avLst/>
+          </a:prstGeom>
+          <a:ln w="12700">
+            <a:miter lim="400000"/>
+          </a:ln>
+        </p:spPr>
+        <p:txBody>
+          <a:bodyPr lIns="45718" tIns="45718" rIns="45718" bIns="45718" anchor="ctr">
+            <a:noAutofit/>
+          </a:bodyPr>
+          <a:lstStyle>
+            <a:lvl1pPr marL="0" marR="0" indent="0" algn="ctr" defTabSz="457200" rtl="0" latinLnBrk="0">
+              <a:lnSpc>
+                <a:spcPct val="100000"/>
+              </a:lnSpc>
+              <a:spcBef>
+                <a:spcPts val="0"/>
+              </a:spcBef>
+              <a:spcAft>
+                <a:spcPts val="0"/>
+              </a:spcAft>
+              <a:buClrTx/>
+              <a:buSzTx/>
+              <a:buFontTx/>
+              <a:buNone/>
+              <a:defRPr sz="4400" b="0" i="0" u="none" strike="noStrike" cap="none" spc="0" baseline="0">
+                <a:ln>
+                  <a:noFill/>
+                </a:ln>
+                <a:solidFill>
+                  <a:srgbClr val="000000"/>
+                </a:solidFill>
+                <a:uFillTx/>
+                <a:latin typeface="+mj-lt"/>
+                <a:ea typeface="+mj-ea"/>
+                <a:cs typeface="+mj-cs"/>
+                <a:sym typeface="Calibri"/>
+              </a:defRPr>
+            </a:lvl1pPr>
+            <a:lvl2pPr marL="0" marR="0" indent="0" algn="ctr" defTabSz="457200" rtl="0" latinLnBrk="0">
+              <a:lnSpc>
+                <a:spcPct val="100000"/>
+              </a:lnSpc>
+              <a:spcBef>
+                <a:spcPts val="0"/>
+              </a:spcBef>
+              <a:spcAft>
+                <a:spcPts val="0"/>
+              </a:spcAft>
+              <a:buClrTx/>
+              <a:buSzTx/>
+              <a:buFontTx/>
+              <a:buNone/>
+              <a:defRPr sz="4400" b="0" i="0" u="none" strike="noStrike" cap="none" spc="0" baseline="0">
+                <a:ln>
+                  <a:noFill/>
+                </a:ln>
+                <a:solidFill>
+                  <a:srgbClr val="000000"/>
+                </a:solidFill>
+                <a:uFillTx/>
+                <a:latin typeface="+mj-lt"/>
+                <a:ea typeface="+mj-ea"/>
+                <a:cs typeface="+mj-cs"/>
+                <a:sym typeface="Calibri"/>
+              </a:defRPr>
+            </a:lvl2pPr>
+            <a:lvl3pPr marL="0" marR="0" indent="0" algn="ctr" defTabSz="457200" rtl="0" latinLnBrk="0">
+              <a:lnSpc>
+                <a:spcPct val="100000"/>
+              </a:lnSpc>
+              <a:spcBef>
+                <a:spcPts val="0"/>
+              </a:spcBef>
+              <a:spcAft>
+                <a:spcPts val="0"/>
+              </a:spcAft>
+              <a:buClrTx/>
+              <a:buSzTx/>
+              <a:buFontTx/>
+              <a:buNone/>
+              <a:defRPr sz="4400" b="0" i="0" u="none" strike="noStrike" cap="none" spc="0" baseline="0">
+                <a:ln>
+                  <a:noFill/>
+                </a:ln>
+                <a:solidFill>
+                  <a:srgbClr val="000000"/>
+                </a:solidFill>
+                <a:uFillTx/>
+                <a:latin typeface="+mj-lt"/>
+                <a:ea typeface="+mj-ea"/>
+                <a:cs typeface="+mj-cs"/>
+                <a:sym typeface="Calibri"/>
+              </a:defRPr>
+            </a:lvl3pPr>
+            <a:lvl4pPr marL="0" marR="0" indent="0" algn="ctr" defTabSz="457200" rtl="0" latinLnBrk="0">
+              <a:lnSpc>
+                <a:spcPct val="100000"/>
+              </a:lnSpc>
+              <a:spcBef>
+                <a:spcPts val="0"/>
+              </a:spcBef>
+              <a:spcAft>
+                <a:spcPts val="0"/>
+              </a:spcAft>
+              <a:buClrTx/>
+              <a:buSzTx/>
+              <a:buFontTx/>
+              <a:buNone/>
+              <a:defRPr sz="4400" b="0" i="0" u="none" strike="noStrike" cap="none" spc="0" baseline="0">
+                <a:ln>
+                  <a:noFill/>
+                </a:ln>
+                <a:solidFill>
+                  <a:srgbClr val="000000"/>
+                </a:solidFill>
+                <a:uFillTx/>
+                <a:latin typeface="+mj-lt"/>
+                <a:ea typeface="+mj-ea"/>
+                <a:cs typeface="+mj-cs"/>
+                <a:sym typeface="Calibri"/>
+              </a:defRPr>
+            </a:lvl4pPr>
+            <a:lvl5pPr marL="0" marR="0" indent="0" algn="ctr" defTabSz="457200" rtl="0" latinLnBrk="0">
+              <a:lnSpc>
+                <a:spcPct val="100000"/>
+              </a:lnSpc>
+              <a:spcBef>
+                <a:spcPts val="0"/>
+              </a:spcBef>
+              <a:spcAft>
+                <a:spcPts val="0"/>
+              </a:spcAft>
+              <a:buClrTx/>
+              <a:buSzTx/>
+              <a:buFontTx/>
+              <a:buNone/>
+              <a:defRPr sz="4400" b="0" i="0" u="none" strike="noStrike" cap="none" spc="0" baseline="0">
+                <a:ln>
+                  <a:noFill/>
+                </a:ln>
+                <a:solidFill>
+                  <a:srgbClr val="000000"/>
+                </a:solidFill>
+                <a:uFillTx/>
+                <a:latin typeface="+mj-lt"/>
+                <a:ea typeface="+mj-ea"/>
+                <a:cs typeface="+mj-cs"/>
+                <a:sym typeface="Calibri"/>
+              </a:defRPr>
+            </a:lvl5pPr>
+            <a:lvl6pPr marL="0" marR="0" indent="0" algn="ctr" defTabSz="457200" rtl="0" latinLnBrk="0">
+              <a:lnSpc>
+                <a:spcPct val="100000"/>
+              </a:lnSpc>
+              <a:spcBef>
+                <a:spcPts val="0"/>
+              </a:spcBef>
+              <a:spcAft>
+                <a:spcPts val="0"/>
+              </a:spcAft>
+              <a:buClrTx/>
+              <a:buSzTx/>
+              <a:buFontTx/>
+              <a:buNone/>
+              <a:defRPr sz="4400" b="0" i="0" u="none" strike="noStrike" cap="none" spc="0" baseline="0">
+                <a:ln>
+                  <a:noFill/>
+                </a:ln>
+                <a:solidFill>
+                  <a:srgbClr val="000000"/>
+                </a:solidFill>
+                <a:uFillTx/>
+                <a:latin typeface="+mj-lt"/>
+                <a:ea typeface="+mj-ea"/>
+                <a:cs typeface="+mj-cs"/>
+                <a:sym typeface="Calibri"/>
+              </a:defRPr>
+            </a:lvl6pPr>
+            <a:lvl7pPr marL="0" marR="0" indent="0" algn="ctr" defTabSz="457200" rtl="0" latinLnBrk="0">
+              <a:lnSpc>
+                <a:spcPct val="100000"/>
+              </a:lnSpc>
+              <a:spcBef>
+                <a:spcPts val="0"/>
+              </a:spcBef>
+              <a:spcAft>
+                <a:spcPts val="0"/>
+              </a:spcAft>
+              <a:buClrTx/>
+              <a:buSzTx/>
+              <a:buFontTx/>
+              <a:buNone/>
+              <a:defRPr sz="4400" b="0" i="0" u="none" strike="noStrike" cap="none" spc="0" baseline="0">
+                <a:ln>
+                  <a:noFill/>
+                </a:ln>
+                <a:solidFill>
+                  <a:srgbClr val="000000"/>
+                </a:solidFill>
+                <a:uFillTx/>
+                <a:latin typeface="+mj-lt"/>
+                <a:ea typeface="+mj-ea"/>
+                <a:cs typeface="+mj-cs"/>
+                <a:sym typeface="Calibri"/>
+              </a:defRPr>
+            </a:lvl7pPr>
+            <a:lvl8pPr marL="0" marR="0" indent="0" algn="ctr" defTabSz="457200" rtl="0" latinLnBrk="0">
+              <a:lnSpc>
+                <a:spcPct val="100000"/>
+              </a:lnSpc>
+              <a:spcBef>
+                <a:spcPts val="0"/>
+              </a:spcBef>
+              <a:spcAft>
+                <a:spcPts val="0"/>
+              </a:spcAft>
+              <a:buClrTx/>
+              <a:buSzTx/>
+              <a:buFontTx/>
+              <a:buNone/>
+              <a:defRPr sz="4400" b="0" i="0" u="none" strike="noStrike" cap="none" spc="0" baseline="0">
+                <a:ln>
+                  <a:noFill/>
+                </a:ln>
+                <a:solidFill>
+                  <a:srgbClr val="000000"/>
+                </a:solidFill>
+                <a:uFillTx/>
+                <a:latin typeface="+mj-lt"/>
+                <a:ea typeface="+mj-ea"/>
+                <a:cs typeface="+mj-cs"/>
+                <a:sym typeface="Calibri"/>
+              </a:defRPr>
+            </a:lvl8pPr>
+            <a:lvl9pPr marL="0" marR="0" indent="0" algn="ctr" defTabSz="457200" rtl="0" latinLnBrk="0">
+              <a:lnSpc>
+                <a:spcPct val="100000"/>
+              </a:lnSpc>
+              <a:spcBef>
+                <a:spcPts val="0"/>
+              </a:spcBef>
+              <a:spcAft>
+                <a:spcPts val="0"/>
+              </a:spcAft>
+              <a:buClrTx/>
+              <a:buSzTx/>
+              <a:buFontTx/>
+              <a:buNone/>
+              <a:defRPr sz="4400" b="0" i="0" u="none" strike="noStrike" cap="none" spc="0" baseline="0">
+                <a:ln>
+                  <a:noFill/>
+                </a:ln>
+                <a:solidFill>
+                  <a:srgbClr val="000000"/>
+                </a:solidFill>
+                <a:uFillTx/>
+                <a:latin typeface="+mj-lt"/>
+                <a:ea typeface="+mj-ea"/>
+                <a:cs typeface="+mj-cs"/>
+                <a:sym typeface="Calibri"/>
+              </a:defRPr>
+            </a:lvl9pPr>
+          </a:lstStyle>
+          <a:p>
+            <a:pPr algn="r" hangingPunct="1"/>
+            <a:r>
+              <a:rPr lang="pt-BR" sz="2000" b="1" dirty="0">
+                <a:solidFill>
+                  <a:schemeClr val="bg1"/>
+                </a:solidFill>
+              </a:rPr>
+              <a:t>Professor </a:t>
+            </a:r>
+            <a:r>
+              <a:rPr lang="pt-BR" sz="2000" b="1">
+                <a:solidFill>
+                  <a:schemeClr val="bg1"/>
+                </a:solidFill>
+              </a:rPr>
+              <a:t>M.Sc</a:t>
+            </a:r>
+            <a:r>
+              <a:rPr lang="pt-BR" sz="2000" b="1" dirty="0">
+                <a:solidFill>
+                  <a:schemeClr val="bg1"/>
+                </a:solidFill>
+              </a:rPr>
+              <a:t>. Heleno Cardoso</a:t>
+            </a:r>
+          </a:p>
+        </p:txBody>
+      </p:sp>
+      <p:pic>
+        <p:nvPicPr>
+          <p:cNvPr id="2" name="Google Shape;62;p1" descr="Imagem">
+            <a:extLst>
+              <a:ext uri="{FF2B5EF4-FFF2-40B4-BE49-F238E27FC236}">
+                <a16:creationId xmlns:a16="http://schemas.microsoft.com/office/drawing/2014/main" id="{9C895622-2963-024D-634E-EA58F5381D06}"/>
+              </a:ext>
+            </a:extLst>
+          </p:cNvPr>
+          <p:cNvPicPr preferRelativeResize="0"/>
+          <p:nvPr/>
+        </p:nvPicPr>
+        <p:blipFill rotWithShape="1">
+          <a:blip r:embed="rId4">
+            <a:alphaModFix/>
+          </a:blip>
+          <a:srcRect/>
+          <a:stretch/>
+        </p:blipFill>
+        <p:spPr>
+          <a:xfrm>
+            <a:off x="469898" y="343798"/>
+            <a:ext cx="2858518" cy="1338697"/>
+          </a:xfrm>
+          <a:prstGeom prst="rect">
+            <a:avLst/>
+          </a:prstGeom>
+          <a:noFill/>
+          <a:ln>
+            <a:noFill/>
+          </a:ln>
+        </p:spPr>
+      </p:pic>
+    </p:spTree>
+  </p:cSld>
+  <p:clrMapOvr>
+    <a:masterClrMapping/>
+  </p:clrMapOvr>
+  <p:transition spd="med"/>
+</p:sld>
+</file>
+
 <file path=ppt/slides/slide2.xml><?xml version="1.0" encoding="utf-8"?>
 <p:sld xmlns:a="http://schemas.openxmlformats.org/drawingml/2006/main" xmlns:r="http://schemas.openxmlformats.org/officeDocument/2006/relationships" xmlns:p="http://schemas.openxmlformats.org/presentationml/2006/main">
   <p:cSld>
@@ -4400,7 +6437,23 @@
                   <a:srgbClr val="0070C0"/>
                 </a:solidFill>
               </a:rPr>
-              <a:t>CLP – Sistemas SCADA</a:t>
+              <a:t>CLP – </a:t>
+            </a:r>
+            <a:r>
+              <a:rPr lang="en-US" b="1" dirty="0" err="1">
+                <a:solidFill>
+                  <a:srgbClr val="0070C0"/>
+                </a:solidFill>
+              </a:rPr>
+              <a:t>Introdução</a:t>
+            </a:r>
+            <a:r>
+              <a:rPr lang="en-US" b="1" dirty="0">
+                <a:solidFill>
+                  <a:srgbClr val="0070C0"/>
+                </a:solidFill>
+              </a:rPr>
+              <a:t> SCADA</a:t>
             </a:r>
           </a:p>
         </p:txBody>
@@ -4437,11 +6490,196 @@
               <a:buNone/>
             </a:pPr>
             <a:r>
+              <a:rPr lang="pt-BR" sz="2200" b="1" dirty="0">
+                <a:latin typeface="Times New Roman" panose="02020603050405020304" pitchFamily="18" charset="0"/>
+                <a:cs typeface="Times New Roman" panose="02020603050405020304" pitchFamily="18" charset="0"/>
+              </a:rPr>
+              <a:t>	SCADA</a:t>
+            </a:r>
+            <a:r>
               <a:rPr lang="pt-BR" sz="2200" dirty="0">
                 <a:latin typeface="Times New Roman" panose="02020603050405020304" pitchFamily="18" charset="0"/>
                 <a:cs typeface="Times New Roman" panose="02020603050405020304" pitchFamily="18" charset="0"/>
               </a:rPr>
-              <a:t>....</a:t>
+              <a:t> (</a:t>
+            </a:r>
+            <a:r>
+              <a:rPr lang="pt-BR" sz="2200" b="1" dirty="0" err="1">
+                <a:solidFill>
+                  <a:srgbClr val="FF0000"/>
+                </a:solidFill>
+                <a:latin typeface="Times New Roman" panose="02020603050405020304" pitchFamily="18" charset="0"/>
+                <a:cs typeface="Times New Roman" panose="02020603050405020304" pitchFamily="18" charset="0"/>
+              </a:rPr>
+              <a:t>Supervisory</a:t>
+            </a:r>
+            <a:r>
+              <a:rPr lang="pt-BR" sz="2200" b="1" dirty="0">
+                <a:solidFill>
+                  <a:srgbClr val="FF0000"/>
+                </a:solidFill>
+                <a:latin typeface="Times New Roman" panose="02020603050405020304" pitchFamily="18" charset="0"/>
+                <a:cs typeface="Times New Roman" panose="02020603050405020304" pitchFamily="18" charset="0"/>
+              </a:rPr>
+              <a:t> </a:t>
+            </a:r>
+            <a:r>
+              <a:rPr lang="pt-BR" sz="2200" b="1" dirty="0" err="1">
+                <a:solidFill>
+                  <a:srgbClr val="FF0000"/>
+                </a:solidFill>
+                <a:latin typeface="Times New Roman" panose="02020603050405020304" pitchFamily="18" charset="0"/>
+                <a:cs typeface="Times New Roman" panose="02020603050405020304" pitchFamily="18" charset="0"/>
+              </a:rPr>
+              <a:t>Control</a:t>
+            </a:r>
+            <a:r>
+              <a:rPr lang="pt-BR" sz="2200" b="1" dirty="0">
+                <a:solidFill>
+                  <a:srgbClr val="FF0000"/>
+                </a:solidFill>
+                <a:latin typeface="Times New Roman" panose="02020603050405020304" pitchFamily="18" charset="0"/>
+                <a:cs typeface="Times New Roman" panose="02020603050405020304" pitchFamily="18" charset="0"/>
+              </a:rPr>
+              <a:t> </a:t>
+            </a:r>
+            <a:r>
+              <a:rPr lang="pt-BR" sz="2200" b="1" dirty="0" err="1">
+                <a:solidFill>
+                  <a:srgbClr val="FF0000"/>
+                </a:solidFill>
+                <a:latin typeface="Times New Roman" panose="02020603050405020304" pitchFamily="18" charset="0"/>
+                <a:cs typeface="Times New Roman" panose="02020603050405020304" pitchFamily="18" charset="0"/>
+              </a:rPr>
+              <a:t>and</a:t>
+            </a:r>
+            <a:r>
+              <a:rPr lang="pt-BR" sz="2200" b="1" dirty="0">
+                <a:solidFill>
+                  <a:srgbClr val="FF0000"/>
+                </a:solidFill>
+                <a:latin typeface="Times New Roman" panose="02020603050405020304" pitchFamily="18" charset="0"/>
+                <a:cs typeface="Times New Roman" panose="02020603050405020304" pitchFamily="18" charset="0"/>
+              </a:rPr>
+              <a:t> Data </a:t>
+            </a:r>
+            <a:r>
+              <a:rPr lang="pt-BR" sz="2200" b="1" dirty="0" err="1">
+                <a:solidFill>
+                  <a:srgbClr val="FF0000"/>
+                </a:solidFill>
+                <a:latin typeface="Times New Roman" panose="02020603050405020304" pitchFamily="18" charset="0"/>
+                <a:cs typeface="Times New Roman" panose="02020603050405020304" pitchFamily="18" charset="0"/>
+              </a:rPr>
+              <a:t>Acquisition</a:t>
+            </a:r>
+            <a:r>
+              <a:rPr lang="pt-BR" sz="2200" dirty="0">
+                <a:latin typeface="Times New Roman" panose="02020603050405020304" pitchFamily="18" charset="0"/>
+                <a:cs typeface="Times New Roman" panose="02020603050405020304" pitchFamily="18" charset="0"/>
+              </a:rPr>
+              <a:t>), sistema para supervisão, controle e aquisição de dados de processos industriais. Permite monitorar em tempo real plantas industriais, subestações, linhas de produção.</a:t>
+            </a:r>
+          </a:p>
+          <a:p>
+            <a:pPr marL="0" indent="0" algn="just">
+              <a:buNone/>
+            </a:pPr>
+            <a:endParaRPr lang="pt-BR" sz="2200" dirty="0">
+              <a:latin typeface="Times New Roman" panose="02020603050405020304" pitchFamily="18" charset="0"/>
+              <a:cs typeface="Times New Roman" panose="02020603050405020304" pitchFamily="18" charset="0"/>
+            </a:endParaRPr>
+          </a:p>
+          <a:p>
+            <a:pPr marL="0" indent="0" algn="just">
+              <a:buNone/>
+            </a:pPr>
+            <a:r>
+              <a:rPr lang="pt-BR" sz="2200" b="1" dirty="0">
+                <a:solidFill>
+                  <a:srgbClr val="FF0000"/>
+                </a:solidFill>
+                <a:latin typeface="Times New Roman" panose="02020603050405020304" pitchFamily="18" charset="0"/>
+                <a:cs typeface="Times New Roman" panose="02020603050405020304" pitchFamily="18" charset="0"/>
+              </a:rPr>
+              <a:t>Funções principais</a:t>
+            </a:r>
+          </a:p>
+          <a:p>
+            <a:pPr marL="0" indent="0" algn="just">
+              <a:buNone/>
+            </a:pPr>
+            <a:endParaRPr lang="pt-BR" sz="2200" dirty="0">
+              <a:latin typeface="Times New Roman" panose="02020603050405020304" pitchFamily="18" charset="0"/>
+              <a:cs typeface="Times New Roman" panose="02020603050405020304" pitchFamily="18" charset="0"/>
+            </a:endParaRPr>
+          </a:p>
+          <a:p>
+            <a:pPr algn="just"/>
+            <a:r>
+              <a:rPr lang="pt-BR" sz="2200" dirty="0">
+                <a:latin typeface="Times New Roman" panose="02020603050405020304" pitchFamily="18" charset="0"/>
+                <a:cs typeface="Times New Roman" panose="02020603050405020304" pitchFamily="18" charset="0"/>
+              </a:rPr>
+              <a:t>Interface Homem-Máquina (</a:t>
+            </a:r>
+            <a:r>
+              <a:rPr lang="pt-BR" sz="2200" b="1" dirty="0">
+                <a:latin typeface="Times New Roman" panose="02020603050405020304" pitchFamily="18" charset="0"/>
+                <a:cs typeface="Times New Roman" panose="02020603050405020304" pitchFamily="18" charset="0"/>
+              </a:rPr>
+              <a:t>IHM</a:t>
+            </a:r>
+            <a:r>
+              <a:rPr lang="pt-BR" sz="2200" dirty="0">
+                <a:latin typeface="Times New Roman" panose="02020603050405020304" pitchFamily="18" charset="0"/>
+                <a:cs typeface="Times New Roman" panose="02020603050405020304" pitchFamily="18" charset="0"/>
+              </a:rPr>
+              <a:t>)</a:t>
+            </a:r>
+          </a:p>
+          <a:p>
+            <a:pPr algn="just"/>
+            <a:r>
+              <a:rPr lang="pt-BR" sz="2200" dirty="0">
+                <a:latin typeface="Times New Roman" panose="02020603050405020304" pitchFamily="18" charset="0"/>
+                <a:cs typeface="Times New Roman" panose="02020603050405020304" pitchFamily="18" charset="0"/>
+              </a:rPr>
+              <a:t>Alarmes e eventos</a:t>
+            </a:r>
+          </a:p>
+          <a:p>
+            <a:pPr algn="just"/>
+            <a:r>
+              <a:rPr lang="pt-BR" sz="2200" dirty="0">
+                <a:latin typeface="Times New Roman" panose="02020603050405020304" pitchFamily="18" charset="0"/>
+                <a:cs typeface="Times New Roman" panose="02020603050405020304" pitchFamily="18" charset="0"/>
+              </a:rPr>
+              <a:t>Armazenamento de dados (</a:t>
+            </a:r>
+            <a:r>
+              <a:rPr lang="pt-BR" sz="2200" b="1" dirty="0">
+                <a:latin typeface="Times New Roman" panose="02020603050405020304" pitchFamily="18" charset="0"/>
+                <a:cs typeface="Times New Roman" panose="02020603050405020304" pitchFamily="18" charset="0"/>
+              </a:rPr>
+              <a:t>historiador</a:t>
+            </a:r>
+            <a:r>
+              <a:rPr lang="pt-BR" sz="2200" dirty="0">
+                <a:latin typeface="Times New Roman" panose="02020603050405020304" pitchFamily="18" charset="0"/>
+                <a:cs typeface="Times New Roman" panose="02020603050405020304" pitchFamily="18" charset="0"/>
+              </a:rPr>
+              <a:t>)</a:t>
+            </a:r>
+          </a:p>
+          <a:p>
+            <a:pPr algn="just"/>
+            <a:r>
+              <a:rPr lang="pt-BR" sz="2200" dirty="0">
+                <a:latin typeface="Times New Roman" panose="02020603050405020304" pitchFamily="18" charset="0"/>
+                <a:cs typeface="Times New Roman" panose="02020603050405020304" pitchFamily="18" charset="0"/>
+              </a:rPr>
+              <a:t>Controle remoto</a:t>
             </a:r>
           </a:p>
         </p:txBody>
@@ -4461,6 +6699,1268 @@
 </file>
 
 <file path=ppt/slides/slide4.xml><?xml version="1.0" encoding="utf-8"?>
+<p:sld xmlns:a="http://schemas.openxmlformats.org/drawingml/2006/main" xmlns:r="http://schemas.openxmlformats.org/officeDocument/2006/relationships" xmlns:p="http://schemas.openxmlformats.org/presentationml/2006/main">
+  <p:cSld>
+    <p:spTree>
+      <p:nvGrpSpPr>
+        <p:cNvPr id="1" name="">
+          <a:extLst>
+            <a:ext uri="{FF2B5EF4-FFF2-40B4-BE49-F238E27FC236}">
+              <a16:creationId xmlns:a16="http://schemas.microsoft.com/office/drawing/2014/main" id="{8014E73B-AB6B-6B19-18A0-D216A141018B}"/>
+            </a:ext>
+          </a:extLst>
+        </p:cNvPr>
+        <p:cNvGrpSpPr/>
+        <p:nvPr/>
+      </p:nvGrpSpPr>
+      <p:grpSpPr>
+        <a:xfrm>
+          <a:off x="0" y="0"/>
+          <a:ext cx="0" cy="0"/>
+          <a:chOff x="0" y="0"/>
+          <a:chExt cx="0" cy="0"/>
+        </a:xfrm>
+      </p:grpSpPr>
+      <p:sp>
+        <p:nvSpPr>
+          <p:cNvPr id="6" name="Title 1">
+            <a:extLst>
+              <a:ext uri="{FF2B5EF4-FFF2-40B4-BE49-F238E27FC236}">
+                <a16:creationId xmlns:a16="http://schemas.microsoft.com/office/drawing/2014/main" id="{FD6DBBE8-59E9-CA9B-D82F-CEFA2860A306}"/>
+              </a:ext>
+            </a:extLst>
+          </p:cNvPr>
+          <p:cNvSpPr>
+            <a:spLocks noGrp="1"/>
+          </p:cNvSpPr>
+          <p:nvPr>
+            <p:ph type="title"/>
+          </p:nvPr>
+        </p:nvSpPr>
+        <p:spPr>
+          <a:xfrm>
+            <a:off x="457200" y="205980"/>
+            <a:ext cx="8229600" cy="857251"/>
+          </a:xfrm>
+        </p:spPr>
+        <p:txBody>
+          <a:bodyPr>
+            <a:normAutofit/>
+          </a:bodyPr>
+          <a:lstStyle/>
+          <a:p>
+            <a:r>
+              <a:rPr lang="en-US" b="1" dirty="0">
+                <a:solidFill>
+                  <a:srgbClr val="0070C0"/>
+                </a:solidFill>
+              </a:rPr>
+              <a:t>CLP – </a:t>
+            </a:r>
+            <a:r>
+              <a:rPr lang="en-US" b="1" dirty="0" err="1">
+                <a:solidFill>
+                  <a:srgbClr val="0070C0"/>
+                </a:solidFill>
+              </a:rPr>
+              <a:t>Arquitetura</a:t>
+            </a:r>
+            <a:r>
+              <a:rPr lang="en-US" b="1" dirty="0">
+                <a:solidFill>
+                  <a:srgbClr val="0070C0"/>
+                </a:solidFill>
+              </a:rPr>
+              <a:t> SCADA</a:t>
+            </a:r>
+          </a:p>
+        </p:txBody>
+      </p:sp>
+      <p:sp>
+        <p:nvSpPr>
+          <p:cNvPr id="8" name="Text Placeholder 2">
+            <a:extLst>
+              <a:ext uri="{FF2B5EF4-FFF2-40B4-BE49-F238E27FC236}">
+                <a16:creationId xmlns:a16="http://schemas.microsoft.com/office/drawing/2014/main" id="{247515E9-7B2D-69F8-660C-95DFDC785D00}"/>
+              </a:ext>
+            </a:extLst>
+          </p:cNvPr>
+          <p:cNvSpPr>
+            <a:spLocks noGrp="1"/>
+          </p:cNvSpPr>
+          <p:nvPr>
+            <p:ph type="body" sz="half" idx="1"/>
+          </p:nvPr>
+        </p:nvSpPr>
+        <p:spPr>
+          <a:xfrm>
+            <a:off x="142865" y="1035050"/>
+            <a:ext cx="8865056" cy="3994150"/>
+          </a:xfrm>
+        </p:spPr>
+        <p:txBody>
+          <a:bodyPr>
+            <a:noAutofit/>
+          </a:bodyPr>
+          <a:lstStyle/>
+          <a:p>
+            <a:pPr marL="0" indent="0" algn="just">
+              <a:buNone/>
+            </a:pPr>
+            <a:r>
+              <a:rPr lang="pt-BR" sz="2200" b="1" dirty="0">
+                <a:latin typeface="Times New Roman" panose="02020603050405020304" pitchFamily="18" charset="0"/>
+                <a:cs typeface="Times New Roman" panose="02020603050405020304" pitchFamily="18" charset="0"/>
+              </a:rPr>
+              <a:t>	</a:t>
+            </a:r>
+            <a:r>
+              <a:rPr lang="pt-BR" sz="2200" b="1" dirty="0">
+                <a:solidFill>
+                  <a:srgbClr val="FF0000"/>
+                </a:solidFill>
+                <a:latin typeface="Times New Roman" panose="02020603050405020304" pitchFamily="18" charset="0"/>
+                <a:cs typeface="Times New Roman" panose="02020603050405020304" pitchFamily="18" charset="0"/>
+              </a:rPr>
+              <a:t>Níveis de um sistema SCADA</a:t>
+            </a:r>
+          </a:p>
+          <a:p>
+            <a:pPr marL="0" indent="0" algn="just">
+              <a:buNone/>
+            </a:pPr>
+            <a:endParaRPr lang="pt-BR" sz="2200" dirty="0">
+              <a:latin typeface="Times New Roman" panose="02020603050405020304" pitchFamily="18" charset="0"/>
+              <a:cs typeface="Times New Roman" panose="02020603050405020304" pitchFamily="18" charset="0"/>
+            </a:endParaRPr>
+          </a:p>
+          <a:p>
+            <a:pPr marL="0" indent="0" algn="just">
+              <a:buNone/>
+            </a:pPr>
+            <a:endParaRPr lang="pt-BR" sz="2200" dirty="0">
+              <a:latin typeface="Times New Roman" panose="02020603050405020304" pitchFamily="18" charset="0"/>
+              <a:cs typeface="Times New Roman" panose="02020603050405020304" pitchFamily="18" charset="0"/>
+            </a:endParaRPr>
+          </a:p>
+          <a:p>
+            <a:pPr marL="0" indent="0" algn="just">
+              <a:buNone/>
+            </a:pPr>
+            <a:endParaRPr lang="pt-BR" sz="2200" dirty="0">
+              <a:latin typeface="Times New Roman" panose="02020603050405020304" pitchFamily="18" charset="0"/>
+              <a:cs typeface="Times New Roman" panose="02020603050405020304" pitchFamily="18" charset="0"/>
+            </a:endParaRPr>
+          </a:p>
+          <a:p>
+            <a:pPr marL="0" indent="0" algn="just">
+              <a:buNone/>
+            </a:pPr>
+            <a:endParaRPr lang="pt-BR" sz="2200" dirty="0">
+              <a:latin typeface="Times New Roman" panose="02020603050405020304" pitchFamily="18" charset="0"/>
+              <a:cs typeface="Times New Roman" panose="02020603050405020304" pitchFamily="18" charset="0"/>
+            </a:endParaRPr>
+          </a:p>
+          <a:p>
+            <a:pPr marL="0" indent="0" algn="just">
+              <a:buNone/>
+            </a:pPr>
+            <a:endParaRPr lang="pt-BR" sz="2200" dirty="0">
+              <a:latin typeface="Times New Roman" panose="02020603050405020304" pitchFamily="18" charset="0"/>
+              <a:cs typeface="Times New Roman" panose="02020603050405020304" pitchFamily="18" charset="0"/>
+            </a:endParaRPr>
+          </a:p>
+          <a:p>
+            <a:pPr marL="0" indent="0" algn="just">
+              <a:buNone/>
+            </a:pPr>
+            <a:endParaRPr lang="pt-BR" sz="2200" dirty="0">
+              <a:latin typeface="Times New Roman" panose="02020603050405020304" pitchFamily="18" charset="0"/>
+              <a:cs typeface="Times New Roman" panose="02020603050405020304" pitchFamily="18" charset="0"/>
+            </a:endParaRPr>
+          </a:p>
+          <a:p>
+            <a:pPr marL="0" indent="0" algn="just">
+              <a:buNone/>
+            </a:pPr>
+            <a:r>
+              <a:rPr lang="pt-BR" sz="2200" dirty="0">
+                <a:latin typeface="Times New Roman" panose="02020603050405020304" pitchFamily="18" charset="0"/>
+                <a:cs typeface="Times New Roman" panose="02020603050405020304" pitchFamily="18" charset="0"/>
+              </a:rPr>
+              <a:t>	</a:t>
+            </a:r>
+            <a:r>
+              <a:rPr lang="pt-BR" sz="2200" b="1" dirty="0">
+                <a:solidFill>
+                  <a:srgbClr val="FF0000"/>
+                </a:solidFill>
+                <a:latin typeface="Times New Roman" panose="02020603050405020304" pitchFamily="18" charset="0"/>
+                <a:cs typeface="Times New Roman" panose="02020603050405020304" pitchFamily="18" charset="0"/>
+              </a:rPr>
+              <a:t>Fluxo</a:t>
+            </a:r>
+          </a:p>
+          <a:p>
+            <a:pPr marL="0" indent="0" algn="just">
+              <a:buNone/>
+            </a:pPr>
+            <a:r>
+              <a:rPr lang="pt-BR" sz="2200" dirty="0">
+                <a:latin typeface="Times New Roman" panose="02020603050405020304" pitchFamily="18" charset="0"/>
+                <a:cs typeface="Times New Roman" panose="02020603050405020304" pitchFamily="18" charset="0"/>
+              </a:rPr>
+              <a:t>	</a:t>
+            </a:r>
+            <a:r>
+              <a:rPr lang="pt-BR" sz="2200" b="1" dirty="0">
+                <a:latin typeface="Times New Roman" panose="02020603050405020304" pitchFamily="18" charset="0"/>
+                <a:cs typeface="Times New Roman" panose="02020603050405020304" pitchFamily="18" charset="0"/>
+              </a:rPr>
+              <a:t>Sensores</a:t>
+            </a:r>
+            <a:r>
+              <a:rPr lang="pt-BR" sz="2200" dirty="0">
+                <a:latin typeface="Times New Roman" panose="02020603050405020304" pitchFamily="18" charset="0"/>
+                <a:cs typeface="Times New Roman" panose="02020603050405020304" pitchFamily="18" charset="0"/>
+              </a:rPr>
+              <a:t> → </a:t>
+            </a:r>
+            <a:r>
+              <a:rPr lang="pt-BR" sz="2200" b="1" dirty="0">
+                <a:solidFill>
+                  <a:srgbClr val="FF0000"/>
+                </a:solidFill>
+                <a:latin typeface="Times New Roman" panose="02020603050405020304" pitchFamily="18" charset="0"/>
+                <a:cs typeface="Times New Roman" panose="02020603050405020304" pitchFamily="18" charset="0"/>
+              </a:rPr>
+              <a:t>CLP</a:t>
+            </a:r>
+            <a:r>
+              <a:rPr lang="pt-BR" sz="2200" dirty="0">
+                <a:latin typeface="Times New Roman" panose="02020603050405020304" pitchFamily="18" charset="0"/>
+                <a:cs typeface="Times New Roman" panose="02020603050405020304" pitchFamily="18" charset="0"/>
+              </a:rPr>
+              <a:t> → </a:t>
+            </a:r>
+            <a:r>
+              <a:rPr lang="pt-BR" sz="2200" b="1" dirty="0">
+                <a:latin typeface="Times New Roman" panose="02020603050405020304" pitchFamily="18" charset="0"/>
+                <a:cs typeface="Times New Roman" panose="02020603050405020304" pitchFamily="18" charset="0"/>
+              </a:rPr>
+              <a:t>Supervisório</a:t>
+            </a:r>
+            <a:r>
+              <a:rPr lang="pt-BR" sz="2200" dirty="0">
+                <a:latin typeface="Times New Roman" panose="02020603050405020304" pitchFamily="18" charset="0"/>
+                <a:cs typeface="Times New Roman" panose="02020603050405020304" pitchFamily="18" charset="0"/>
+              </a:rPr>
+              <a:t> (</a:t>
+            </a:r>
+            <a:r>
+              <a:rPr lang="pt-BR" sz="2200" b="1" dirty="0">
+                <a:solidFill>
+                  <a:srgbClr val="FF0000"/>
+                </a:solidFill>
+                <a:latin typeface="Times New Roman" panose="02020603050405020304" pitchFamily="18" charset="0"/>
+                <a:cs typeface="Times New Roman" panose="02020603050405020304" pitchFamily="18" charset="0"/>
+              </a:rPr>
+              <a:t>SCADA</a:t>
+            </a:r>
+            <a:r>
+              <a:rPr lang="pt-BR" sz="2200" dirty="0">
+                <a:latin typeface="Times New Roman" panose="02020603050405020304" pitchFamily="18" charset="0"/>
+                <a:cs typeface="Times New Roman" panose="02020603050405020304" pitchFamily="18" charset="0"/>
+              </a:rPr>
+              <a:t>) → </a:t>
+            </a:r>
+            <a:r>
+              <a:rPr lang="pt-BR" sz="2200" b="1" dirty="0">
+                <a:latin typeface="Times New Roman" panose="02020603050405020304" pitchFamily="18" charset="0"/>
+                <a:cs typeface="Times New Roman" panose="02020603050405020304" pitchFamily="18" charset="0"/>
+              </a:rPr>
+              <a:t>Operador</a:t>
+            </a:r>
+          </a:p>
+          <a:p>
+            <a:pPr marL="0" indent="0" algn="just">
+              <a:buNone/>
+            </a:pPr>
+            <a:endParaRPr lang="pt-BR" sz="2200" dirty="0">
+              <a:latin typeface="Times New Roman" panose="02020603050405020304" pitchFamily="18" charset="0"/>
+              <a:cs typeface="Times New Roman" panose="02020603050405020304" pitchFamily="18" charset="0"/>
+            </a:endParaRPr>
+          </a:p>
+        </p:txBody>
+      </p:sp>
+      <p:graphicFrame>
+        <p:nvGraphicFramePr>
+          <p:cNvPr id="2" name="Tabela 1">
+            <a:extLst>
+              <a:ext uri="{FF2B5EF4-FFF2-40B4-BE49-F238E27FC236}">
+                <a16:creationId xmlns:a16="http://schemas.microsoft.com/office/drawing/2014/main" id="{BFAF4FAD-08B7-D1C4-2E26-ABA2CED19CF7}"/>
+              </a:ext>
+            </a:extLst>
+          </p:cNvPr>
+          <p:cNvGraphicFramePr>
+            <a:graphicFrameLocks noGrp="1"/>
+          </p:cNvGraphicFramePr>
+          <p:nvPr>
+            <p:extLst>
+              <p:ext uri="{D42A27DB-BD31-4B8C-83A1-F6EECF244321}">
+                <p14:modId xmlns:p14="http://schemas.microsoft.com/office/powerpoint/2010/main" val="2579050281"/>
+              </p:ext>
+            </p:extLst>
+          </p:nvPr>
+        </p:nvGraphicFramePr>
+        <p:xfrm>
+          <a:off x="661147" y="1532070"/>
+          <a:ext cx="7902388" cy="2286000"/>
+        </p:xfrm>
+        <a:graphic>
+          <a:graphicData uri="http://schemas.openxmlformats.org/drawingml/2006/table">
+            <a:tbl>
+              <a:tblPr firstRow="1" bandRow="1">
+                <a:tableStyleId>{5C22544A-7EE6-4342-B048-85BDC9FD1C3A}</a:tableStyleId>
+              </a:tblPr>
+              <a:tblGrid>
+                <a:gridCol w="3951194">
+                  <a:extLst>
+                    <a:ext uri="{9D8B030D-6E8A-4147-A177-3AD203B41FA5}">
+                      <a16:colId xmlns:a16="http://schemas.microsoft.com/office/drawing/2014/main" val="92940347"/>
+                    </a:ext>
+                  </a:extLst>
+                </a:gridCol>
+                <a:gridCol w="3951194">
+                  <a:extLst>
+                    <a:ext uri="{9D8B030D-6E8A-4147-A177-3AD203B41FA5}">
+                      <a16:colId xmlns:a16="http://schemas.microsoft.com/office/drawing/2014/main" val="1774947334"/>
+                    </a:ext>
+                  </a:extLst>
+                </a:gridCol>
+              </a:tblGrid>
+              <a:tr h="370840">
+                <a:tc>
+                  <a:txBody>
+                    <a:bodyPr/>
+                    <a:lstStyle/>
+                    <a:p>
+                      <a:pPr algn="ctr"/>
+                      <a:r>
+                        <a:rPr lang="pt-BR" sz="2000" dirty="0"/>
+                        <a:t>Nível</a:t>
+                      </a:r>
+                    </a:p>
+                  </a:txBody>
+                  <a:tcPr/>
+                </a:tc>
+                <a:tc>
+                  <a:txBody>
+                    <a:bodyPr/>
+                    <a:lstStyle/>
+                    <a:p>
+                      <a:pPr algn="ctr"/>
+                      <a:r>
+                        <a:rPr lang="pt-BR" sz="2000" dirty="0"/>
+                        <a:t>Descrição</a:t>
+                      </a:r>
+                    </a:p>
+                  </a:txBody>
+                  <a:tcPr/>
+                </a:tc>
+                <a:extLst>
+                  <a:ext uri="{0D108BD9-81ED-4DB2-BD59-A6C34878D82A}">
+                    <a16:rowId xmlns:a16="http://schemas.microsoft.com/office/drawing/2014/main" val="926935256"/>
+                  </a:ext>
+                </a:extLst>
+              </a:tr>
+              <a:tr h="370840">
+                <a:tc>
+                  <a:txBody>
+                    <a:bodyPr/>
+                    <a:lstStyle/>
+                    <a:p>
+                      <a:r>
+                        <a:rPr lang="pt-BR" sz="2000" b="1" dirty="0"/>
+                        <a:t>Campo</a:t>
+                      </a:r>
+                    </a:p>
+                  </a:txBody>
+                  <a:tcPr/>
+                </a:tc>
+                <a:tc>
+                  <a:txBody>
+                    <a:bodyPr/>
+                    <a:lstStyle/>
+                    <a:p>
+                      <a:r>
+                        <a:rPr lang="pt-BR" sz="2000" dirty="0"/>
+                        <a:t>Sensores, atuadores, </a:t>
+                      </a:r>
+                      <a:r>
+                        <a:rPr lang="pt-BR" sz="2000" dirty="0" err="1"/>
+                        <a:t>PLCs</a:t>
+                      </a:r>
+                      <a:endParaRPr lang="pt-BR" sz="2000" dirty="0"/>
+                    </a:p>
+                  </a:txBody>
+                  <a:tcPr/>
+                </a:tc>
+                <a:extLst>
+                  <a:ext uri="{0D108BD9-81ED-4DB2-BD59-A6C34878D82A}">
+                    <a16:rowId xmlns:a16="http://schemas.microsoft.com/office/drawing/2014/main" val="3547395511"/>
+                  </a:ext>
+                </a:extLst>
+              </a:tr>
+              <a:tr h="370840">
+                <a:tc>
+                  <a:txBody>
+                    <a:bodyPr/>
+                    <a:lstStyle/>
+                    <a:p>
+                      <a:r>
+                        <a:rPr lang="pt-BR" sz="2000" b="1" dirty="0"/>
+                        <a:t>Controle</a:t>
+                      </a:r>
+                    </a:p>
+                  </a:txBody>
+                  <a:tcPr/>
+                </a:tc>
+                <a:tc>
+                  <a:txBody>
+                    <a:bodyPr/>
+                    <a:lstStyle/>
+                    <a:p>
+                      <a:r>
+                        <a:rPr lang="pt-BR" sz="2000" dirty="0" err="1"/>
+                        <a:t>PLCs</a:t>
+                      </a:r>
+                      <a:r>
+                        <a:rPr lang="pt-BR" sz="2000" dirty="0"/>
+                        <a:t>, </a:t>
+                      </a:r>
+                      <a:r>
+                        <a:rPr lang="pt-BR" sz="2000" dirty="0" err="1"/>
+                        <a:t>RTUs</a:t>
+                      </a:r>
+                      <a:r>
+                        <a:rPr lang="pt-BR" sz="2000" dirty="0"/>
+                        <a:t>(Unidades Remotas)</a:t>
+                      </a:r>
+                    </a:p>
+                  </a:txBody>
+                  <a:tcPr/>
+                </a:tc>
+                <a:extLst>
+                  <a:ext uri="{0D108BD9-81ED-4DB2-BD59-A6C34878D82A}">
+                    <a16:rowId xmlns:a16="http://schemas.microsoft.com/office/drawing/2014/main" val="2007647382"/>
+                  </a:ext>
+                </a:extLst>
+              </a:tr>
+              <a:tr h="370840">
+                <a:tc>
+                  <a:txBody>
+                    <a:bodyPr/>
+                    <a:lstStyle/>
+                    <a:p>
+                      <a:r>
+                        <a:rPr lang="pt-BR" sz="2000" b="1" dirty="0"/>
+                        <a:t>Supervisão</a:t>
+                      </a:r>
+                    </a:p>
+                  </a:txBody>
+                  <a:tcPr/>
+                </a:tc>
+                <a:tc>
+                  <a:txBody>
+                    <a:bodyPr/>
+                    <a:lstStyle/>
+                    <a:p>
+                      <a:r>
+                        <a:rPr lang="pt-BR" sz="2000" dirty="0"/>
+                        <a:t>Servidores SCADA, IHM</a:t>
+                      </a:r>
+                    </a:p>
+                  </a:txBody>
+                  <a:tcPr/>
+                </a:tc>
+                <a:extLst>
+                  <a:ext uri="{0D108BD9-81ED-4DB2-BD59-A6C34878D82A}">
+                    <a16:rowId xmlns:a16="http://schemas.microsoft.com/office/drawing/2014/main" val="1914507750"/>
+                  </a:ext>
+                </a:extLst>
+              </a:tr>
+              <a:tr h="370840">
+                <a:tc>
+                  <a:txBody>
+                    <a:bodyPr/>
+                    <a:lstStyle/>
+                    <a:p>
+                      <a:r>
+                        <a:rPr lang="pt-BR" sz="2000" b="1" dirty="0"/>
+                        <a:t>Corporativo</a:t>
+                      </a:r>
+                    </a:p>
+                  </a:txBody>
+                  <a:tcPr/>
+                </a:tc>
+                <a:tc>
+                  <a:txBody>
+                    <a:bodyPr/>
+                    <a:lstStyle/>
+                    <a:p>
+                      <a:r>
+                        <a:rPr lang="pt-BR" sz="2000" dirty="0"/>
+                        <a:t>Integrador com ERP, análise de dados</a:t>
+                      </a:r>
+                    </a:p>
+                  </a:txBody>
+                  <a:tcPr/>
+                </a:tc>
+                <a:extLst>
+                  <a:ext uri="{0D108BD9-81ED-4DB2-BD59-A6C34878D82A}">
+                    <a16:rowId xmlns:a16="http://schemas.microsoft.com/office/drawing/2014/main" val="1552677308"/>
+                  </a:ext>
+                </a:extLst>
+              </a:tr>
+            </a:tbl>
+          </a:graphicData>
+        </a:graphic>
+      </p:graphicFrame>
+    </p:spTree>
+    <p:extLst>
+      <p:ext uri="{BB962C8B-B14F-4D97-AF65-F5344CB8AC3E}">
+        <p14:creationId xmlns:p14="http://schemas.microsoft.com/office/powerpoint/2010/main" val="1114044536"/>
+      </p:ext>
+    </p:extLst>
+  </p:cSld>
+  <p:clrMapOvr>
+    <a:masterClrMapping/>
+  </p:clrMapOvr>
+  <p:transition spd="med"/>
+</p:sld>
+</file>
+
+<file path=ppt/slides/slide5.xml><?xml version="1.0" encoding="utf-8"?>
+<p:sld xmlns:a="http://schemas.openxmlformats.org/drawingml/2006/main" xmlns:r="http://schemas.openxmlformats.org/officeDocument/2006/relationships" xmlns:p="http://schemas.openxmlformats.org/presentationml/2006/main">
+  <p:cSld>
+    <p:spTree>
+      <p:nvGrpSpPr>
+        <p:cNvPr id="1" name="">
+          <a:extLst>
+            <a:ext uri="{FF2B5EF4-FFF2-40B4-BE49-F238E27FC236}">
+              <a16:creationId xmlns:a16="http://schemas.microsoft.com/office/drawing/2014/main" id="{61E906D1-40FC-A8DB-BC88-2BED87DA4701}"/>
+            </a:ext>
+          </a:extLst>
+        </p:cNvPr>
+        <p:cNvGrpSpPr/>
+        <p:nvPr/>
+      </p:nvGrpSpPr>
+      <p:grpSpPr>
+        <a:xfrm>
+          <a:off x="0" y="0"/>
+          <a:ext cx="0" cy="0"/>
+          <a:chOff x="0" y="0"/>
+          <a:chExt cx="0" cy="0"/>
+        </a:xfrm>
+      </p:grpSpPr>
+      <p:sp>
+        <p:nvSpPr>
+          <p:cNvPr id="6" name="Title 1">
+            <a:extLst>
+              <a:ext uri="{FF2B5EF4-FFF2-40B4-BE49-F238E27FC236}">
+                <a16:creationId xmlns:a16="http://schemas.microsoft.com/office/drawing/2014/main" id="{C5E61319-A3AD-80B4-8108-41A6B9807D12}"/>
+              </a:ext>
+            </a:extLst>
+          </p:cNvPr>
+          <p:cNvSpPr>
+            <a:spLocks noGrp="1"/>
+          </p:cNvSpPr>
+          <p:nvPr>
+            <p:ph type="title"/>
+          </p:nvPr>
+        </p:nvSpPr>
+        <p:spPr>
+          <a:xfrm>
+            <a:off x="457200" y="205980"/>
+            <a:ext cx="8229600" cy="857251"/>
+          </a:xfrm>
+        </p:spPr>
+        <p:txBody>
+          <a:bodyPr>
+            <a:normAutofit/>
+          </a:bodyPr>
+          <a:lstStyle/>
+          <a:p>
+            <a:r>
+              <a:rPr lang="en-US" b="1" dirty="0">
+                <a:solidFill>
+                  <a:srgbClr val="0070C0"/>
+                </a:solidFill>
+              </a:rPr>
+              <a:t>CLP – </a:t>
+            </a:r>
+            <a:r>
+              <a:rPr lang="en-US" b="1" dirty="0" err="1">
+                <a:solidFill>
+                  <a:srgbClr val="0070C0"/>
+                </a:solidFill>
+              </a:rPr>
+              <a:t>Integração</a:t>
+            </a:r>
+            <a:r>
+              <a:rPr lang="en-US" b="1" dirty="0">
+                <a:solidFill>
+                  <a:srgbClr val="0070C0"/>
+                </a:solidFill>
+              </a:rPr>
+              <a:t> PLC + SCADA</a:t>
+            </a:r>
+          </a:p>
+        </p:txBody>
+      </p:sp>
+      <p:sp>
+        <p:nvSpPr>
+          <p:cNvPr id="8" name="Text Placeholder 2">
+            <a:extLst>
+              <a:ext uri="{FF2B5EF4-FFF2-40B4-BE49-F238E27FC236}">
+                <a16:creationId xmlns:a16="http://schemas.microsoft.com/office/drawing/2014/main" id="{E8128642-B3BB-5A9A-4D7E-B8222D7DD1E3}"/>
+              </a:ext>
+            </a:extLst>
+          </p:cNvPr>
+          <p:cNvSpPr>
+            <a:spLocks noGrp="1"/>
+          </p:cNvSpPr>
+          <p:nvPr>
+            <p:ph type="body" sz="half" idx="1"/>
+          </p:nvPr>
+        </p:nvSpPr>
+        <p:spPr>
+          <a:xfrm>
+            <a:off x="142865" y="1035050"/>
+            <a:ext cx="8865056" cy="3994150"/>
+          </a:xfrm>
+        </p:spPr>
+        <p:txBody>
+          <a:bodyPr>
+            <a:noAutofit/>
+          </a:bodyPr>
+          <a:lstStyle/>
+          <a:p>
+            <a:pPr marL="0" indent="0" algn="just">
+              <a:buNone/>
+            </a:pPr>
+            <a:endParaRPr lang="pt-BR" sz="2400" dirty="0">
+              <a:latin typeface="Times New Roman" panose="02020603050405020304" pitchFamily="18" charset="0"/>
+              <a:cs typeface="Times New Roman" panose="02020603050405020304" pitchFamily="18" charset="0"/>
+            </a:endParaRPr>
+          </a:p>
+          <a:p>
+            <a:pPr algn="just"/>
+            <a:r>
+              <a:rPr lang="pt-BR" sz="2400" b="1" dirty="0">
+                <a:latin typeface="Times New Roman" panose="02020603050405020304" pitchFamily="18" charset="0"/>
+                <a:cs typeface="Times New Roman" panose="02020603050405020304" pitchFamily="18" charset="0"/>
+              </a:rPr>
+              <a:t>CLP</a:t>
+            </a:r>
+            <a:r>
+              <a:rPr lang="pt-BR" sz="2400" dirty="0">
+                <a:latin typeface="Times New Roman" panose="02020603050405020304" pitchFamily="18" charset="0"/>
+                <a:cs typeface="Times New Roman" panose="02020603050405020304" pitchFamily="18" charset="0"/>
+              </a:rPr>
+              <a:t> coleta e processa sinais do processo;</a:t>
+            </a:r>
+          </a:p>
+          <a:p>
+            <a:pPr algn="just"/>
+            <a:endParaRPr lang="pt-BR" sz="2400" dirty="0">
+              <a:latin typeface="Times New Roman" panose="02020603050405020304" pitchFamily="18" charset="0"/>
+              <a:cs typeface="Times New Roman" panose="02020603050405020304" pitchFamily="18" charset="0"/>
+            </a:endParaRPr>
+          </a:p>
+          <a:p>
+            <a:pPr algn="just"/>
+            <a:r>
+              <a:rPr lang="pt-BR" sz="2400" dirty="0">
+                <a:latin typeface="Times New Roman" panose="02020603050405020304" pitchFamily="18" charset="0"/>
+                <a:cs typeface="Times New Roman" panose="02020603050405020304" pitchFamily="18" charset="0"/>
+              </a:rPr>
+              <a:t>Envia dados via </a:t>
+            </a:r>
+            <a:r>
+              <a:rPr lang="pt-BR" sz="2400" b="1" dirty="0">
+                <a:latin typeface="Times New Roman" panose="02020603050405020304" pitchFamily="18" charset="0"/>
+                <a:cs typeface="Times New Roman" panose="02020603050405020304" pitchFamily="18" charset="0"/>
+              </a:rPr>
+              <a:t>protocolos</a:t>
+            </a:r>
+            <a:r>
+              <a:rPr lang="pt-BR" sz="2400" dirty="0">
+                <a:latin typeface="Times New Roman" panose="02020603050405020304" pitchFamily="18" charset="0"/>
+                <a:cs typeface="Times New Roman" panose="02020603050405020304" pitchFamily="18" charset="0"/>
+              </a:rPr>
+              <a:t> (</a:t>
+            </a:r>
+            <a:r>
+              <a:rPr lang="pt-BR" sz="2400" b="1" dirty="0" err="1">
+                <a:solidFill>
+                  <a:srgbClr val="FF0000"/>
+                </a:solidFill>
+                <a:latin typeface="Times New Roman" panose="02020603050405020304" pitchFamily="18" charset="0"/>
+                <a:cs typeface="Times New Roman" panose="02020603050405020304" pitchFamily="18" charset="0"/>
+              </a:rPr>
+              <a:t>Modbus</a:t>
+            </a:r>
+            <a:r>
+              <a:rPr lang="pt-BR" sz="2400" b="1" dirty="0">
+                <a:solidFill>
+                  <a:srgbClr val="FF0000"/>
+                </a:solidFill>
+                <a:latin typeface="Times New Roman" panose="02020603050405020304" pitchFamily="18" charset="0"/>
+                <a:cs typeface="Times New Roman" panose="02020603050405020304" pitchFamily="18" charset="0"/>
+              </a:rPr>
+              <a:t>, OPC, </a:t>
+            </a:r>
+            <a:r>
+              <a:rPr lang="pt-BR" sz="2400" b="1" dirty="0" err="1">
+                <a:solidFill>
+                  <a:srgbClr val="FF0000"/>
+                </a:solidFill>
+                <a:latin typeface="Times New Roman" panose="02020603050405020304" pitchFamily="18" charset="0"/>
+                <a:cs typeface="Times New Roman" panose="02020603050405020304" pitchFamily="18" charset="0"/>
+              </a:rPr>
+              <a:t>Profibus</a:t>
+            </a:r>
+            <a:r>
+              <a:rPr lang="pt-BR" sz="2400" dirty="0">
+                <a:latin typeface="Times New Roman" panose="02020603050405020304" pitchFamily="18" charset="0"/>
+                <a:cs typeface="Times New Roman" panose="02020603050405020304" pitchFamily="18" charset="0"/>
+              </a:rPr>
+              <a:t>) para o </a:t>
+            </a:r>
+            <a:r>
+              <a:rPr lang="pt-BR" sz="2400" b="1" dirty="0">
+                <a:latin typeface="Times New Roman" panose="02020603050405020304" pitchFamily="18" charset="0"/>
+                <a:cs typeface="Times New Roman" panose="02020603050405020304" pitchFamily="18" charset="0"/>
+              </a:rPr>
+              <a:t>SCADA</a:t>
+            </a:r>
+            <a:r>
+              <a:rPr lang="pt-BR" sz="2400" dirty="0">
+                <a:latin typeface="Times New Roman" panose="02020603050405020304" pitchFamily="18" charset="0"/>
+                <a:cs typeface="Times New Roman" panose="02020603050405020304" pitchFamily="18" charset="0"/>
+              </a:rPr>
+              <a:t>;</a:t>
+            </a:r>
+          </a:p>
+          <a:p>
+            <a:pPr marL="0" indent="0" algn="just">
+              <a:buNone/>
+            </a:pPr>
+            <a:endParaRPr lang="pt-BR" sz="2400" dirty="0">
+              <a:latin typeface="Times New Roman" panose="02020603050405020304" pitchFamily="18" charset="0"/>
+              <a:cs typeface="Times New Roman" panose="02020603050405020304" pitchFamily="18" charset="0"/>
+            </a:endParaRPr>
+          </a:p>
+          <a:p>
+            <a:pPr algn="just"/>
+            <a:r>
+              <a:rPr lang="pt-BR" sz="2400" b="1" dirty="0">
+                <a:solidFill>
+                  <a:srgbClr val="FF0000"/>
+                </a:solidFill>
+                <a:latin typeface="Times New Roman" panose="02020603050405020304" pitchFamily="18" charset="0"/>
+                <a:cs typeface="Times New Roman" panose="02020603050405020304" pitchFamily="18" charset="0"/>
+              </a:rPr>
+              <a:t>SCADA</a:t>
+            </a:r>
+            <a:r>
+              <a:rPr lang="pt-BR" sz="2400" dirty="0">
+                <a:latin typeface="Times New Roman" panose="02020603050405020304" pitchFamily="18" charset="0"/>
+                <a:cs typeface="Times New Roman" panose="02020603050405020304" pitchFamily="18" charset="0"/>
+              </a:rPr>
+              <a:t> armazena, apresenta e permite controle remoto.</a:t>
+            </a:r>
+          </a:p>
+        </p:txBody>
+      </p:sp>
+    </p:spTree>
+    <p:extLst>
+      <p:ext uri="{BB962C8B-B14F-4D97-AF65-F5344CB8AC3E}">
+        <p14:creationId xmlns:p14="http://schemas.microsoft.com/office/powerpoint/2010/main" val="1890059709"/>
+      </p:ext>
+    </p:extLst>
+  </p:cSld>
+  <p:clrMapOvr>
+    <a:masterClrMapping/>
+  </p:clrMapOvr>
+  <p:transition spd="med"/>
+</p:sld>
+</file>
+
+<file path=ppt/slides/slide6.xml><?xml version="1.0" encoding="utf-8"?>
+<p:sld xmlns:a="http://schemas.openxmlformats.org/drawingml/2006/main" xmlns:r="http://schemas.openxmlformats.org/officeDocument/2006/relationships" xmlns:p="http://schemas.openxmlformats.org/presentationml/2006/main">
+  <p:cSld>
+    <p:spTree>
+      <p:nvGrpSpPr>
+        <p:cNvPr id="1" name="">
+          <a:extLst>
+            <a:ext uri="{FF2B5EF4-FFF2-40B4-BE49-F238E27FC236}">
+              <a16:creationId xmlns:a16="http://schemas.microsoft.com/office/drawing/2014/main" id="{C1A54196-07D8-8786-15F3-C2E91AA2CB8C}"/>
+            </a:ext>
+          </a:extLst>
+        </p:cNvPr>
+        <p:cNvGrpSpPr/>
+        <p:nvPr/>
+      </p:nvGrpSpPr>
+      <p:grpSpPr>
+        <a:xfrm>
+          <a:off x="0" y="0"/>
+          <a:ext cx="0" cy="0"/>
+          <a:chOff x="0" y="0"/>
+          <a:chExt cx="0" cy="0"/>
+        </a:xfrm>
+      </p:grpSpPr>
+      <p:sp>
+        <p:nvSpPr>
+          <p:cNvPr id="6" name="Title 1">
+            <a:extLst>
+              <a:ext uri="{FF2B5EF4-FFF2-40B4-BE49-F238E27FC236}">
+                <a16:creationId xmlns:a16="http://schemas.microsoft.com/office/drawing/2014/main" id="{A7DF5E19-4979-3A26-6488-9B0710457FDD}"/>
+              </a:ext>
+            </a:extLst>
+          </p:cNvPr>
+          <p:cNvSpPr>
+            <a:spLocks noGrp="1"/>
+          </p:cNvSpPr>
+          <p:nvPr>
+            <p:ph type="title"/>
+          </p:nvPr>
+        </p:nvSpPr>
+        <p:spPr>
+          <a:xfrm>
+            <a:off x="457200" y="205980"/>
+            <a:ext cx="8229600" cy="857251"/>
+          </a:xfrm>
+        </p:spPr>
+        <p:txBody>
+          <a:bodyPr>
+            <a:normAutofit fontScale="90000"/>
+          </a:bodyPr>
+          <a:lstStyle/>
+          <a:p>
+            <a:r>
+              <a:rPr lang="en-US" b="1" dirty="0">
+                <a:solidFill>
+                  <a:srgbClr val="0070C0"/>
+                </a:solidFill>
+              </a:rPr>
+              <a:t>CLP – </a:t>
+            </a:r>
+            <a:r>
+              <a:rPr lang="en-US" b="1" dirty="0" err="1">
+                <a:solidFill>
+                  <a:srgbClr val="0070C0"/>
+                </a:solidFill>
+              </a:rPr>
+              <a:t>Vantagens</a:t>
+            </a:r>
+            <a:r>
+              <a:rPr lang="en-US" b="1" dirty="0">
+                <a:solidFill>
+                  <a:srgbClr val="0070C0"/>
+                </a:solidFill>
+              </a:rPr>
+              <a:t> </a:t>
+            </a:r>
+            <a:r>
+              <a:rPr lang="en-US" b="1" dirty="0" err="1">
+                <a:solidFill>
+                  <a:srgbClr val="0070C0"/>
+                </a:solidFill>
+              </a:rPr>
+              <a:t>Arq</a:t>
+            </a:r>
+            <a:r>
+              <a:rPr lang="en-US" b="1" dirty="0">
+                <a:solidFill>
+                  <a:srgbClr val="0070C0"/>
+                </a:solidFill>
+              </a:rPr>
+              <a:t>. SCADA com CLP</a:t>
+            </a:r>
+          </a:p>
+        </p:txBody>
+      </p:sp>
+      <p:sp>
+        <p:nvSpPr>
+          <p:cNvPr id="8" name="Text Placeholder 2">
+            <a:extLst>
+              <a:ext uri="{FF2B5EF4-FFF2-40B4-BE49-F238E27FC236}">
+                <a16:creationId xmlns:a16="http://schemas.microsoft.com/office/drawing/2014/main" id="{715B49C9-B564-DE16-14DC-386CA950CE34}"/>
+              </a:ext>
+            </a:extLst>
+          </p:cNvPr>
+          <p:cNvSpPr>
+            <a:spLocks noGrp="1"/>
+          </p:cNvSpPr>
+          <p:nvPr>
+            <p:ph type="body" sz="half" idx="1"/>
+          </p:nvPr>
+        </p:nvSpPr>
+        <p:spPr>
+          <a:xfrm>
+            <a:off x="142865" y="1035050"/>
+            <a:ext cx="8865056" cy="3994150"/>
+          </a:xfrm>
+        </p:spPr>
+        <p:txBody>
+          <a:bodyPr>
+            <a:noAutofit/>
+          </a:bodyPr>
+          <a:lstStyle/>
+          <a:p>
+            <a:pPr marL="0" indent="0" algn="just">
+              <a:buNone/>
+            </a:pPr>
+            <a:r>
+              <a:rPr lang="pt-BR" sz="2400" b="1" dirty="0">
+                <a:latin typeface="Times New Roman" panose="02020603050405020304" pitchFamily="18" charset="0"/>
+                <a:cs typeface="Times New Roman" panose="02020603050405020304" pitchFamily="18" charset="0"/>
+              </a:rPr>
+              <a:t>	</a:t>
+            </a:r>
+            <a:endParaRPr lang="pt-BR" sz="2400" dirty="0">
+              <a:latin typeface="Times New Roman" panose="02020603050405020304" pitchFamily="18" charset="0"/>
+              <a:cs typeface="Times New Roman" panose="02020603050405020304" pitchFamily="18" charset="0"/>
+            </a:endParaRPr>
+          </a:p>
+          <a:p>
+            <a:pPr algn="just"/>
+            <a:r>
+              <a:rPr lang="pt-BR" sz="2400" b="1" dirty="0">
+                <a:latin typeface="Times New Roman" panose="02020603050405020304" pitchFamily="18" charset="0"/>
+                <a:cs typeface="Times New Roman" panose="02020603050405020304" pitchFamily="18" charset="0"/>
+              </a:rPr>
+              <a:t>Monitoramento</a:t>
+            </a:r>
+            <a:r>
+              <a:rPr lang="pt-BR" sz="2400" dirty="0">
+                <a:latin typeface="Times New Roman" panose="02020603050405020304" pitchFamily="18" charset="0"/>
+                <a:cs typeface="Times New Roman" panose="02020603050405020304" pitchFamily="18" charset="0"/>
+              </a:rPr>
+              <a:t> em tempo real;</a:t>
+            </a:r>
+          </a:p>
+          <a:p>
+            <a:pPr algn="just"/>
+            <a:endParaRPr lang="pt-BR" sz="2400" dirty="0">
+              <a:latin typeface="Times New Roman" panose="02020603050405020304" pitchFamily="18" charset="0"/>
+              <a:cs typeface="Times New Roman" panose="02020603050405020304" pitchFamily="18" charset="0"/>
+            </a:endParaRPr>
+          </a:p>
+          <a:p>
+            <a:pPr algn="just"/>
+            <a:r>
+              <a:rPr lang="pt-BR" sz="2400" b="1" dirty="0">
+                <a:latin typeface="Times New Roman" panose="02020603050405020304" pitchFamily="18" charset="0"/>
+                <a:cs typeface="Times New Roman" panose="02020603050405020304" pitchFamily="18" charset="0"/>
+              </a:rPr>
+              <a:t>Redução de falhas </a:t>
+            </a:r>
+            <a:r>
+              <a:rPr lang="pt-BR" sz="2400" dirty="0">
+                <a:latin typeface="Times New Roman" panose="02020603050405020304" pitchFamily="18" charset="0"/>
+                <a:cs typeface="Times New Roman" panose="02020603050405020304" pitchFamily="18" charset="0"/>
+              </a:rPr>
+              <a:t>e paradas;</a:t>
+            </a:r>
+          </a:p>
+          <a:p>
+            <a:pPr algn="just"/>
+            <a:endParaRPr lang="pt-BR" sz="2400" dirty="0">
+              <a:latin typeface="Times New Roman" panose="02020603050405020304" pitchFamily="18" charset="0"/>
+              <a:cs typeface="Times New Roman" panose="02020603050405020304" pitchFamily="18" charset="0"/>
+            </a:endParaRPr>
+          </a:p>
+          <a:p>
+            <a:pPr algn="just"/>
+            <a:r>
+              <a:rPr lang="pt-BR" sz="2400" dirty="0">
+                <a:latin typeface="Times New Roman" panose="02020603050405020304" pitchFamily="18" charset="0"/>
+                <a:cs typeface="Times New Roman" panose="02020603050405020304" pitchFamily="18" charset="0"/>
+              </a:rPr>
+              <a:t>Registro de histórico de eventos para </a:t>
+            </a:r>
+            <a:r>
+              <a:rPr lang="pt-BR" sz="2400" b="1" dirty="0">
+                <a:latin typeface="Times New Roman" panose="02020603050405020304" pitchFamily="18" charset="0"/>
+                <a:cs typeface="Times New Roman" panose="02020603050405020304" pitchFamily="18" charset="0"/>
+              </a:rPr>
+              <a:t>análise</a:t>
+            </a:r>
+            <a:r>
+              <a:rPr lang="pt-BR" sz="2400" dirty="0">
+                <a:latin typeface="Times New Roman" panose="02020603050405020304" pitchFamily="18" charset="0"/>
+                <a:cs typeface="Times New Roman" panose="02020603050405020304" pitchFamily="18" charset="0"/>
+              </a:rPr>
+              <a:t>;</a:t>
+            </a:r>
+          </a:p>
+          <a:p>
+            <a:pPr algn="just"/>
+            <a:endParaRPr lang="pt-BR" sz="2400" dirty="0">
+              <a:latin typeface="Times New Roman" panose="02020603050405020304" pitchFamily="18" charset="0"/>
+              <a:cs typeface="Times New Roman" panose="02020603050405020304" pitchFamily="18" charset="0"/>
+            </a:endParaRPr>
+          </a:p>
+          <a:p>
+            <a:pPr algn="just"/>
+            <a:r>
+              <a:rPr lang="pt-BR" sz="2400" dirty="0">
+                <a:latin typeface="Times New Roman" panose="02020603050405020304" pitchFamily="18" charset="0"/>
+                <a:cs typeface="Times New Roman" panose="02020603050405020304" pitchFamily="18" charset="0"/>
+              </a:rPr>
+              <a:t>Aumento da </a:t>
+            </a:r>
+            <a:r>
+              <a:rPr lang="pt-BR" sz="2400" b="1" dirty="0">
+                <a:latin typeface="Times New Roman" panose="02020603050405020304" pitchFamily="18" charset="0"/>
+                <a:cs typeface="Times New Roman" panose="02020603050405020304" pitchFamily="18" charset="0"/>
+              </a:rPr>
+              <a:t>eficiência operacional</a:t>
+            </a:r>
+            <a:r>
+              <a:rPr lang="pt-BR" sz="2400" dirty="0">
+                <a:latin typeface="Times New Roman" panose="02020603050405020304" pitchFamily="18" charset="0"/>
+                <a:cs typeface="Times New Roman" panose="02020603050405020304" pitchFamily="18" charset="0"/>
+              </a:rPr>
+              <a:t>.</a:t>
+            </a:r>
+          </a:p>
+        </p:txBody>
+      </p:sp>
+    </p:spTree>
+    <p:extLst>
+      <p:ext uri="{BB962C8B-B14F-4D97-AF65-F5344CB8AC3E}">
+        <p14:creationId xmlns:p14="http://schemas.microsoft.com/office/powerpoint/2010/main" val="2153545545"/>
+      </p:ext>
+    </p:extLst>
+  </p:cSld>
+  <p:clrMapOvr>
+    <a:masterClrMapping/>
+  </p:clrMapOvr>
+  <p:transition spd="med"/>
+</p:sld>
+</file>
+
+<file path=ppt/slides/slide7.xml><?xml version="1.0" encoding="utf-8"?>
+<p:sld xmlns:a="http://schemas.openxmlformats.org/drawingml/2006/main" xmlns:r="http://schemas.openxmlformats.org/officeDocument/2006/relationships" xmlns:p="http://schemas.openxmlformats.org/presentationml/2006/main">
+  <p:cSld>
+    <p:spTree>
+      <p:nvGrpSpPr>
+        <p:cNvPr id="1" name="">
+          <a:extLst>
+            <a:ext uri="{FF2B5EF4-FFF2-40B4-BE49-F238E27FC236}">
+              <a16:creationId xmlns:a16="http://schemas.microsoft.com/office/drawing/2014/main" id="{42749B23-ABFC-B2B0-7FA5-E49D3A5F27AC}"/>
+            </a:ext>
+          </a:extLst>
+        </p:cNvPr>
+        <p:cNvGrpSpPr/>
+        <p:nvPr/>
+      </p:nvGrpSpPr>
+      <p:grpSpPr>
+        <a:xfrm>
+          <a:off x="0" y="0"/>
+          <a:ext cx="0" cy="0"/>
+          <a:chOff x="0" y="0"/>
+          <a:chExt cx="0" cy="0"/>
+        </a:xfrm>
+      </p:grpSpPr>
+      <p:sp>
+        <p:nvSpPr>
+          <p:cNvPr id="6" name="Title 1">
+            <a:extLst>
+              <a:ext uri="{FF2B5EF4-FFF2-40B4-BE49-F238E27FC236}">
+                <a16:creationId xmlns:a16="http://schemas.microsoft.com/office/drawing/2014/main" id="{D9978273-18EF-D556-D648-FCAF64C9431F}"/>
+              </a:ext>
+            </a:extLst>
+          </p:cNvPr>
+          <p:cNvSpPr>
+            <a:spLocks noGrp="1"/>
+          </p:cNvSpPr>
+          <p:nvPr>
+            <p:ph type="title"/>
+          </p:nvPr>
+        </p:nvSpPr>
+        <p:spPr>
+          <a:xfrm>
+            <a:off x="457200" y="205980"/>
+            <a:ext cx="8229600" cy="857251"/>
+          </a:xfrm>
+        </p:spPr>
+        <p:txBody>
+          <a:bodyPr>
+            <a:normAutofit fontScale="90000"/>
+          </a:bodyPr>
+          <a:lstStyle/>
+          <a:p>
+            <a:r>
+              <a:rPr lang="en-US" b="1" dirty="0">
+                <a:solidFill>
+                  <a:srgbClr val="0070C0"/>
+                </a:solidFill>
+              </a:rPr>
+              <a:t>CLP – </a:t>
+            </a:r>
+            <a:r>
+              <a:rPr lang="en-US" b="1" dirty="0" err="1">
+                <a:solidFill>
+                  <a:srgbClr val="0070C0"/>
+                </a:solidFill>
+              </a:rPr>
+              <a:t>Exemplos</a:t>
+            </a:r>
+            <a:r>
+              <a:rPr lang="en-US" b="1" dirty="0">
+                <a:solidFill>
+                  <a:srgbClr val="0070C0"/>
+                </a:solidFill>
+              </a:rPr>
+              <a:t>: </a:t>
+            </a:r>
+            <a:r>
+              <a:rPr lang="en-US" b="1" dirty="0" err="1">
+                <a:solidFill>
+                  <a:srgbClr val="0070C0"/>
+                </a:solidFill>
+              </a:rPr>
+              <a:t>Aplicação</a:t>
+            </a:r>
+            <a:r>
+              <a:rPr lang="en-US" b="1" dirty="0">
+                <a:solidFill>
+                  <a:srgbClr val="0070C0"/>
+                </a:solidFill>
+              </a:rPr>
+              <a:t> c/ SCADA</a:t>
+            </a:r>
+          </a:p>
+        </p:txBody>
+      </p:sp>
+      <p:sp>
+        <p:nvSpPr>
+          <p:cNvPr id="8" name="Text Placeholder 2">
+            <a:extLst>
+              <a:ext uri="{FF2B5EF4-FFF2-40B4-BE49-F238E27FC236}">
+                <a16:creationId xmlns:a16="http://schemas.microsoft.com/office/drawing/2014/main" id="{91EF395D-8265-4D0D-8A6C-595A67A19F05}"/>
+              </a:ext>
+            </a:extLst>
+          </p:cNvPr>
+          <p:cNvSpPr>
+            <a:spLocks noGrp="1"/>
+          </p:cNvSpPr>
+          <p:nvPr>
+            <p:ph type="body" sz="half" idx="1"/>
+          </p:nvPr>
+        </p:nvSpPr>
+        <p:spPr>
+          <a:xfrm>
+            <a:off x="142865" y="1035050"/>
+            <a:ext cx="8865056" cy="3994150"/>
+          </a:xfrm>
+        </p:spPr>
+        <p:txBody>
+          <a:bodyPr>
+            <a:noAutofit/>
+          </a:bodyPr>
+          <a:lstStyle/>
+          <a:p>
+            <a:pPr algn="just"/>
+            <a:endParaRPr lang="pt-BR" sz="2400" dirty="0">
+              <a:latin typeface="Times New Roman" panose="02020603050405020304" pitchFamily="18" charset="0"/>
+              <a:cs typeface="Times New Roman" panose="02020603050405020304" pitchFamily="18" charset="0"/>
+            </a:endParaRPr>
+          </a:p>
+          <a:p>
+            <a:pPr algn="just"/>
+            <a:r>
+              <a:rPr lang="pt-BR" sz="2400" dirty="0">
+                <a:latin typeface="Times New Roman" panose="02020603050405020304" pitchFamily="18" charset="0"/>
+                <a:cs typeface="Times New Roman" panose="02020603050405020304" pitchFamily="18" charset="0"/>
+              </a:rPr>
+              <a:t>Fábricas automatizadas, linhas de montagem;</a:t>
+            </a:r>
+          </a:p>
+          <a:p>
+            <a:pPr algn="just"/>
+            <a:endParaRPr lang="pt-BR" sz="2400" dirty="0">
+              <a:latin typeface="Times New Roman" panose="02020603050405020304" pitchFamily="18" charset="0"/>
+              <a:cs typeface="Times New Roman" panose="02020603050405020304" pitchFamily="18" charset="0"/>
+            </a:endParaRPr>
+          </a:p>
+          <a:p>
+            <a:pPr algn="just"/>
+            <a:r>
+              <a:rPr lang="pt-BR" sz="2400" dirty="0">
+                <a:latin typeface="Times New Roman" panose="02020603050405020304" pitchFamily="18" charset="0"/>
+                <a:cs typeface="Times New Roman" panose="02020603050405020304" pitchFamily="18" charset="0"/>
+              </a:rPr>
+              <a:t>Tratamento de água e esgoto;</a:t>
+            </a:r>
+          </a:p>
+          <a:p>
+            <a:pPr algn="just"/>
+            <a:endParaRPr lang="pt-BR" sz="2400" dirty="0">
+              <a:latin typeface="Times New Roman" panose="02020603050405020304" pitchFamily="18" charset="0"/>
+              <a:cs typeface="Times New Roman" panose="02020603050405020304" pitchFamily="18" charset="0"/>
+            </a:endParaRPr>
+          </a:p>
+          <a:p>
+            <a:pPr algn="just"/>
+            <a:r>
+              <a:rPr lang="pt-BR" sz="2400" dirty="0">
+                <a:latin typeface="Times New Roman" panose="02020603050405020304" pitchFamily="18" charset="0"/>
+                <a:cs typeface="Times New Roman" panose="02020603050405020304" pitchFamily="18" charset="0"/>
+              </a:rPr>
+              <a:t>Sistemas elétricos (subestações elétricas);</a:t>
+            </a:r>
+          </a:p>
+          <a:p>
+            <a:pPr algn="just"/>
+            <a:endParaRPr lang="pt-BR" sz="2400" dirty="0">
+              <a:latin typeface="Times New Roman" panose="02020603050405020304" pitchFamily="18" charset="0"/>
+              <a:cs typeface="Times New Roman" panose="02020603050405020304" pitchFamily="18" charset="0"/>
+            </a:endParaRPr>
+          </a:p>
+          <a:p>
+            <a:pPr algn="just"/>
+            <a:r>
+              <a:rPr lang="pt-BR" sz="2400" dirty="0">
+                <a:latin typeface="Times New Roman" panose="02020603050405020304" pitchFamily="18" charset="0"/>
+                <a:cs typeface="Times New Roman" panose="02020603050405020304" pitchFamily="18" charset="0"/>
+              </a:rPr>
+              <a:t>Indústria de alimentos e bebidas.</a:t>
+            </a:r>
+          </a:p>
+        </p:txBody>
+      </p:sp>
+    </p:spTree>
+    <p:extLst>
+      <p:ext uri="{BB962C8B-B14F-4D97-AF65-F5344CB8AC3E}">
+        <p14:creationId xmlns:p14="http://schemas.microsoft.com/office/powerpoint/2010/main" val="2913324480"/>
+      </p:ext>
+    </p:extLst>
+  </p:cSld>
+  <p:clrMapOvr>
+    <a:masterClrMapping/>
+  </p:clrMapOvr>
+  <p:transition spd="med"/>
+</p:sld>
+</file>
+
+<file path=ppt/slides/slide8.xml><?xml version="1.0" encoding="utf-8"?>
 <p:sld xmlns:a="http://schemas.openxmlformats.org/drawingml/2006/main" xmlns:r="http://schemas.openxmlformats.org/officeDocument/2006/relationships" xmlns:p="http://schemas.openxmlformats.org/presentationml/2006/main">
   <p:cSld>
     <p:spTree>
@@ -4568,14 +8068,7 @@
                 <a:latin typeface="Times New Roman" panose="02020603050405020304" pitchFamily="18" charset="0"/>
                 <a:cs typeface="Times New Roman" panose="02020603050405020304" pitchFamily="18" charset="0"/>
               </a:rPr>
-              <a:t>CLP Sistemas SCADA 1</a:t>
-            </a:r>
-            <a:r>
-              <a:rPr lang="pt-BR" sz="2200" dirty="0">
-                <a:latin typeface="Times New Roman" panose="02020603050405020304" pitchFamily="18" charset="0"/>
-                <a:cs typeface="Times New Roman" panose="02020603050405020304" pitchFamily="18" charset="0"/>
-              </a:rPr>
-              <a:t>.</a:t>
+              <a:t>Aplicações E Análise De Sistemas Supervisórios "SCADA"</a:t>
             </a:r>
           </a:p>
           <a:p>
@@ -4590,8 +8083,13 @@
                 <a:latin typeface="Times New Roman" panose="02020603050405020304" pitchFamily="18" charset="0"/>
                 <a:cs typeface="Times New Roman" panose="02020603050405020304" pitchFamily="18" charset="0"/>
               </a:rPr>
-              <a:t>Disponível em: </a:t>
-            </a:r>
+              <a:t>Disponível em:</a:t>
+            </a:r>
+          </a:p>
+          <a:p>
+            <a:pPr marL="0" indent="0" algn="just">
+              <a:buNone/>
+            </a:pPr>
             <a:r>
               <a:rPr lang="pt-BR" sz="2200" dirty="0">
                 <a:solidFill>
@@ -4601,15 +8099,18 @@
                 <a:cs typeface="Times New Roman" panose="02020603050405020304" pitchFamily="18" charset="0"/>
                 <a:hlinkClick r:id="rId3"/>
               </a:rPr>
-              <a:t>h</a:t>
-            </a:r>
-            <a:endParaRPr lang="pt-BR" sz="2200" dirty="0">
-              <a:solidFill>
-                <a:srgbClr val="FF0000"/>
-              </a:solidFill>
-              <a:latin typeface="Times New Roman" panose="02020603050405020304" pitchFamily="18" charset="0"/>
-              <a:cs typeface="Times New Roman" panose="02020603050405020304" pitchFamily="18" charset="0"/>
-            </a:endParaRPr>
+              <a:t>https://www.ifg.edu.br/attachments/article/3018/IC_2011_Geyverson%20Durigon.pdf</a:t>
+            </a:r>
+            <a:r>
+              <a:rPr lang="pt-BR" sz="2200" dirty="0">
+                <a:solidFill>
+                  <a:srgbClr val="FF0000"/>
+                </a:solidFill>
+                <a:latin typeface="Times New Roman" panose="02020603050405020304" pitchFamily="18" charset="0"/>
+                <a:cs typeface="Times New Roman" panose="02020603050405020304" pitchFamily="18" charset="0"/>
+              </a:rPr>
+              <a:t> </a:t>
+            </a:r>
           </a:p>
           <a:p>
             <a:pPr marL="0" indent="0" algn="just">
@@ -4627,6 +8128,20 @@
             <a:pPr marL="0" indent="0" algn="just">
               <a:buNone/>
             </a:pPr>
+            <a:r>
+              <a:rPr lang="pt-BR" sz="2200" dirty="0">
+                <a:latin typeface="Times New Roman" panose="02020603050405020304" pitchFamily="18" charset="0"/>
+                <a:cs typeface="Times New Roman" panose="02020603050405020304" pitchFamily="18" charset="0"/>
+              </a:rPr>
+              <a:t>[2] </a:t>
+            </a:r>
+            <a:r>
+              <a:rPr lang="pt-BR" sz="2200" b="1" dirty="0">
+                <a:latin typeface="Times New Roman" panose="02020603050405020304" pitchFamily="18" charset="0"/>
+                <a:cs typeface="Times New Roman" panose="02020603050405020304" pitchFamily="18" charset="0"/>
+              </a:rPr>
+              <a:t>Sistemas Supervisórios</a:t>
+            </a:r>
             <a:endParaRPr lang="pt-BR" sz="2200" dirty="0">
               <a:latin typeface="Times New Roman" panose="02020603050405020304" pitchFamily="18" charset="0"/>
               <a:cs typeface="Times New Roman" panose="02020603050405020304" pitchFamily="18" charset="0"/>
@@ -4637,25 +8152,14 @@
               <a:buNone/>
             </a:pPr>
             <a:r>
-              <a:rPr lang="pt-BR" sz="2200" dirty="0">
-                <a:latin typeface="Times New Roman" panose="02020603050405020304" pitchFamily="18" charset="0"/>
-                <a:cs typeface="Times New Roman" panose="02020603050405020304" pitchFamily="18" charset="0"/>
-              </a:rPr>
-              <a:t>[2] </a:t>
-            </a:r>
-            <a:r>
               <a:rPr lang="pt-BR" sz="2200" b="1" dirty="0">
-                <a:latin typeface="Times New Roman" panose="02020603050405020304" pitchFamily="18" charset="0"/>
-                <a:cs typeface="Times New Roman" panose="02020603050405020304" pitchFamily="18" charset="0"/>
-              </a:rPr>
-              <a:t>CLP Sistemas SCADA 2</a:t>
-            </a:r>
-            <a:r>
-              <a:rPr lang="pt-BR" sz="2200" dirty="0">
-                <a:latin typeface="Times New Roman" panose="02020603050405020304" pitchFamily="18" charset="0"/>
-                <a:cs typeface="Times New Roman" panose="02020603050405020304" pitchFamily="18" charset="0"/>
-              </a:rPr>
-              <a:t>. </a:t>
+                <a:solidFill>
+                  <a:srgbClr val="FF0000"/>
+                </a:solidFill>
+                <a:latin typeface="Times New Roman" panose="02020603050405020304" pitchFamily="18" charset="0"/>
+                <a:cs typeface="Times New Roman" panose="02020603050405020304" pitchFamily="18" charset="0"/>
+              </a:rPr>
+              <a:t>Disponível em:</a:t>
             </a:r>
           </a:p>
           <a:p>
@@ -4663,14 +8167,15 @@
               <a:buNone/>
             </a:pPr>
             <a:r>
-              <a:rPr lang="pt-BR" sz="2200" b="1" dirty="0">
+              <a:rPr lang="pt-BR" sz="2200" dirty="0">
                 <a:solidFill>
                   <a:srgbClr val="FF0000"/>
                 </a:solidFill>
                 <a:latin typeface="Times New Roman" panose="02020603050405020304" pitchFamily="18" charset="0"/>
                 <a:cs typeface="Times New Roman" panose="02020603050405020304" pitchFamily="18" charset="0"/>
-              </a:rPr>
-              <a:t>Disponível em: </a:t>
+                <a:hlinkClick r:id="rId4"/>
+              </a:rPr>
+              <a:t>https://dspace.doctum.edu.br/bitstream/123456789/3885/1/Sistema%20Supervis%C3%B3rio%20_Artigo_2021_2.pdf</a:t>
             </a:r>
             <a:r>
               <a:rPr lang="pt-BR" sz="2200" dirty="0">
@@ -4679,9 +8184,8 @@
                 </a:solidFill>
                 <a:latin typeface="Times New Roman" panose="02020603050405020304" pitchFamily="18" charset="0"/>
                 <a:cs typeface="Times New Roman" panose="02020603050405020304" pitchFamily="18" charset="0"/>
-                <a:hlinkClick r:id="rId4"/>
-              </a:rPr>
-              <a:t>h</a:t>
+              </a:rPr>
+              <a:t> </a:t>
             </a:r>
             <a:endParaRPr lang="pt-BR" sz="2200" dirty="0">
               <a:latin typeface="Calibri" panose="020F0502020204030204" pitchFamily="34" charset="0"/>
@@ -4703,7 +8207,7 @@
 </p:sld>
 </file>
 
-<file path=ppt/slides/slide5.xml><?xml version="1.0" encoding="utf-8"?>
+<file path=ppt/slides/slide9.xml><?xml version="1.0" encoding="utf-8"?>
 <p:sld xmlns:a="http://schemas.openxmlformats.org/drawingml/2006/main" xmlns:r="http://schemas.openxmlformats.org/officeDocument/2006/relationships" xmlns:p="http://schemas.openxmlformats.org/presentationml/2006/main">
   <p:cSld>
     <p:spTree>
@@ -4798,35 +8302,42 @@
                 <a:latin typeface="Times New Roman" panose="02020603050405020304" pitchFamily="18" charset="0"/>
                 <a:cs typeface="Times New Roman" panose="02020603050405020304" pitchFamily="18" charset="0"/>
               </a:rPr>
-              <a:t>CLP Sistemas SCADA 1.</a:t>
-            </a:r>
-          </a:p>
-          <a:p>
-            <a:pPr marL="0" indent="0" algn="just">
-              <a:buNone/>
-            </a:pPr>
-            <a:r>
-              <a:rPr lang="pt-BR" sz="2200" b="1" dirty="0">
-                <a:solidFill>
-                  <a:srgbClr val="FF0000"/>
-                </a:solidFill>
-                <a:latin typeface="Times New Roman" panose="02020603050405020304" pitchFamily="18" charset="0"/>
-                <a:cs typeface="Times New Roman" panose="02020603050405020304" pitchFamily="18" charset="0"/>
-              </a:rPr>
-              <a:t>Disponível em: </a:t>
-            </a:r>
-            <a:r>
-              <a:rPr lang="pt-BR" sz="2200" dirty="0">
-                <a:latin typeface="Times New Roman" panose="02020603050405020304" pitchFamily="18" charset="0"/>
-                <a:cs typeface="Times New Roman" panose="02020603050405020304" pitchFamily="18" charset="0"/>
-                <a:hlinkClick r:id="rId3"/>
-              </a:rPr>
-              <a:t>https:</a:t>
+              <a:t>Sistemas Supervisórios SCADA</a:t>
             </a:r>
             <a:endParaRPr lang="pt-BR" sz="2200" dirty="0">
               <a:latin typeface="Times New Roman" panose="02020603050405020304" pitchFamily="18" charset="0"/>
               <a:cs typeface="Times New Roman" panose="02020603050405020304" pitchFamily="18" charset="0"/>
             </a:endParaRPr>
+          </a:p>
+          <a:p>
+            <a:pPr marL="0" indent="0" algn="just">
+              <a:buNone/>
+            </a:pPr>
+            <a:r>
+              <a:rPr lang="pt-BR" sz="2200" b="1" dirty="0">
+                <a:solidFill>
+                  <a:srgbClr val="FF0000"/>
+                </a:solidFill>
+                <a:latin typeface="Times New Roman" panose="02020603050405020304" pitchFamily="18" charset="0"/>
+                <a:cs typeface="Times New Roman" panose="02020603050405020304" pitchFamily="18" charset="0"/>
+              </a:rPr>
+              <a:t>Disponível em: </a:t>
+            </a:r>
+            <a:r>
+              <a:rPr lang="pt-BR" sz="2200" dirty="0">
+                <a:latin typeface="Times New Roman" panose="02020603050405020304" pitchFamily="18" charset="0"/>
+                <a:cs typeface="Times New Roman" panose="02020603050405020304" pitchFamily="18" charset="0"/>
+                <a:hlinkClick r:id="rId3"/>
+              </a:rPr>
+              <a:t>https://youtu.be/jtvd3-4Z3ik</a:t>
+            </a:r>
+            <a:r>
+              <a:rPr lang="pt-BR" sz="2200" dirty="0">
+                <a:latin typeface="Times New Roman" panose="02020603050405020304" pitchFamily="18" charset="0"/>
+                <a:cs typeface="Times New Roman" panose="02020603050405020304" pitchFamily="18" charset="0"/>
+              </a:rPr>
+              <a:t> </a:t>
+            </a:r>
           </a:p>
           <a:p>
             <a:pPr marL="0" indent="0" algn="just">
@@ -4850,41 +8361,58 @@
             <a:pPr marL="0" indent="0" algn="just">
               <a:buNone/>
             </a:pPr>
-            <a:r>
-              <a:rPr lang="pt-BR" sz="2200" dirty="0">
-                <a:latin typeface="Times New Roman" panose="02020603050405020304" pitchFamily="18" charset="0"/>
-                <a:cs typeface="Times New Roman" panose="02020603050405020304" pitchFamily="18" charset="0"/>
-              </a:rPr>
-              <a:t>[2] </a:t>
-            </a:r>
-            <a:r>
-              <a:rPr lang="pt-BR" sz="2200" b="1">
-                <a:latin typeface="Times New Roman" panose="02020603050405020304" pitchFamily="18" charset="0"/>
-                <a:cs typeface="Times New Roman" panose="02020603050405020304" pitchFamily="18" charset="0"/>
-              </a:rPr>
-              <a:t>CLP Sistemas SCADA </a:t>
-            </a:r>
-            <a:r>
-              <a:rPr lang="pt-BR" sz="2200" b="1" dirty="0">
-                <a:latin typeface="Times New Roman" panose="02020603050405020304" pitchFamily="18" charset="0"/>
-                <a:cs typeface="Times New Roman" panose="02020603050405020304" pitchFamily="18" charset="0"/>
-              </a:rPr>
-              <a:t>2.</a:t>
-            </a:r>
+            <a:endParaRPr lang="pt-BR" sz="2200" dirty="0">
+              <a:latin typeface="Times New Roman" panose="02020603050405020304" pitchFamily="18" charset="0"/>
+              <a:cs typeface="Times New Roman" panose="02020603050405020304" pitchFamily="18" charset="0"/>
+            </a:endParaRPr>
           </a:p>
           <a:p>
             <a:pPr marL="0" indent="0" algn="just">
               <a:buNone/>
             </a:pPr>
             <a:r>
+              <a:rPr lang="pt-BR" sz="2200" dirty="0">
+                <a:latin typeface="Times New Roman" panose="02020603050405020304" pitchFamily="18" charset="0"/>
+                <a:cs typeface="Times New Roman" panose="02020603050405020304" pitchFamily="18" charset="0"/>
+              </a:rPr>
+              <a:t>[2] </a:t>
+            </a:r>
+            <a:r>
               <a:rPr lang="pt-BR" sz="2200" b="1" dirty="0">
+                <a:latin typeface="Times New Roman" panose="02020603050405020304" pitchFamily="18" charset="0"/>
+                <a:cs typeface="Times New Roman" panose="02020603050405020304" pitchFamily="18" charset="0"/>
+              </a:rPr>
+              <a:t>Sistemas Supervisórios SCADA</a:t>
+            </a:r>
+          </a:p>
+          <a:p>
+            <a:pPr marL="0" indent="0" algn="just">
+              <a:buNone/>
+            </a:pPr>
+            <a:r>
+              <a:rPr lang="pt-BR" sz="2200" b="1" dirty="0">
                 <a:solidFill>
                   <a:srgbClr val="FF0000"/>
                 </a:solidFill>
                 <a:latin typeface="Times New Roman" panose="02020603050405020304" pitchFamily="18" charset="0"/>
                 <a:cs typeface="Times New Roman" panose="02020603050405020304" pitchFamily="18" charset="0"/>
               </a:rPr>
-              <a:t>Disponível em: </a:t>
+              <a:t>Disponível em:</a:t>
+            </a:r>
+          </a:p>
+          <a:p>
+            <a:pPr marL="0" indent="0" algn="just">
+              <a:buNone/>
+            </a:pPr>
+            <a:r>
+              <a:rPr lang="pt-BR" sz="2200" b="1" dirty="0">
+                <a:solidFill>
+                  <a:srgbClr val="FF0000"/>
+                </a:solidFill>
+                <a:latin typeface="Times New Roman" panose="02020603050405020304" pitchFamily="18" charset="0"/>
+                <a:cs typeface="Times New Roman" panose="02020603050405020304" pitchFamily="18" charset="0"/>
+              </a:rPr>
+              <a:t> </a:t>
             </a:r>
             <a:r>
               <a:rPr lang="pt-BR" sz="2200" dirty="0">
@@ -4895,7 +8423,38 @@
                 <a:cs typeface="Times New Roman" panose="02020603050405020304" pitchFamily="18" charset="0"/>
                 <a:hlinkClick r:id="rId4"/>
               </a:rPr>
-              <a:t>https:</a:t>
+              <a:t>https://youtu.be/672Myg3h58o</a:t>
+            </a:r>
+            <a:r>
+              <a:rPr lang="pt-BR" sz="2200" dirty="0">
+                <a:solidFill>
+                  <a:srgbClr val="FF0000"/>
+                </a:solidFill>
+                <a:latin typeface="Times New Roman" panose="02020603050405020304" pitchFamily="18" charset="0"/>
+                <a:cs typeface="Times New Roman" panose="02020603050405020304" pitchFamily="18" charset="0"/>
+              </a:rPr>
+              <a:t> ; </a:t>
+            </a:r>
+            <a:r>
+              <a:rPr lang="pt-BR" sz="2200" dirty="0">
+                <a:solidFill>
+                  <a:srgbClr val="FF0000"/>
+                </a:solidFill>
+                <a:latin typeface="Times New Roman" panose="02020603050405020304" pitchFamily="18" charset="0"/>
+                <a:cs typeface="Times New Roman" panose="02020603050405020304" pitchFamily="18" charset="0"/>
+                <a:hlinkClick r:id="rId5"/>
+              </a:rPr>
+              <a:t>https://youtu.be/VugW_0kmf1I</a:t>
+            </a:r>
+            <a:r>
+              <a:rPr lang="pt-BR" sz="2200" dirty="0">
+                <a:solidFill>
+                  <a:srgbClr val="FF0000"/>
+                </a:solidFill>
+                <a:latin typeface="Times New Roman" panose="02020603050405020304" pitchFamily="18" charset="0"/>
+                <a:cs typeface="Times New Roman" panose="02020603050405020304" pitchFamily="18" charset="0"/>
+              </a:rPr>
+              <a:t> </a:t>
             </a:r>
             <a:endParaRPr lang="pt-BR" sz="2200" dirty="0">
               <a:latin typeface="Times New Roman" panose="02020603050405020304" pitchFamily="18" charset="0"/>
@@ -4910,779 +8469,6 @@
         <p14:creationId xmlns:p14="http://schemas.microsoft.com/office/powerpoint/2010/main" val="2747596967"/>
       </p:ext>
     </p:extLst>
-  </p:cSld>
-  <p:clrMapOvr>
-    <a:masterClrMapping/>
-  </p:clrMapOvr>
-  <p:transition spd="med"/>
-</p:sld>
-</file>
-
-<file path=ppt/slides/slide6.xml><?xml version="1.0" encoding="utf-8"?>
-<p:sld xmlns:a="http://schemas.openxmlformats.org/drawingml/2006/main" xmlns:r="http://schemas.openxmlformats.org/officeDocument/2006/relationships" xmlns:p="http://schemas.openxmlformats.org/presentationml/2006/main">
-  <p:cSld>
-    <p:spTree>
-      <p:nvGrpSpPr>
-        <p:cNvPr id="1" name="">
-          <a:extLst>
-            <a:ext uri="{FF2B5EF4-FFF2-40B4-BE49-F238E27FC236}">
-              <a16:creationId xmlns:a16="http://schemas.microsoft.com/office/drawing/2014/main" id="{2953AC7D-8CF9-A63F-57A2-D983DEB50039}"/>
-            </a:ext>
-          </a:extLst>
-        </p:cNvPr>
-        <p:cNvGrpSpPr/>
-        <p:nvPr/>
-      </p:nvGrpSpPr>
-      <p:grpSpPr>
-        <a:xfrm>
-          <a:off x="0" y="0"/>
-          <a:ext cx="0" cy="0"/>
-          <a:chOff x="0" y="0"/>
-          <a:chExt cx="0" cy="0"/>
-        </a:xfrm>
-      </p:grpSpPr>
-      <p:sp>
-        <p:nvSpPr>
-          <p:cNvPr id="6" name="Title 1">
-            <a:extLst>
-              <a:ext uri="{FF2B5EF4-FFF2-40B4-BE49-F238E27FC236}">
-                <a16:creationId xmlns:a16="http://schemas.microsoft.com/office/drawing/2014/main" id="{CC4C3A19-ED0C-1CE0-1512-03DBBA8E622A}"/>
-              </a:ext>
-            </a:extLst>
-          </p:cNvPr>
-          <p:cNvSpPr>
-            <a:spLocks noGrp="1"/>
-          </p:cNvSpPr>
-          <p:nvPr>
-            <p:ph type="title"/>
-          </p:nvPr>
-        </p:nvSpPr>
-        <p:spPr>
-          <a:xfrm>
-            <a:off x="457200" y="205980"/>
-            <a:ext cx="8229600" cy="857251"/>
-          </a:xfrm>
-        </p:spPr>
-        <p:txBody>
-          <a:bodyPr>
-            <a:normAutofit/>
-          </a:bodyPr>
-          <a:lstStyle/>
-          <a:p>
-            <a:r>
-              <a:rPr lang="en-US" b="1" dirty="0" err="1">
-                <a:solidFill>
-                  <a:srgbClr val="0070C0"/>
-                </a:solidFill>
-              </a:rPr>
-              <a:t>Dinâmica</a:t>
-            </a:r>
-            <a:r>
-              <a:rPr lang="en-US" b="1" dirty="0">
-                <a:solidFill>
-                  <a:srgbClr val="0070C0"/>
-                </a:solidFill>
-              </a:rPr>
-              <a:t>/</a:t>
-            </a:r>
-            <a:r>
-              <a:rPr lang="en-US" b="1" dirty="0" err="1">
-                <a:solidFill>
-                  <a:srgbClr val="0070C0"/>
-                </a:solidFill>
-              </a:rPr>
-              <a:t>Atividades</a:t>
-            </a:r>
-            <a:endParaRPr lang="en-US" b="1" dirty="0">
-              <a:solidFill>
-                <a:srgbClr val="0070C0"/>
-              </a:solidFill>
-            </a:endParaRPr>
-          </a:p>
-        </p:txBody>
-      </p:sp>
-      <p:sp>
-        <p:nvSpPr>
-          <p:cNvPr id="8" name="Text Placeholder 2">
-            <a:extLst>
-              <a:ext uri="{FF2B5EF4-FFF2-40B4-BE49-F238E27FC236}">
-                <a16:creationId xmlns:a16="http://schemas.microsoft.com/office/drawing/2014/main" id="{B45119E1-EF11-7248-2ADA-8776A0D7E7E3}"/>
-              </a:ext>
-            </a:extLst>
-          </p:cNvPr>
-          <p:cNvSpPr>
-            <a:spLocks noGrp="1"/>
-          </p:cNvSpPr>
-          <p:nvPr>
-            <p:ph type="body" sz="half" idx="1"/>
-          </p:nvPr>
-        </p:nvSpPr>
-        <p:spPr>
-          <a:xfrm>
-            <a:off x="142865" y="1035050"/>
-            <a:ext cx="8865056" cy="3994150"/>
-          </a:xfrm>
-        </p:spPr>
-        <p:txBody>
-          <a:bodyPr>
-            <a:noAutofit/>
-          </a:bodyPr>
-          <a:lstStyle/>
-          <a:p>
-            <a:pPr algn="just">
-              <a:buFont typeface="Wingdings" panose="05000000000000000000" pitchFamily="2" charset="2"/>
-              <a:buChar char="q"/>
-            </a:pPr>
-            <a:r>
-              <a:rPr lang="pt-BR" sz="2200" b="1" dirty="0">
-                <a:solidFill>
-                  <a:srgbClr val="0070C0"/>
-                </a:solidFill>
-                <a:latin typeface="Times New Roman" panose="02020603050405020304" pitchFamily="18" charset="0"/>
-                <a:cs typeface="Times New Roman" panose="02020603050405020304" pitchFamily="18" charset="0"/>
-              </a:rPr>
-              <a:t>CLP</a:t>
-            </a:r>
-          </a:p>
-        </p:txBody>
-      </p:sp>
-    </p:spTree>
-    <p:extLst>
-      <p:ext uri="{BB962C8B-B14F-4D97-AF65-F5344CB8AC3E}">
-        <p14:creationId xmlns:p14="http://schemas.microsoft.com/office/powerpoint/2010/main" val="2976682751"/>
-      </p:ext>
-    </p:extLst>
-  </p:cSld>
-  <p:clrMapOvr>
-    <a:masterClrMapping/>
-  </p:clrMapOvr>
-  <p:transition spd="med"/>
-</p:sld>
-</file>
-
-<file path=ppt/slides/slide7.xml><?xml version="1.0" encoding="utf-8"?>
-<p:sld xmlns:a="http://schemas.openxmlformats.org/drawingml/2006/main" xmlns:r="http://schemas.openxmlformats.org/officeDocument/2006/relationships" xmlns:p="http://schemas.openxmlformats.org/presentationml/2006/main">
-  <p:cSld>
-    <p:spTree>
-      <p:nvGrpSpPr>
-        <p:cNvPr id="1" name=""/>
-        <p:cNvGrpSpPr/>
-        <p:nvPr/>
-      </p:nvGrpSpPr>
-      <p:grpSpPr>
-        <a:xfrm>
-          <a:off x="0" y="0"/>
-          <a:ext cx="0" cy="0"/>
-          <a:chOff x="0" y="0"/>
-          <a:chExt cx="0" cy="0"/>
-        </a:xfrm>
-      </p:grpSpPr>
-      <p:sp>
-        <p:nvSpPr>
-          <p:cNvPr id="6" name="Title 1"/>
-          <p:cNvSpPr>
-            <a:spLocks noGrp="1"/>
-          </p:cNvSpPr>
-          <p:nvPr>
-            <p:ph type="title"/>
-          </p:nvPr>
-        </p:nvSpPr>
-        <p:spPr>
-          <a:xfrm>
-            <a:off x="457200" y="205980"/>
-            <a:ext cx="8229600" cy="857251"/>
-          </a:xfrm>
-        </p:spPr>
-        <p:txBody>
-          <a:bodyPr>
-            <a:normAutofit/>
-          </a:bodyPr>
-          <a:lstStyle/>
-          <a:p>
-            <a:r>
-              <a:rPr lang="en-US" b="1" dirty="0" err="1">
-                <a:solidFill>
-                  <a:srgbClr val="0070C0"/>
-                </a:solidFill>
-              </a:rPr>
-              <a:t>Referências</a:t>
-            </a:r>
-            <a:r>
-              <a:rPr lang="en-US" b="1" dirty="0">
-                <a:solidFill>
-                  <a:srgbClr val="0070C0"/>
-                </a:solidFill>
-              </a:rPr>
-              <a:t> </a:t>
-            </a:r>
-            <a:r>
-              <a:rPr lang="en-US" b="1" dirty="0" err="1">
-                <a:solidFill>
-                  <a:srgbClr val="0070C0"/>
-                </a:solidFill>
-              </a:rPr>
-              <a:t>Bibliográficas</a:t>
-            </a:r>
-            <a:endParaRPr lang="en-US" b="1" dirty="0">
-              <a:solidFill>
-                <a:srgbClr val="0070C0"/>
-              </a:solidFill>
-            </a:endParaRPr>
-          </a:p>
-        </p:txBody>
-      </p:sp>
-      <p:sp>
-        <p:nvSpPr>
-          <p:cNvPr id="8" name="Text Placeholder 2"/>
-          <p:cNvSpPr>
-            <a:spLocks noGrp="1"/>
-          </p:cNvSpPr>
-          <p:nvPr>
-            <p:ph type="body" sz="half" idx="1"/>
-          </p:nvPr>
-        </p:nvSpPr>
-        <p:spPr>
-          <a:xfrm>
-            <a:off x="139472" y="1063230"/>
-            <a:ext cx="8865056" cy="3874289"/>
-          </a:xfrm>
-        </p:spPr>
-        <p:txBody>
-          <a:bodyPr>
-            <a:noAutofit/>
-          </a:bodyPr>
-          <a:lstStyle/>
-          <a:p>
-            <a:pPr marL="0" indent="0" algn="just">
-              <a:buNone/>
-            </a:pPr>
-            <a:r>
-              <a:rPr lang="pt-BR" sz="2000" dirty="0">
-                <a:latin typeface="Times New Roman" panose="02020603050405020304" pitchFamily="18" charset="0"/>
-                <a:cs typeface="Times New Roman" panose="02020603050405020304" pitchFamily="18" charset="0"/>
-              </a:rPr>
-              <a:t>[1] </a:t>
-            </a:r>
-            <a:endParaRPr lang="pt-BR" sz="2000" b="1" dirty="0">
-              <a:latin typeface="Times New Roman" panose="02020603050405020304" pitchFamily="18" charset="0"/>
-              <a:cs typeface="Times New Roman" panose="02020603050405020304" pitchFamily="18" charset="0"/>
-            </a:endParaRPr>
-          </a:p>
-          <a:p>
-            <a:pPr marL="0" indent="0" algn="just">
-              <a:buNone/>
-            </a:pPr>
-            <a:endParaRPr lang="en-US" sz="2000" dirty="0">
-              <a:latin typeface="Times New Roman" panose="02020603050405020304" pitchFamily="18" charset="0"/>
-              <a:cs typeface="Times New Roman" panose="02020603050405020304" pitchFamily="18" charset="0"/>
-            </a:endParaRPr>
-          </a:p>
-          <a:p>
-            <a:pPr marL="0" indent="0" algn="just">
-              <a:buNone/>
-            </a:pPr>
-            <a:endParaRPr lang="en-US" sz="2000" dirty="0">
-              <a:latin typeface="Times New Roman" panose="02020603050405020304" pitchFamily="18" charset="0"/>
-              <a:cs typeface="Times New Roman" panose="02020603050405020304" pitchFamily="18" charset="0"/>
-            </a:endParaRPr>
-          </a:p>
-          <a:p>
-            <a:pPr marL="0" indent="0" algn="just">
-              <a:buNone/>
-            </a:pPr>
-            <a:endParaRPr lang="en-US" sz="2000" dirty="0">
-              <a:latin typeface="Times New Roman" panose="02020603050405020304" pitchFamily="18" charset="0"/>
-              <a:cs typeface="Times New Roman" panose="02020603050405020304" pitchFamily="18" charset="0"/>
-            </a:endParaRPr>
-          </a:p>
-          <a:p>
-            <a:pPr marL="0" indent="0" algn="just">
-              <a:buNone/>
-            </a:pPr>
-            <a:endParaRPr lang="en-US" sz="2000" dirty="0">
-              <a:latin typeface="Times New Roman" panose="02020603050405020304" pitchFamily="18" charset="0"/>
-              <a:cs typeface="Times New Roman" panose="02020603050405020304" pitchFamily="18" charset="0"/>
-            </a:endParaRPr>
-          </a:p>
-          <a:p>
-            <a:pPr marL="0" indent="0" algn="just">
-              <a:buNone/>
-            </a:pPr>
-            <a:r>
-              <a:rPr lang="pt-BR" sz="2000" dirty="0">
-                <a:latin typeface="Times New Roman" panose="02020603050405020304" pitchFamily="18" charset="0"/>
-                <a:cs typeface="Times New Roman" panose="02020603050405020304" pitchFamily="18" charset="0"/>
-              </a:rPr>
-              <a:t>[2] </a:t>
-            </a:r>
-            <a:endParaRPr lang="pt-BR" sz="2000" b="1" dirty="0">
-              <a:latin typeface="Times New Roman" panose="02020603050405020304" pitchFamily="18" charset="0"/>
-              <a:cs typeface="Times New Roman" panose="02020603050405020304" pitchFamily="18" charset="0"/>
-            </a:endParaRPr>
-          </a:p>
-        </p:txBody>
-      </p:sp>
-    </p:spTree>
-    <p:extLst>
-      <p:ext uri="{BB962C8B-B14F-4D97-AF65-F5344CB8AC3E}">
-        <p14:creationId xmlns:p14="http://schemas.microsoft.com/office/powerpoint/2010/main" val="1115311843"/>
-      </p:ext>
-    </p:extLst>
-  </p:cSld>
-  <p:clrMapOvr>
-    <a:masterClrMapping/>
-  </p:clrMapOvr>
-  <p:transition spd="med"/>
-</p:sld>
-</file>
-
-<file path=ppt/slides/slide8.xml><?xml version="1.0" encoding="utf-8"?>
-<p:sld xmlns:a="http://schemas.openxmlformats.org/drawingml/2006/main" xmlns:r="http://schemas.openxmlformats.org/officeDocument/2006/relationships" xmlns:p="http://schemas.openxmlformats.org/presentationml/2006/main">
-  <p:cSld>
-    <p:spTree>
-      <p:nvGrpSpPr>
-        <p:cNvPr id="1" name=""/>
-        <p:cNvGrpSpPr/>
-        <p:nvPr/>
-      </p:nvGrpSpPr>
-      <p:grpSpPr>
-        <a:xfrm>
-          <a:off x="0" y="0"/>
-          <a:ext cx="0" cy="0"/>
-          <a:chOff x="0" y="0"/>
-          <a:chExt cx="0" cy="0"/>
-        </a:xfrm>
-      </p:grpSpPr>
-      <p:pic>
-        <p:nvPicPr>
-          <p:cNvPr id="112" name="Picture 6" descr="Picture 6"/>
-          <p:cNvPicPr>
-            <a:picLocks noChangeAspect="1"/>
-          </p:cNvPicPr>
-          <p:nvPr/>
-        </p:nvPicPr>
-        <p:blipFill>
-          <a:blip r:embed="rId2"/>
-          <a:stretch>
-            <a:fillRect/>
-          </a:stretch>
-        </p:blipFill>
-        <p:spPr>
-          <a:xfrm>
-            <a:off x="0" y="0"/>
-            <a:ext cx="9144000" cy="5143500"/>
-          </a:xfrm>
-          <a:prstGeom prst="rect">
-            <a:avLst/>
-          </a:prstGeom>
-          <a:ln w="12700">
-            <a:miter lim="400000"/>
-            <a:headEnd/>
-            <a:tailEnd/>
-          </a:ln>
-        </p:spPr>
-      </p:pic>
-      <p:pic>
-        <p:nvPicPr>
-          <p:cNvPr id="114" name="Picture 5" descr="Picture 5"/>
-          <p:cNvPicPr>
-            <a:picLocks noChangeAspect="1"/>
-          </p:cNvPicPr>
-          <p:nvPr/>
-        </p:nvPicPr>
-        <p:blipFill>
-          <a:blip r:embed="rId3"/>
-          <a:stretch>
-            <a:fillRect/>
-          </a:stretch>
-        </p:blipFill>
-        <p:spPr>
-          <a:xfrm>
-            <a:off x="469900" y="0"/>
-            <a:ext cx="4391984" cy="171450"/>
-          </a:xfrm>
-          <a:prstGeom prst="rect">
-            <a:avLst/>
-          </a:prstGeom>
-          <a:ln w="12700">
-            <a:miter lim="400000"/>
-            <a:headEnd/>
-            <a:tailEnd/>
-          </a:ln>
-        </p:spPr>
-      </p:pic>
-      <p:sp>
-        <p:nvSpPr>
-          <p:cNvPr id="3" name="Título 2"/>
-          <p:cNvSpPr>
-            <a:spLocks noGrp="1"/>
-          </p:cNvSpPr>
-          <p:nvPr>
-            <p:ph type="title"/>
-          </p:nvPr>
-        </p:nvSpPr>
-        <p:spPr>
-          <a:xfrm>
-            <a:off x="285751" y="2386770"/>
-            <a:ext cx="8615364" cy="1102519"/>
-          </a:xfrm>
-        </p:spPr>
-        <p:txBody>
-          <a:bodyPr>
-            <a:noAutofit/>
-          </a:bodyPr>
-          <a:lstStyle/>
-          <a:p>
-            <a:r>
-              <a:rPr lang="pt-BR" sz="4800" b="1" dirty="0">
-                <a:solidFill>
-                  <a:schemeClr val="bg1"/>
-                </a:solidFill>
-              </a:rPr>
-              <a:t>Controladores Lógicos e Programáveis (CLP)</a:t>
-            </a:r>
-          </a:p>
-        </p:txBody>
-      </p:sp>
-      <p:sp>
-        <p:nvSpPr>
-          <p:cNvPr id="6" name="Título 2"/>
-          <p:cNvSpPr txBox="1"/>
-          <p:nvPr/>
-        </p:nvSpPr>
-        <p:spPr>
-          <a:xfrm>
-            <a:off x="975683" y="3866663"/>
-            <a:ext cx="7772400" cy="1102519"/>
-          </a:xfrm>
-          <a:prstGeom prst="rect">
-            <a:avLst/>
-          </a:prstGeom>
-          <a:ln w="12700">
-            <a:miter lim="400000"/>
-          </a:ln>
-        </p:spPr>
-        <p:txBody>
-          <a:bodyPr lIns="45718" tIns="45718" rIns="45718" bIns="45718" anchor="ctr">
-            <a:noAutofit/>
-          </a:bodyPr>
-          <a:lstStyle>
-            <a:lvl1pPr marL="0" marR="0" indent="0" algn="ctr" defTabSz="457200" rtl="0" latinLnBrk="0">
-              <a:lnSpc>
-                <a:spcPct val="100000"/>
-              </a:lnSpc>
-              <a:spcBef>
-                <a:spcPts val="0"/>
-              </a:spcBef>
-              <a:spcAft>
-                <a:spcPts val="0"/>
-              </a:spcAft>
-              <a:buClrTx/>
-              <a:buSzTx/>
-              <a:buFontTx/>
-              <a:buNone/>
-              <a:defRPr sz="4400" b="0" i="0" u="none" strike="noStrike" cap="none" spc="0" baseline="0">
-                <a:ln>
-                  <a:noFill/>
-                </a:ln>
-                <a:solidFill>
-                  <a:srgbClr val="000000"/>
-                </a:solidFill>
-                <a:uFillTx/>
-                <a:latin typeface="+mj-lt"/>
-                <a:ea typeface="+mj-ea"/>
-                <a:cs typeface="+mj-cs"/>
-                <a:sym typeface="Calibri"/>
-              </a:defRPr>
-            </a:lvl1pPr>
-            <a:lvl2pPr marL="0" marR="0" indent="0" algn="ctr" defTabSz="457200" rtl="0" latinLnBrk="0">
-              <a:lnSpc>
-                <a:spcPct val="100000"/>
-              </a:lnSpc>
-              <a:spcBef>
-                <a:spcPts val="0"/>
-              </a:spcBef>
-              <a:spcAft>
-                <a:spcPts val="0"/>
-              </a:spcAft>
-              <a:buClrTx/>
-              <a:buSzTx/>
-              <a:buFontTx/>
-              <a:buNone/>
-              <a:defRPr sz="4400" b="0" i="0" u="none" strike="noStrike" cap="none" spc="0" baseline="0">
-                <a:ln>
-                  <a:noFill/>
-                </a:ln>
-                <a:solidFill>
-                  <a:srgbClr val="000000"/>
-                </a:solidFill>
-                <a:uFillTx/>
-                <a:latin typeface="+mj-lt"/>
-                <a:ea typeface="+mj-ea"/>
-                <a:cs typeface="+mj-cs"/>
-                <a:sym typeface="Calibri"/>
-              </a:defRPr>
-            </a:lvl2pPr>
-            <a:lvl3pPr marL="0" marR="0" indent="0" algn="ctr" defTabSz="457200" rtl="0" latinLnBrk="0">
-              <a:lnSpc>
-                <a:spcPct val="100000"/>
-              </a:lnSpc>
-              <a:spcBef>
-                <a:spcPts val="0"/>
-              </a:spcBef>
-              <a:spcAft>
-                <a:spcPts val="0"/>
-              </a:spcAft>
-              <a:buClrTx/>
-              <a:buSzTx/>
-              <a:buFontTx/>
-              <a:buNone/>
-              <a:defRPr sz="4400" b="0" i="0" u="none" strike="noStrike" cap="none" spc="0" baseline="0">
-                <a:ln>
-                  <a:noFill/>
-                </a:ln>
-                <a:solidFill>
-                  <a:srgbClr val="000000"/>
-                </a:solidFill>
-                <a:uFillTx/>
-                <a:latin typeface="+mj-lt"/>
-                <a:ea typeface="+mj-ea"/>
-                <a:cs typeface="+mj-cs"/>
-                <a:sym typeface="Calibri"/>
-              </a:defRPr>
-            </a:lvl3pPr>
-            <a:lvl4pPr marL="0" marR="0" indent="0" algn="ctr" defTabSz="457200" rtl="0" latinLnBrk="0">
-              <a:lnSpc>
-                <a:spcPct val="100000"/>
-              </a:lnSpc>
-              <a:spcBef>
-                <a:spcPts val="0"/>
-              </a:spcBef>
-              <a:spcAft>
-                <a:spcPts val="0"/>
-              </a:spcAft>
-              <a:buClrTx/>
-              <a:buSzTx/>
-              <a:buFontTx/>
-              <a:buNone/>
-              <a:defRPr sz="4400" b="0" i="0" u="none" strike="noStrike" cap="none" spc="0" baseline="0">
-                <a:ln>
-                  <a:noFill/>
-                </a:ln>
-                <a:solidFill>
-                  <a:srgbClr val="000000"/>
-                </a:solidFill>
-                <a:uFillTx/>
-                <a:latin typeface="+mj-lt"/>
-                <a:ea typeface="+mj-ea"/>
-                <a:cs typeface="+mj-cs"/>
-                <a:sym typeface="Calibri"/>
-              </a:defRPr>
-            </a:lvl4pPr>
-            <a:lvl5pPr marL="0" marR="0" indent="0" algn="ctr" defTabSz="457200" rtl="0" latinLnBrk="0">
-              <a:lnSpc>
-                <a:spcPct val="100000"/>
-              </a:lnSpc>
-              <a:spcBef>
-                <a:spcPts val="0"/>
-              </a:spcBef>
-              <a:spcAft>
-                <a:spcPts val="0"/>
-              </a:spcAft>
-              <a:buClrTx/>
-              <a:buSzTx/>
-              <a:buFontTx/>
-              <a:buNone/>
-              <a:defRPr sz="4400" b="0" i="0" u="none" strike="noStrike" cap="none" spc="0" baseline="0">
-                <a:ln>
-                  <a:noFill/>
-                </a:ln>
-                <a:solidFill>
-                  <a:srgbClr val="000000"/>
-                </a:solidFill>
-                <a:uFillTx/>
-                <a:latin typeface="+mj-lt"/>
-                <a:ea typeface="+mj-ea"/>
-                <a:cs typeface="+mj-cs"/>
-                <a:sym typeface="Calibri"/>
-              </a:defRPr>
-            </a:lvl5pPr>
-            <a:lvl6pPr marL="0" marR="0" indent="0" algn="ctr" defTabSz="457200" rtl="0" latinLnBrk="0">
-              <a:lnSpc>
-                <a:spcPct val="100000"/>
-              </a:lnSpc>
-              <a:spcBef>
-                <a:spcPts val="0"/>
-              </a:spcBef>
-              <a:spcAft>
-                <a:spcPts val="0"/>
-              </a:spcAft>
-              <a:buClrTx/>
-              <a:buSzTx/>
-              <a:buFontTx/>
-              <a:buNone/>
-              <a:defRPr sz="4400" b="0" i="0" u="none" strike="noStrike" cap="none" spc="0" baseline="0">
-                <a:ln>
-                  <a:noFill/>
-                </a:ln>
-                <a:solidFill>
-                  <a:srgbClr val="000000"/>
-                </a:solidFill>
-                <a:uFillTx/>
-                <a:latin typeface="+mj-lt"/>
-                <a:ea typeface="+mj-ea"/>
-                <a:cs typeface="+mj-cs"/>
-                <a:sym typeface="Calibri"/>
-              </a:defRPr>
-            </a:lvl6pPr>
-            <a:lvl7pPr marL="0" marR="0" indent="0" algn="ctr" defTabSz="457200" rtl="0" latinLnBrk="0">
-              <a:lnSpc>
-                <a:spcPct val="100000"/>
-              </a:lnSpc>
-              <a:spcBef>
-                <a:spcPts val="0"/>
-              </a:spcBef>
-              <a:spcAft>
-                <a:spcPts val="0"/>
-              </a:spcAft>
-              <a:buClrTx/>
-              <a:buSzTx/>
-              <a:buFontTx/>
-              <a:buNone/>
-              <a:defRPr sz="4400" b="0" i="0" u="none" strike="noStrike" cap="none" spc="0" baseline="0">
-                <a:ln>
-                  <a:noFill/>
-                </a:ln>
-                <a:solidFill>
-                  <a:srgbClr val="000000"/>
-                </a:solidFill>
-                <a:uFillTx/>
-                <a:latin typeface="+mj-lt"/>
-                <a:ea typeface="+mj-ea"/>
-                <a:cs typeface="+mj-cs"/>
-                <a:sym typeface="Calibri"/>
-              </a:defRPr>
-            </a:lvl7pPr>
-            <a:lvl8pPr marL="0" marR="0" indent="0" algn="ctr" defTabSz="457200" rtl="0" latinLnBrk="0">
-              <a:lnSpc>
-                <a:spcPct val="100000"/>
-              </a:lnSpc>
-              <a:spcBef>
-                <a:spcPts val="0"/>
-              </a:spcBef>
-              <a:spcAft>
-                <a:spcPts val="0"/>
-              </a:spcAft>
-              <a:buClrTx/>
-              <a:buSzTx/>
-              <a:buFontTx/>
-              <a:buNone/>
-              <a:defRPr sz="4400" b="0" i="0" u="none" strike="noStrike" cap="none" spc="0" baseline="0">
-                <a:ln>
-                  <a:noFill/>
-                </a:ln>
-                <a:solidFill>
-                  <a:srgbClr val="000000"/>
-                </a:solidFill>
-                <a:uFillTx/>
-                <a:latin typeface="+mj-lt"/>
-                <a:ea typeface="+mj-ea"/>
-                <a:cs typeface="+mj-cs"/>
-                <a:sym typeface="Calibri"/>
-              </a:defRPr>
-            </a:lvl8pPr>
-            <a:lvl9pPr marL="0" marR="0" indent="0" algn="ctr" defTabSz="457200" rtl="0" latinLnBrk="0">
-              <a:lnSpc>
-                <a:spcPct val="100000"/>
-              </a:lnSpc>
-              <a:spcBef>
-                <a:spcPts val="0"/>
-              </a:spcBef>
-              <a:spcAft>
-                <a:spcPts val="0"/>
-              </a:spcAft>
-              <a:buClrTx/>
-              <a:buSzTx/>
-              <a:buFontTx/>
-              <a:buNone/>
-              <a:defRPr sz="4400" b="0" i="0" u="none" strike="noStrike" cap="none" spc="0" baseline="0">
-                <a:ln>
-                  <a:noFill/>
-                </a:ln>
-                <a:solidFill>
-                  <a:srgbClr val="000000"/>
-                </a:solidFill>
-                <a:uFillTx/>
-                <a:latin typeface="+mj-lt"/>
-                <a:ea typeface="+mj-ea"/>
-                <a:cs typeface="+mj-cs"/>
-                <a:sym typeface="Calibri"/>
-              </a:defRPr>
-            </a:lvl9pPr>
-          </a:lstStyle>
-          <a:p>
-            <a:pPr algn="r" hangingPunct="1"/>
-            <a:r>
-              <a:rPr lang="pt-BR" sz="2000" b="1" dirty="0">
-                <a:solidFill>
-                  <a:schemeClr val="bg1"/>
-                </a:solidFill>
-              </a:rPr>
-              <a:t>Professor </a:t>
-            </a:r>
-            <a:r>
-              <a:rPr lang="pt-BR" sz="2000" b="1">
-                <a:solidFill>
-                  <a:schemeClr val="bg1"/>
-                </a:solidFill>
-              </a:rPr>
-              <a:t>M.Sc</a:t>
-            </a:r>
-            <a:r>
-              <a:rPr lang="pt-BR" sz="2000" b="1" dirty="0">
-                <a:solidFill>
-                  <a:schemeClr val="bg1"/>
-                </a:solidFill>
-              </a:rPr>
-              <a:t>. Heleno Cardoso</a:t>
-            </a:r>
-          </a:p>
-        </p:txBody>
-      </p:sp>
-      <p:pic>
-        <p:nvPicPr>
-          <p:cNvPr id="2" name="Google Shape;62;p1" descr="Imagem">
-            <a:extLst>
-              <a:ext uri="{FF2B5EF4-FFF2-40B4-BE49-F238E27FC236}">
-                <a16:creationId xmlns:a16="http://schemas.microsoft.com/office/drawing/2014/main" id="{9C895622-2963-024D-634E-EA58F5381D06}"/>
-              </a:ext>
-            </a:extLst>
-          </p:cNvPr>
-          <p:cNvPicPr preferRelativeResize="0"/>
-          <p:nvPr/>
-        </p:nvPicPr>
-        <p:blipFill rotWithShape="1">
-          <a:blip r:embed="rId4">
-            <a:alphaModFix/>
-          </a:blip>
-          <a:srcRect/>
-          <a:stretch/>
-        </p:blipFill>
-        <p:spPr>
-          <a:xfrm>
-            <a:off x="469898" y="343798"/>
-            <a:ext cx="2858518" cy="1338697"/>
-          </a:xfrm>
-          <a:prstGeom prst="rect">
-            <a:avLst/>
-          </a:prstGeom>
-          <a:noFill/>
-          <a:ln>
-            <a:noFill/>
-          </a:ln>
-        </p:spPr>
-      </p:pic>
-    </p:spTree>
   </p:cSld>
   <p:clrMapOvr>
     <a:masterClrMapping/>

</xml_diff>